<commit_message>
backup - not done yet
</commit_message>
<xml_diff>
--- a/reports/MutationTestingSurvey/images/process.pptx
+++ b/reports/MutationTestingSurvey/images/process.pptx
@@ -2,7 +2,7 @@
 <file path=ppt/presentation.xml><?xml version="1.0" encoding="utf-8"?>
 <p:presentation xmlns:a="http://schemas.openxmlformats.org/drawingml/2006/main" xmlns:r="http://schemas.openxmlformats.org/officeDocument/2006/relationships" xmlns:p="http://schemas.openxmlformats.org/presentationml/2006/main" saveSubsetFonts="1" autoCompressPictures="0">
   <p:sldMasterIdLst>
-    <p:sldMasterId id="2147483660" r:id="rId1"/>
+    <p:sldMasterId id="2147483672" r:id="rId1"/>
   </p:sldMasterIdLst>
   <p:notesMasterIdLst>
     <p:notesMasterId r:id="rId3"/>
@@ -10,7 +10,7 @@
   <p:sldIdLst>
     <p:sldId id="257" r:id="rId2"/>
   </p:sldIdLst>
-  <p:sldSz cx="9144000" cy="6858000" type="screen4x3"/>
+  <p:sldSz cx="9144000" cy="7937500"/>
   <p:notesSz cx="6858000" cy="9144000"/>
   <p:defaultTextStyle>
     <a:defPPr>
@@ -107,6 +107,11 @@
       </a:defRPr>
     </a:lvl9pPr>
   </p:defaultTextStyle>
+  <p:extLst>
+    <p:ext uri="{EFAFB233-063F-42B5-8137-9DF3F51BA10A}">
+      <p15:sldGuideLst xmlns:p15="http://schemas.microsoft.com/office/powerpoint/2012/main"/>
+    </p:ext>
+  </p:extLst>
 </p:presentation>
 </file>
 
@@ -192,7 +197,7 @@
           <a:p>
             <a:fld id="{EDD786E0-1649-BA4A-8666-99111F2D089F}" type="datetimeFigureOut">
               <a:rPr lang="en-US" smtClean="0"/>
-              <a:t>11/4/19</a:t>
+              <a:t>11/25/19</a:t>
             </a:fld>
             <a:endParaRPr lang="en-US"/>
           </a:p>
@@ -210,8 +215,8 @@
         </p:nvSpPr>
         <p:spPr>
           <a:xfrm>
-            <a:off x="1371600" y="1143000"/>
-            <a:ext cx="4114800" cy="3086100"/>
+            <a:off x="1651000" y="1143000"/>
+            <a:ext cx="3556000" cy="3086100"/>
           </a:xfrm>
           <a:prstGeom prst="rect">
             <a:avLst/>
@@ -486,7 +491,12 @@
             <p:ph type="sldImg"/>
           </p:nvPr>
         </p:nvSpPr>
-        <p:spPr/>
+        <p:spPr>
+          <a:xfrm>
+            <a:off x="1651000" y="1143000"/>
+            <a:ext cx="3556000" cy="3086100"/>
+          </a:xfrm>
+        </p:spPr>
       </p:sp>
       <p:sp>
         <p:nvSpPr>
@@ -621,8 +631,8 @@
         </p:nvSpPr>
         <p:spPr>
           <a:xfrm>
-            <a:off x="685800" y="1122363"/>
-            <a:ext cx="7772400" cy="2387600"/>
+            <a:off x="685800" y="1299031"/>
+            <a:ext cx="7772400" cy="2763426"/>
           </a:xfrm>
         </p:spPr>
         <p:txBody>
@@ -653,8 +663,8 @@
         </p:nvSpPr>
         <p:spPr>
           <a:xfrm>
-            <a:off x="1143000" y="3602038"/>
-            <a:ext cx="6858000" cy="1655762"/>
+            <a:off x="1143000" y="4169026"/>
+            <a:ext cx="6858000" cy="1916391"/>
           </a:xfrm>
         </p:spPr>
         <p:txBody>
@@ -723,7 +733,7 @@
           <a:p>
             <a:fld id="{30EFDADF-DC90-EB4C-B7F4-786C2B5C8A03}" type="datetimeFigureOut">
               <a:rPr lang="en-US" smtClean="0"/>
-              <a:t>11/4/19</a:t>
+              <a:t>11/25/19</a:t>
             </a:fld>
             <a:endParaRPr lang="en-US"/>
           </a:p>
@@ -774,7 +784,7 @@
     </p:spTree>
     <p:extLst>
       <p:ext uri="{BB962C8B-B14F-4D97-AF65-F5344CB8AC3E}">
-        <p14:creationId xmlns:p14="http://schemas.microsoft.com/office/powerpoint/2010/main" val="951926787"/>
+        <p14:creationId xmlns:p14="http://schemas.microsoft.com/office/powerpoint/2010/main" val="669193929"/>
       </p:ext>
     </p:extLst>
   </p:cSld>
@@ -893,7 +903,7 @@
           <a:p>
             <a:fld id="{30EFDADF-DC90-EB4C-B7F4-786C2B5C8A03}" type="datetimeFigureOut">
               <a:rPr lang="en-US" smtClean="0"/>
-              <a:t>11/4/19</a:t>
+              <a:t>11/25/19</a:t>
             </a:fld>
             <a:endParaRPr lang="en-US"/>
           </a:p>
@@ -944,7 +954,7 @@
     </p:spTree>
     <p:extLst>
       <p:ext uri="{BB962C8B-B14F-4D97-AF65-F5344CB8AC3E}">
-        <p14:creationId xmlns:p14="http://schemas.microsoft.com/office/powerpoint/2010/main" val="2662876896"/>
+        <p14:creationId xmlns:p14="http://schemas.microsoft.com/office/powerpoint/2010/main" val="779012988"/>
       </p:ext>
     </p:extLst>
   </p:cSld>
@@ -983,8 +993,8 @@
         </p:nvSpPr>
         <p:spPr>
           <a:xfrm>
-            <a:off x="6543675" y="365125"/>
-            <a:ext cx="1971675" cy="5811838"/>
+            <a:off x="6543676" y="422599"/>
+            <a:ext cx="1971675" cy="6726664"/>
           </a:xfrm>
         </p:spPr>
         <p:txBody>
@@ -1011,8 +1021,8 @@
         </p:nvSpPr>
         <p:spPr>
           <a:xfrm>
-            <a:off x="628650" y="365125"/>
-            <a:ext cx="5800725" cy="5811838"/>
+            <a:off x="628651" y="422599"/>
+            <a:ext cx="5800725" cy="6726664"/>
           </a:xfrm>
         </p:spPr>
         <p:txBody>
@@ -1073,7 +1083,7 @@
           <a:p>
             <a:fld id="{30EFDADF-DC90-EB4C-B7F4-786C2B5C8A03}" type="datetimeFigureOut">
               <a:rPr lang="en-US" smtClean="0"/>
-              <a:t>11/4/19</a:t>
+              <a:t>11/25/19</a:t>
             </a:fld>
             <a:endParaRPr lang="en-US"/>
           </a:p>
@@ -1124,7 +1134,7 @@
     </p:spTree>
     <p:extLst>
       <p:ext uri="{BB962C8B-B14F-4D97-AF65-F5344CB8AC3E}">
-        <p14:creationId xmlns:p14="http://schemas.microsoft.com/office/powerpoint/2010/main" val="3687789083"/>
+        <p14:creationId xmlns:p14="http://schemas.microsoft.com/office/powerpoint/2010/main" val="180660754"/>
       </p:ext>
     </p:extLst>
   </p:cSld>
@@ -1243,7 +1253,7 @@
           <a:p>
             <a:fld id="{30EFDADF-DC90-EB4C-B7F4-786C2B5C8A03}" type="datetimeFigureOut">
               <a:rPr lang="en-US" smtClean="0"/>
-              <a:t>11/4/19</a:t>
+              <a:t>11/25/19</a:t>
             </a:fld>
             <a:endParaRPr lang="en-US"/>
           </a:p>
@@ -1294,7 +1304,7 @@
     </p:spTree>
     <p:extLst>
       <p:ext uri="{BB962C8B-B14F-4D97-AF65-F5344CB8AC3E}">
-        <p14:creationId xmlns:p14="http://schemas.microsoft.com/office/powerpoint/2010/main" val="3702193282"/>
+        <p14:creationId xmlns:p14="http://schemas.microsoft.com/office/powerpoint/2010/main" val="2727280134"/>
       </p:ext>
     </p:extLst>
   </p:cSld>
@@ -1333,8 +1343,8 @@
         </p:nvSpPr>
         <p:spPr>
           <a:xfrm>
-            <a:off x="623888" y="1709739"/>
-            <a:ext cx="7886700" cy="2852737"/>
+            <a:off x="623888" y="1978865"/>
+            <a:ext cx="7886700" cy="3301779"/>
           </a:xfrm>
         </p:spPr>
         <p:txBody>
@@ -1365,8 +1375,8 @@
         </p:nvSpPr>
         <p:spPr>
           <a:xfrm>
-            <a:off x="623888" y="4589464"/>
-            <a:ext cx="7886700" cy="1500187"/>
+            <a:off x="623888" y="5311880"/>
+            <a:ext cx="7886700" cy="1736328"/>
           </a:xfrm>
         </p:spPr>
         <p:txBody>
@@ -1487,7 +1497,7 @@
           <a:p>
             <a:fld id="{30EFDADF-DC90-EB4C-B7F4-786C2B5C8A03}" type="datetimeFigureOut">
               <a:rPr lang="en-US" smtClean="0"/>
-              <a:t>11/4/19</a:t>
+              <a:t>11/25/19</a:t>
             </a:fld>
             <a:endParaRPr lang="en-US"/>
           </a:p>
@@ -1538,7 +1548,7 @@
     </p:spTree>
     <p:extLst>
       <p:ext uri="{BB962C8B-B14F-4D97-AF65-F5344CB8AC3E}">
-        <p14:creationId xmlns:p14="http://schemas.microsoft.com/office/powerpoint/2010/main" val="2031671483"/>
+        <p14:creationId xmlns:p14="http://schemas.microsoft.com/office/powerpoint/2010/main" val="1252625683"/>
       </p:ext>
     </p:extLst>
   </p:cSld>
@@ -1600,8 +1610,8 @@
         </p:nvSpPr>
         <p:spPr>
           <a:xfrm>
-            <a:off x="628650" y="1825625"/>
-            <a:ext cx="3886200" cy="4351338"/>
+            <a:off x="628650" y="2112992"/>
+            <a:ext cx="3886200" cy="5036271"/>
           </a:xfrm>
         </p:spPr>
         <p:txBody>
@@ -1657,8 +1667,8 @@
         </p:nvSpPr>
         <p:spPr>
           <a:xfrm>
-            <a:off x="4629150" y="1825625"/>
-            <a:ext cx="3886200" cy="4351338"/>
+            <a:off x="4629150" y="2112992"/>
+            <a:ext cx="3886200" cy="5036271"/>
           </a:xfrm>
         </p:spPr>
         <p:txBody>
@@ -1719,7 +1729,7 @@
           <a:p>
             <a:fld id="{30EFDADF-DC90-EB4C-B7F4-786C2B5C8A03}" type="datetimeFigureOut">
               <a:rPr lang="en-US" smtClean="0"/>
-              <a:t>11/4/19</a:t>
+              <a:t>11/25/19</a:t>
             </a:fld>
             <a:endParaRPr lang="en-US"/>
           </a:p>
@@ -1770,7 +1780,7 @@
     </p:spTree>
     <p:extLst>
       <p:ext uri="{BB962C8B-B14F-4D97-AF65-F5344CB8AC3E}">
-        <p14:creationId xmlns:p14="http://schemas.microsoft.com/office/powerpoint/2010/main" val="1714719777"/>
+        <p14:creationId xmlns:p14="http://schemas.microsoft.com/office/powerpoint/2010/main" val="2393722670"/>
       </p:ext>
     </p:extLst>
   </p:cSld>
@@ -1809,8 +1819,8 @@
         </p:nvSpPr>
         <p:spPr>
           <a:xfrm>
-            <a:off x="629841" y="365126"/>
-            <a:ext cx="7886700" cy="1325563"/>
+            <a:off x="629841" y="422600"/>
+            <a:ext cx="7886700" cy="1534216"/>
           </a:xfrm>
         </p:spPr>
         <p:txBody>
@@ -1837,8 +1847,8 @@
         </p:nvSpPr>
         <p:spPr>
           <a:xfrm>
-            <a:off x="629842" y="1681163"/>
-            <a:ext cx="3868340" cy="823912"/>
+            <a:off x="629842" y="1945790"/>
+            <a:ext cx="3868340" cy="953602"/>
           </a:xfrm>
         </p:spPr>
         <p:txBody>
@@ -1902,8 +1912,8 @@
         </p:nvSpPr>
         <p:spPr>
           <a:xfrm>
-            <a:off x="629842" y="2505075"/>
-            <a:ext cx="3868340" cy="3684588"/>
+            <a:off x="629842" y="2899393"/>
+            <a:ext cx="3868340" cy="4264569"/>
           </a:xfrm>
         </p:spPr>
         <p:txBody>
@@ -1959,8 +1969,8 @@
         </p:nvSpPr>
         <p:spPr>
           <a:xfrm>
-            <a:off x="4629150" y="1681163"/>
-            <a:ext cx="3887391" cy="823912"/>
+            <a:off x="4629151" y="1945790"/>
+            <a:ext cx="3887391" cy="953602"/>
           </a:xfrm>
         </p:spPr>
         <p:txBody>
@@ -2024,8 +2034,8 @@
         </p:nvSpPr>
         <p:spPr>
           <a:xfrm>
-            <a:off x="4629150" y="2505075"/>
-            <a:ext cx="3887391" cy="3684588"/>
+            <a:off x="4629151" y="2899393"/>
+            <a:ext cx="3887391" cy="4264569"/>
           </a:xfrm>
         </p:spPr>
         <p:txBody>
@@ -2086,7 +2096,7 @@
           <a:p>
             <a:fld id="{30EFDADF-DC90-EB4C-B7F4-786C2B5C8A03}" type="datetimeFigureOut">
               <a:rPr lang="en-US" smtClean="0"/>
-              <a:t>11/4/19</a:t>
+              <a:t>11/25/19</a:t>
             </a:fld>
             <a:endParaRPr lang="en-US"/>
           </a:p>
@@ -2137,7 +2147,7 @@
     </p:spTree>
     <p:extLst>
       <p:ext uri="{BB962C8B-B14F-4D97-AF65-F5344CB8AC3E}">
-        <p14:creationId xmlns:p14="http://schemas.microsoft.com/office/powerpoint/2010/main" val="3798044935"/>
+        <p14:creationId xmlns:p14="http://schemas.microsoft.com/office/powerpoint/2010/main" val="548844453"/>
       </p:ext>
     </p:extLst>
   </p:cSld>
@@ -2204,7 +2214,7 @@
           <a:p>
             <a:fld id="{30EFDADF-DC90-EB4C-B7F4-786C2B5C8A03}" type="datetimeFigureOut">
               <a:rPr lang="en-US" smtClean="0"/>
-              <a:t>11/4/19</a:t>
+              <a:t>11/25/19</a:t>
             </a:fld>
             <a:endParaRPr lang="en-US"/>
           </a:p>
@@ -2255,7 +2265,7 @@
     </p:spTree>
     <p:extLst>
       <p:ext uri="{BB962C8B-B14F-4D97-AF65-F5344CB8AC3E}">
-        <p14:creationId xmlns:p14="http://schemas.microsoft.com/office/powerpoint/2010/main" val="2818532868"/>
+        <p14:creationId xmlns:p14="http://schemas.microsoft.com/office/powerpoint/2010/main" val="588510054"/>
       </p:ext>
     </p:extLst>
   </p:cSld>
@@ -2299,7 +2309,7 @@
           <a:p>
             <a:fld id="{30EFDADF-DC90-EB4C-B7F4-786C2B5C8A03}" type="datetimeFigureOut">
               <a:rPr lang="en-US" smtClean="0"/>
-              <a:t>11/4/19</a:t>
+              <a:t>11/25/19</a:t>
             </a:fld>
             <a:endParaRPr lang="en-US"/>
           </a:p>
@@ -2350,7 +2360,7 @@
     </p:spTree>
     <p:extLst>
       <p:ext uri="{BB962C8B-B14F-4D97-AF65-F5344CB8AC3E}">
-        <p14:creationId xmlns:p14="http://schemas.microsoft.com/office/powerpoint/2010/main" val="1636175955"/>
+        <p14:creationId xmlns:p14="http://schemas.microsoft.com/office/powerpoint/2010/main" val="686825414"/>
       </p:ext>
     </p:extLst>
   </p:cSld>
@@ -2389,8 +2399,8 @@
         </p:nvSpPr>
         <p:spPr>
           <a:xfrm>
-            <a:off x="629841" y="457200"/>
-            <a:ext cx="2949178" cy="1600200"/>
+            <a:off x="629841" y="529167"/>
+            <a:ext cx="2949178" cy="1852083"/>
           </a:xfrm>
         </p:spPr>
         <p:txBody>
@@ -2421,8 +2431,8 @@
         </p:nvSpPr>
         <p:spPr>
           <a:xfrm>
-            <a:off x="3887391" y="987426"/>
-            <a:ext cx="4629150" cy="4873625"/>
+            <a:off x="3887391" y="1142855"/>
+            <a:ext cx="4629150" cy="5640770"/>
           </a:xfrm>
         </p:spPr>
         <p:txBody>
@@ -2506,8 +2516,8 @@
         </p:nvSpPr>
         <p:spPr>
           <a:xfrm>
-            <a:off x="629841" y="2057400"/>
-            <a:ext cx="2949178" cy="3811588"/>
+            <a:off x="629841" y="2381250"/>
+            <a:ext cx="2949178" cy="4411560"/>
           </a:xfrm>
         </p:spPr>
         <p:txBody>
@@ -2576,7 +2586,7 @@
           <a:p>
             <a:fld id="{30EFDADF-DC90-EB4C-B7F4-786C2B5C8A03}" type="datetimeFigureOut">
               <a:rPr lang="en-US" smtClean="0"/>
-              <a:t>11/4/19</a:t>
+              <a:t>11/25/19</a:t>
             </a:fld>
             <a:endParaRPr lang="en-US"/>
           </a:p>
@@ -2627,7 +2637,7 @@
     </p:spTree>
     <p:extLst>
       <p:ext uri="{BB962C8B-B14F-4D97-AF65-F5344CB8AC3E}">
-        <p14:creationId xmlns:p14="http://schemas.microsoft.com/office/powerpoint/2010/main" val="2770966277"/>
+        <p14:creationId xmlns:p14="http://schemas.microsoft.com/office/powerpoint/2010/main" val="528179384"/>
       </p:ext>
     </p:extLst>
   </p:cSld>
@@ -2666,8 +2676,8 @@
         </p:nvSpPr>
         <p:spPr>
           <a:xfrm>
-            <a:off x="629841" y="457200"/>
-            <a:ext cx="2949178" cy="1600200"/>
+            <a:off x="629841" y="529167"/>
+            <a:ext cx="2949178" cy="1852083"/>
           </a:xfrm>
         </p:spPr>
         <p:txBody>
@@ -2698,8 +2708,8 @@
         </p:nvSpPr>
         <p:spPr>
           <a:xfrm>
-            <a:off x="3887391" y="987426"/>
-            <a:ext cx="4629150" cy="4873625"/>
+            <a:off x="3887391" y="1142855"/>
+            <a:ext cx="4629150" cy="5640770"/>
           </a:xfrm>
         </p:spPr>
         <p:txBody>
@@ -2763,8 +2773,8 @@
         </p:nvSpPr>
         <p:spPr>
           <a:xfrm>
-            <a:off x="629841" y="2057400"/>
-            <a:ext cx="2949178" cy="3811588"/>
+            <a:off x="629841" y="2381250"/>
+            <a:ext cx="2949178" cy="4411560"/>
           </a:xfrm>
         </p:spPr>
         <p:txBody>
@@ -2833,7 +2843,7 @@
           <a:p>
             <a:fld id="{30EFDADF-DC90-EB4C-B7F4-786C2B5C8A03}" type="datetimeFigureOut">
               <a:rPr lang="en-US" smtClean="0"/>
-              <a:t>11/4/19</a:t>
+              <a:t>11/25/19</a:t>
             </a:fld>
             <a:endParaRPr lang="en-US"/>
           </a:p>
@@ -2884,7 +2894,7 @@
     </p:spTree>
     <p:extLst>
       <p:ext uri="{BB962C8B-B14F-4D97-AF65-F5344CB8AC3E}">
-        <p14:creationId xmlns:p14="http://schemas.microsoft.com/office/powerpoint/2010/main" val="775500047"/>
+        <p14:creationId xmlns:p14="http://schemas.microsoft.com/office/powerpoint/2010/main" val="2850865372"/>
       </p:ext>
     </p:extLst>
   </p:cSld>
@@ -2928,8 +2938,8 @@
         </p:nvSpPr>
         <p:spPr>
           <a:xfrm>
-            <a:off x="628650" y="365126"/>
-            <a:ext cx="7886700" cy="1325563"/>
+            <a:off x="628650" y="422600"/>
+            <a:ext cx="7886700" cy="1534216"/>
           </a:xfrm>
           <a:prstGeom prst="rect">
             <a:avLst/>
@@ -2961,8 +2971,8 @@
         </p:nvSpPr>
         <p:spPr>
           <a:xfrm>
-            <a:off x="628650" y="1825625"/>
-            <a:ext cx="7886700" cy="4351338"/>
+            <a:off x="628650" y="2112992"/>
+            <a:ext cx="7886700" cy="5036271"/>
           </a:xfrm>
           <a:prstGeom prst="rect">
             <a:avLst/>
@@ -3023,8 +3033,8 @@
         </p:nvSpPr>
         <p:spPr>
           <a:xfrm>
-            <a:off x="628650" y="6356351"/>
-            <a:ext cx="2057400" cy="365125"/>
+            <a:off x="628650" y="7356889"/>
+            <a:ext cx="2057400" cy="422598"/>
           </a:xfrm>
           <a:prstGeom prst="rect">
             <a:avLst/>
@@ -3046,7 +3056,7 @@
           <a:p>
             <a:fld id="{30EFDADF-DC90-EB4C-B7F4-786C2B5C8A03}" type="datetimeFigureOut">
               <a:rPr lang="en-US" smtClean="0"/>
-              <a:t>11/4/19</a:t>
+              <a:t>11/25/19</a:t>
             </a:fld>
             <a:endParaRPr lang="en-US"/>
           </a:p>
@@ -3064,8 +3074,8 @@
         </p:nvSpPr>
         <p:spPr>
           <a:xfrm>
-            <a:off x="3028950" y="6356351"/>
-            <a:ext cx="3086100" cy="365125"/>
+            <a:off x="3028950" y="7356889"/>
+            <a:ext cx="3086100" cy="422598"/>
           </a:xfrm>
           <a:prstGeom prst="rect">
             <a:avLst/>
@@ -3101,8 +3111,8 @@
         </p:nvSpPr>
         <p:spPr>
           <a:xfrm>
-            <a:off x="6457950" y="6356351"/>
-            <a:ext cx="2057400" cy="365125"/>
+            <a:off x="6457950" y="7356889"/>
+            <a:ext cx="2057400" cy="422598"/>
           </a:xfrm>
           <a:prstGeom prst="rect">
             <a:avLst/>
@@ -3133,23 +3143,23 @@
     </p:spTree>
     <p:extLst>
       <p:ext uri="{BB962C8B-B14F-4D97-AF65-F5344CB8AC3E}">
-        <p14:creationId xmlns:p14="http://schemas.microsoft.com/office/powerpoint/2010/main" val="4020879835"/>
+        <p14:creationId xmlns:p14="http://schemas.microsoft.com/office/powerpoint/2010/main" val="1770386685"/>
       </p:ext>
     </p:extLst>
   </p:cSld>
   <p:clrMap bg1="lt1" tx1="dk1" bg2="lt2" tx2="dk2" accent1="accent1" accent2="accent2" accent3="accent3" accent4="accent4" accent5="accent5" accent6="accent6" hlink="hlink" folHlink="folHlink"/>
   <p:sldLayoutIdLst>
-    <p:sldLayoutId id="2147483661" r:id="rId1"/>
-    <p:sldLayoutId id="2147483662" r:id="rId2"/>
-    <p:sldLayoutId id="2147483663" r:id="rId3"/>
-    <p:sldLayoutId id="2147483664" r:id="rId4"/>
-    <p:sldLayoutId id="2147483665" r:id="rId5"/>
-    <p:sldLayoutId id="2147483666" r:id="rId6"/>
-    <p:sldLayoutId id="2147483667" r:id="rId7"/>
-    <p:sldLayoutId id="2147483668" r:id="rId8"/>
-    <p:sldLayoutId id="2147483669" r:id="rId9"/>
-    <p:sldLayoutId id="2147483670" r:id="rId10"/>
-    <p:sldLayoutId id="2147483671" r:id="rId11"/>
+    <p:sldLayoutId id="2147483673" r:id="rId1"/>
+    <p:sldLayoutId id="2147483674" r:id="rId2"/>
+    <p:sldLayoutId id="2147483675" r:id="rId3"/>
+    <p:sldLayoutId id="2147483676" r:id="rId4"/>
+    <p:sldLayoutId id="2147483677" r:id="rId5"/>
+    <p:sldLayoutId id="2147483678" r:id="rId6"/>
+    <p:sldLayoutId id="2147483679" r:id="rId7"/>
+    <p:sldLayoutId id="2147483680" r:id="rId8"/>
+    <p:sldLayoutId id="2147483681" r:id="rId9"/>
+    <p:sldLayoutId id="2147483682" r:id="rId10"/>
+    <p:sldLayoutId id="2147483683" r:id="rId11"/>
   </p:sldLayoutIdLst>
   <p:txStyles>
     <p:titleStyle>
@@ -3465,10 +3475,10 @@
         </p:nvGrpSpPr>
         <p:grpSpPr>
           <a:xfrm>
-            <a:off x="685464" y="891318"/>
-            <a:ext cx="3502965" cy="1398103"/>
+            <a:off x="155377" y="357638"/>
+            <a:ext cx="3536579" cy="2754993"/>
             <a:chOff x="974883" y="1267652"/>
-            <a:chExt cx="4981994" cy="1988413"/>
+            <a:chExt cx="5029801" cy="3918212"/>
           </a:xfrm>
         </p:grpSpPr>
         <p:sp>
@@ -3571,8 +3581,8 @@
           </p:nvSpPr>
           <p:spPr>
             <a:xfrm>
-              <a:off x="3697968" y="2607501"/>
-              <a:ext cx="1097055" cy="641006"/>
+              <a:off x="3697966" y="2607498"/>
+              <a:ext cx="2306718" cy="2578366"/>
             </a:xfrm>
             <a:prstGeom prst="flowChartProcess">
               <a:avLst/>
@@ -3610,25 +3620,11 @@
             <a:lstStyle/>
             <a:p>
               <a:pPr algn="ctr"/>
-              <a:r>
-                <a:rPr lang="en-US" sz="1058" dirty="0">
-                  <a:solidFill>
-                    <a:schemeClr val="tx1"/>
-                  </a:solidFill>
-                </a:rPr>
-                <a:t>Create</a:t>
-              </a:r>
-            </a:p>
-            <a:p>
-              <a:pPr algn="ctr"/>
-              <a:r>
-                <a:rPr lang="en-US" sz="1058" dirty="0">
-                  <a:solidFill>
-                    <a:schemeClr val="tx1"/>
-                  </a:solidFill>
-                </a:rPr>
-                <a:t>Mutants</a:t>
-              </a:r>
+              <a:endParaRPr lang="en-US" sz="1058" dirty="0">
+                <a:solidFill>
+                  <a:schemeClr val="tx1"/>
+                </a:solidFill>
+              </a:endParaRPr>
             </a:p>
           </p:txBody>
         </p:sp>
@@ -3650,8 +3646,8 @@
           </p:nvCxnSpPr>
           <p:spPr>
             <a:xfrm>
-              <a:off x="3207909" y="2059018"/>
-              <a:ext cx="1038586" cy="548482"/>
+              <a:off x="3207910" y="2059018"/>
+              <a:ext cx="1643416" cy="548480"/>
             </a:xfrm>
             <a:prstGeom prst="straightConnector1">
               <a:avLst/>
@@ -3756,9 +3752,9 @@
             <p:nvPr/>
           </p:nvCxnSpPr>
           <p:spPr>
-            <a:xfrm flipH="1">
-              <a:off x="4246495" y="2045622"/>
-              <a:ext cx="520103" cy="561878"/>
+            <a:xfrm>
+              <a:off x="4766598" y="2045622"/>
+              <a:ext cx="84727" cy="561876"/>
             </a:xfrm>
             <a:prstGeom prst="straightConnector1">
               <a:avLst/>
@@ -3907,14 +3903,14 @@
             <p:cNvCxnSpPr>
               <a:cxnSpLocks/>
               <a:stCxn id="77" idx="3"/>
-              <a:endCxn id="7" idx="1"/>
+              <a:endCxn id="30" idx="1"/>
             </p:cNvCxnSpPr>
             <p:nvPr/>
           </p:nvCxnSpPr>
           <p:spPr>
             <a:xfrm flipV="1">
-              <a:off x="2220997" y="2928004"/>
-              <a:ext cx="1476971" cy="11883"/>
+              <a:off x="2220997" y="2911061"/>
+              <a:ext cx="1471723" cy="28827"/>
             </a:xfrm>
             <a:prstGeom prst="straightConnector1">
               <a:avLst/>
@@ -3960,8 +3956,8 @@
         </p:nvCxnSpPr>
         <p:spPr>
           <a:xfrm>
-            <a:off x="6348827" y="4472168"/>
-            <a:ext cx="503513" cy="12793"/>
+            <a:off x="6905411" y="5316252"/>
+            <a:ext cx="1020352" cy="0"/>
           </a:xfrm>
           <a:prstGeom prst="straightConnector1">
             <a:avLst/>
@@ -4002,7 +3998,7 @@
         </p:nvSpPr>
         <p:spPr>
           <a:xfrm>
-            <a:off x="2708837" y="6290672"/>
+            <a:off x="2549811" y="7371962"/>
             <a:ext cx="1642690" cy="320216"/>
           </a:xfrm>
           <a:prstGeom prst="rect">
@@ -4023,129 +4019,108 @@
           </a:p>
         </p:txBody>
       </p:sp>
-      <p:grpSp>
-        <p:nvGrpSpPr>
-          <p:cNvPr id="8" name="Group 7">
+      <p:sp>
+        <p:nvSpPr>
+          <p:cNvPr id="128" name="Rectangle 127">
             <a:extLst>
               <a:ext uri="{FF2B5EF4-FFF2-40B4-BE49-F238E27FC236}">
-                <a16:creationId xmlns:a16="http://schemas.microsoft.com/office/drawing/2014/main" id="{CF634D1D-28A9-ED4C-9CCC-B1E26AE92C53}"/>
+                <a16:creationId xmlns:a16="http://schemas.microsoft.com/office/drawing/2014/main" id="{A742BE72-B785-B54D-9528-CB9757DB6BDA}"/>
               </a:ext>
             </a:extLst>
           </p:cNvPr>
-          <p:cNvGrpSpPr/>
+          <p:cNvSpPr/>
           <p:nvPr/>
-        </p:nvGrpSpPr>
-        <p:grpSpPr>
+        </p:nvSpPr>
+        <p:spPr>
           <a:xfrm>
-            <a:off x="1935722" y="1677305"/>
-            <a:ext cx="4610545" cy="3053412"/>
-            <a:chOff x="2753026" y="2385500"/>
-            <a:chExt cx="6557220" cy="4342631"/>
-          </a:xfrm>
-        </p:grpSpPr>
-        <p:sp>
-          <p:nvSpPr>
-            <p:cNvPr id="128" name="Rectangle 127">
-              <a:extLst>
-                <a:ext uri="{FF2B5EF4-FFF2-40B4-BE49-F238E27FC236}">
-                  <a16:creationId xmlns:a16="http://schemas.microsoft.com/office/drawing/2014/main" id="{A742BE72-B785-B54D-9528-CB9757DB6BDA}"/>
-                </a:ext>
-              </a:extLst>
-            </p:cNvPr>
-            <p:cNvSpPr/>
-            <p:nvPr/>
-          </p:nvSpPr>
-          <p:spPr>
-            <a:xfrm>
-              <a:off x="3164077" y="2385500"/>
-              <a:ext cx="6146169" cy="4342631"/>
-            </a:xfrm>
-            <a:prstGeom prst="rect">
-              <a:avLst/>
-            </a:prstGeom>
-            <a:noFill/>
-            <a:ln w="38100">
-              <a:solidFill>
-                <a:schemeClr val="tx1"/>
-              </a:solidFill>
-              <a:prstDash val="sysDot"/>
-            </a:ln>
-          </p:spPr>
-          <p:style>
-            <a:lnRef idx="2">
-              <a:schemeClr val="accent1">
-                <a:shade val="50000"/>
-              </a:schemeClr>
-            </a:lnRef>
-            <a:fillRef idx="1">
-              <a:schemeClr val="accent1"/>
-            </a:fillRef>
-            <a:effectRef idx="0">
-              <a:schemeClr val="accent1"/>
-            </a:effectRef>
-            <a:fontRef idx="minor">
-              <a:schemeClr val="lt1"/>
-            </a:fontRef>
-          </p:style>
-          <p:txBody>
-            <a:bodyPr rtlCol="0" anchor="ctr"/>
-            <a:lstStyle/>
-            <a:p>
-              <a:pPr algn="ctr"/>
-              <a:endParaRPr lang="en-US" sz="4444"/>
-            </a:p>
-          </p:txBody>
-        </p:sp>
-        <p:sp>
-          <p:nvSpPr>
-            <p:cNvPr id="131" name="Rectangle 130">
-              <a:extLst>
-                <a:ext uri="{FF2B5EF4-FFF2-40B4-BE49-F238E27FC236}">
-                  <a16:creationId xmlns:a16="http://schemas.microsoft.com/office/drawing/2014/main" id="{4C3B14C8-A199-A044-95D5-27CA0BB2B373}"/>
-                </a:ext>
-              </a:extLst>
-            </p:cNvPr>
-            <p:cNvSpPr/>
-            <p:nvPr/>
-          </p:nvSpPr>
-          <p:spPr>
-            <a:xfrm>
-              <a:off x="2753026" y="5277211"/>
-              <a:ext cx="2230877" cy="1103619"/>
-            </a:xfrm>
-            <a:prstGeom prst="rect">
-              <a:avLst/>
-            </a:prstGeom>
-          </p:spPr>
-          <p:txBody>
-            <a:bodyPr wrap="square">
-              <a:spAutoFit/>
-            </a:bodyPr>
-            <a:lstStyle/>
-            <a:p>
-              <a:pPr algn="ctr"/>
-              <a:r>
-                <a:rPr lang="en-US" sz="1481" dirty="0"/>
-                <a:t>Test Suite</a:t>
-              </a:r>
-            </a:p>
-            <a:p>
-              <a:pPr algn="ctr"/>
-              <a:r>
-                <a:rPr lang="en-US" sz="1481" dirty="0"/>
-                <a:t>Evaluation</a:t>
-              </a:r>
-            </a:p>
-            <a:p>
-              <a:pPr algn="ctr"/>
-              <a:r>
-                <a:rPr lang="en-US" sz="1481" dirty="0"/>
-                <a:t>Process</a:t>
-              </a:r>
-            </a:p>
-          </p:txBody>
-        </p:sp>
-      </p:grpSp>
+            <a:off x="1537252" y="1143623"/>
+            <a:ext cx="5724939" cy="4448794"/>
+          </a:xfrm>
+          <a:prstGeom prst="rect">
+            <a:avLst/>
+          </a:prstGeom>
+          <a:noFill/>
+          <a:ln w="38100">
+            <a:solidFill>
+              <a:schemeClr val="tx1"/>
+            </a:solidFill>
+            <a:prstDash val="sysDot"/>
+          </a:ln>
+        </p:spPr>
+        <p:style>
+          <a:lnRef idx="2">
+            <a:schemeClr val="accent1">
+              <a:shade val="50000"/>
+            </a:schemeClr>
+          </a:lnRef>
+          <a:fillRef idx="1">
+            <a:schemeClr val="accent1"/>
+          </a:fillRef>
+          <a:effectRef idx="0">
+            <a:schemeClr val="accent1"/>
+          </a:effectRef>
+          <a:fontRef idx="minor">
+            <a:schemeClr val="lt1"/>
+          </a:fontRef>
+        </p:style>
+        <p:txBody>
+          <a:bodyPr rtlCol="0" anchor="ctr"/>
+          <a:lstStyle/>
+          <a:p>
+            <a:pPr algn="ctr"/>
+            <a:endParaRPr lang="en-US" sz="4444"/>
+          </a:p>
+        </p:txBody>
+      </p:sp>
+      <p:sp>
+        <p:nvSpPr>
+          <p:cNvPr id="131" name="Rectangle 130">
+            <a:extLst>
+              <a:ext uri="{FF2B5EF4-FFF2-40B4-BE49-F238E27FC236}">
+                <a16:creationId xmlns:a16="http://schemas.microsoft.com/office/drawing/2014/main" id="{4C3B14C8-A199-A044-95D5-27CA0BB2B373}"/>
+              </a:ext>
+            </a:extLst>
+          </p:cNvPr>
+          <p:cNvSpPr/>
+          <p:nvPr/>
+        </p:nvSpPr>
+        <p:spPr>
+          <a:xfrm>
+            <a:off x="1286365" y="4873136"/>
+            <a:ext cx="1568585" cy="775982"/>
+          </a:xfrm>
+          <a:prstGeom prst="rect">
+            <a:avLst/>
+          </a:prstGeom>
+        </p:spPr>
+        <p:txBody>
+          <a:bodyPr wrap="square">
+            <a:spAutoFit/>
+          </a:bodyPr>
+          <a:lstStyle/>
+          <a:p>
+            <a:pPr algn="ctr"/>
+            <a:r>
+              <a:rPr lang="en-US" sz="1481" dirty="0"/>
+              <a:t>Test Suite</a:t>
+            </a:r>
+          </a:p>
+          <a:p>
+            <a:pPr algn="ctr"/>
+            <a:r>
+              <a:rPr lang="en-US" sz="1481" dirty="0"/>
+              <a:t>Evaluation</a:t>
+            </a:r>
+          </a:p>
+          <a:p>
+            <a:pPr algn="ctr"/>
+            <a:r>
+              <a:rPr lang="en-US" sz="1481" dirty="0"/>
+              <a:t>Process</a:t>
+            </a:r>
+          </a:p>
+        </p:txBody>
+      </p:sp>
       <p:sp>
         <p:nvSpPr>
           <p:cNvPr id="132" name="Rectangle 131">
@@ -4160,7 +4135,7 @@
         </p:nvSpPr>
         <p:spPr>
           <a:xfrm>
-            <a:off x="738536" y="6255800"/>
+            <a:off x="579510" y="7337090"/>
             <a:ext cx="1642690" cy="320216"/>
           </a:xfrm>
           <a:prstGeom prst="rect">
@@ -4195,7 +4170,7 @@
         </p:nvSpPr>
         <p:spPr>
           <a:xfrm>
-            <a:off x="2268607" y="6292680"/>
+            <a:off x="2109581" y="7373970"/>
             <a:ext cx="505616" cy="285162"/>
           </a:xfrm>
           <a:prstGeom prst="flowChartProcess">
@@ -4256,7 +4231,7 @@
         </p:nvSpPr>
         <p:spPr>
           <a:xfrm>
-            <a:off x="481389" y="6283963"/>
+            <a:off x="322363" y="7365253"/>
             <a:ext cx="505616" cy="285162"/>
           </a:xfrm>
           <a:prstGeom prst="flowChartProcess">
@@ -4321,7 +4296,7 @@
         </p:nvSpPr>
         <p:spPr>
           <a:xfrm>
-            <a:off x="4537958" y="6349740"/>
+            <a:off x="5969194" y="7431030"/>
             <a:ext cx="707861" cy="241180"/>
           </a:xfrm>
           <a:prstGeom prst="flowChartInputOutput">
@@ -4382,7 +4357,7 @@
         </p:nvSpPr>
         <p:spPr>
           <a:xfrm>
-            <a:off x="5145559" y="6308110"/>
+            <a:off x="6616552" y="7256879"/>
             <a:ext cx="780275" cy="548099"/>
           </a:xfrm>
           <a:prstGeom prst="rect">
@@ -4403,652 +4378,387 @@
           </a:p>
         </p:txBody>
       </p:sp>
-      <p:grpSp>
-        <p:nvGrpSpPr>
-          <p:cNvPr id="2" name="Group 1">
+      <p:sp>
+        <p:nvSpPr>
+          <p:cNvPr id="13" name="Process 12">
             <a:extLst>
               <a:ext uri="{FF2B5EF4-FFF2-40B4-BE49-F238E27FC236}">
-                <a16:creationId xmlns:a16="http://schemas.microsoft.com/office/drawing/2014/main" id="{423963F5-C6E3-764F-9A26-FB0ACE15A060}"/>
+                <a16:creationId xmlns:a16="http://schemas.microsoft.com/office/drawing/2014/main" id="{34700545-AD8D-B54B-90F4-54FEA85A5966}"/>
               </a:ext>
             </a:extLst>
           </p:cNvPr>
-          <p:cNvGrpSpPr/>
+          <p:cNvSpPr/>
           <p:nvPr/>
-        </p:nvGrpSpPr>
-        <p:grpSpPr>
+        </p:nvSpPr>
+        <p:spPr>
           <a:xfrm>
-            <a:off x="3371501" y="1833399"/>
-            <a:ext cx="3088021" cy="2852519"/>
-            <a:chOff x="4795023" y="2607501"/>
-            <a:chExt cx="4391852" cy="4056916"/>
-          </a:xfrm>
-        </p:grpSpPr>
-        <p:sp>
-          <p:nvSpPr>
-            <p:cNvPr id="13" name="Process 12">
-              <a:extLst>
-                <a:ext uri="{FF2B5EF4-FFF2-40B4-BE49-F238E27FC236}">
-                  <a16:creationId xmlns:a16="http://schemas.microsoft.com/office/drawing/2014/main" id="{34700545-AD8D-B54B-90F4-54FEA85A5966}"/>
-                </a:ext>
-              </a:extLst>
-            </p:cNvPr>
-            <p:cNvSpPr/>
-            <p:nvPr/>
-          </p:nvSpPr>
-          <p:spPr>
-            <a:xfrm>
-              <a:off x="7473678" y="2607501"/>
-              <a:ext cx="1097055" cy="641006"/>
-            </a:xfrm>
-            <a:prstGeom prst="flowChartProcess">
+            <a:off x="5509465" y="1286467"/>
+            <a:ext cx="1670755" cy="1496490"/>
+          </a:xfrm>
+          <a:prstGeom prst="flowChartProcess">
+            <a:avLst/>
+          </a:prstGeom>
+          <a:noFill/>
+          <a:ln w="38100">
+            <a:solidFill>
+              <a:schemeClr val="tx1"/>
+            </a:solidFill>
+          </a:ln>
+        </p:spPr>
+        <p:style>
+          <a:lnRef idx="2">
+            <a:schemeClr val="accent1">
+              <a:shade val="50000"/>
+            </a:schemeClr>
+          </a:lnRef>
+          <a:fillRef idx="1">
+            <a:schemeClr val="accent1"/>
+          </a:fillRef>
+          <a:effectRef idx="0">
+            <a:schemeClr val="accent1"/>
+          </a:effectRef>
+          <a:fontRef idx="minor">
+            <a:schemeClr val="lt1"/>
+          </a:fontRef>
+        </p:style>
+        <p:txBody>
+          <a:bodyPr rot="0" spcFirstLastPara="0" vertOverflow="overflow" horzOverflow="overflow" vert="horz" wrap="square" lIns="96771" tIns="48386" rIns="96771" bIns="48386" numCol="1" spcCol="0" rtlCol="0" fromWordArt="0" anchor="ctr" anchorCtr="0" forceAA="0" compatLnSpc="1">
+            <a:prstTxWarp prst="textNoShape">
               <a:avLst/>
-            </a:prstGeom>
-            <a:noFill/>
-            <a:ln w="38100">
+            </a:prstTxWarp>
+            <a:noAutofit/>
+          </a:bodyPr>
+          <a:lstStyle/>
+          <a:p>
+            <a:pPr algn="ctr"/>
+            <a:endParaRPr lang="en-US" sz="1058" dirty="0">
               <a:solidFill>
                 <a:schemeClr val="tx1"/>
               </a:solidFill>
-            </a:ln>
-          </p:spPr>
-          <p:style>
-            <a:lnRef idx="2">
-              <a:schemeClr val="accent1">
-                <a:shade val="50000"/>
-              </a:schemeClr>
-            </a:lnRef>
-            <a:fillRef idx="1">
-              <a:schemeClr val="accent1"/>
-            </a:fillRef>
-            <a:effectRef idx="0">
-              <a:schemeClr val="accent1"/>
-            </a:effectRef>
-            <a:fontRef idx="minor">
-              <a:schemeClr val="lt1"/>
-            </a:fontRef>
-          </p:style>
-          <p:txBody>
-            <a:bodyPr rot="0" spcFirstLastPara="0" vertOverflow="overflow" horzOverflow="overflow" vert="horz" wrap="square" lIns="96771" tIns="48386" rIns="96771" bIns="48386" numCol="1" spcCol="0" rtlCol="0" fromWordArt="0" anchor="ctr" anchorCtr="0" forceAA="0" compatLnSpc="1">
-              <a:prstTxWarp prst="textNoShape">
-                <a:avLst/>
-              </a:prstTxWarp>
-              <a:noAutofit/>
-            </a:bodyPr>
-            <a:lstStyle/>
-            <a:p>
-              <a:pPr algn="ctr"/>
-              <a:r>
-                <a:rPr lang="en-US" sz="1058" dirty="0">
-                  <a:solidFill>
-                    <a:schemeClr val="tx1"/>
-                  </a:solidFill>
-                </a:rPr>
-                <a:t>Execute</a:t>
-              </a:r>
-            </a:p>
-            <a:p>
-              <a:pPr algn="ctr"/>
-              <a:r>
-                <a:rPr lang="en-US" sz="1058" dirty="0">
-                  <a:solidFill>
-                    <a:schemeClr val="tx1"/>
-                  </a:solidFill>
-                </a:rPr>
-                <a:t>Mutants</a:t>
-              </a:r>
-            </a:p>
-          </p:txBody>
-        </p:sp>
-        <p:sp>
-          <p:nvSpPr>
-            <p:cNvPr id="14" name="Data 13">
-              <a:extLst>
-                <a:ext uri="{FF2B5EF4-FFF2-40B4-BE49-F238E27FC236}">
-                  <a16:creationId xmlns:a16="http://schemas.microsoft.com/office/drawing/2014/main" id="{D2E5F0BC-F97F-554D-90E1-5F21C0F523AF}"/>
-                </a:ext>
-              </a:extLst>
-            </p:cNvPr>
-            <p:cNvSpPr/>
-            <p:nvPr/>
-          </p:nvSpPr>
-          <p:spPr>
-            <a:xfrm>
-              <a:off x="7159955" y="3735131"/>
-              <a:ext cx="1434695" cy="554695"/>
-            </a:xfrm>
-            <a:prstGeom prst="flowChartInputOutput">
+            </a:endParaRPr>
+          </a:p>
+        </p:txBody>
+      </p:sp>
+      <p:sp>
+        <p:nvSpPr>
+          <p:cNvPr id="14" name="Data 13">
+            <a:extLst>
+              <a:ext uri="{FF2B5EF4-FFF2-40B4-BE49-F238E27FC236}">
+                <a16:creationId xmlns:a16="http://schemas.microsoft.com/office/drawing/2014/main" id="{D2E5F0BC-F97F-554D-90E1-5F21C0F523AF}"/>
+              </a:ext>
+            </a:extLst>
+          </p:cNvPr>
+          <p:cNvSpPr/>
+          <p:nvPr/>
+        </p:nvSpPr>
+        <p:spPr>
+          <a:xfrm>
+            <a:off x="5736700" y="2993728"/>
+            <a:ext cx="1008769" cy="390020"/>
+          </a:xfrm>
+          <a:prstGeom prst="flowChartInputOutput">
+            <a:avLst/>
+          </a:prstGeom>
+          <a:noFill/>
+          <a:ln w="38100">
+            <a:solidFill>
+              <a:schemeClr val="tx1"/>
+            </a:solidFill>
+          </a:ln>
+        </p:spPr>
+        <p:style>
+          <a:lnRef idx="2">
+            <a:schemeClr val="accent1">
+              <a:shade val="50000"/>
+            </a:schemeClr>
+          </a:lnRef>
+          <a:fillRef idx="1">
+            <a:schemeClr val="accent1"/>
+          </a:fillRef>
+          <a:effectRef idx="0">
+            <a:schemeClr val="accent1"/>
+          </a:effectRef>
+          <a:fontRef idx="minor">
+            <a:schemeClr val="lt1"/>
+          </a:fontRef>
+        </p:style>
+        <p:txBody>
+          <a:bodyPr rot="0" spcFirstLastPara="0" vertOverflow="overflow" horzOverflow="overflow" vert="horz" wrap="square" lIns="96771" tIns="48386" rIns="96771" bIns="48386" numCol="1" spcCol="0" rtlCol="0" fromWordArt="0" anchor="ctr" anchorCtr="0" forceAA="0" compatLnSpc="1">
+            <a:prstTxWarp prst="textNoShape">
               <a:avLst/>
-            </a:prstGeom>
-            <a:noFill/>
-            <a:ln w="38100">
-              <a:solidFill>
-                <a:schemeClr val="tx1"/>
-              </a:solidFill>
-            </a:ln>
-          </p:spPr>
-          <p:style>
-            <a:lnRef idx="2">
-              <a:schemeClr val="accent1">
-                <a:shade val="50000"/>
-              </a:schemeClr>
-            </a:lnRef>
-            <a:fillRef idx="1">
-              <a:schemeClr val="accent1"/>
-            </a:fillRef>
-            <a:effectRef idx="0">
-              <a:schemeClr val="accent1"/>
-            </a:effectRef>
-            <a:fontRef idx="minor">
-              <a:schemeClr val="lt1"/>
-            </a:fontRef>
-          </p:style>
-          <p:txBody>
-            <a:bodyPr rot="0" spcFirstLastPara="0" vertOverflow="overflow" horzOverflow="overflow" vert="horz" wrap="square" lIns="96771" tIns="48386" rIns="96771" bIns="48386" numCol="1" spcCol="0" rtlCol="0" fromWordArt="0" anchor="ctr" anchorCtr="0" forceAA="0" compatLnSpc="1">
-              <a:prstTxWarp prst="textNoShape">
-                <a:avLst/>
-              </a:prstTxWarp>
-              <a:noAutofit/>
-            </a:bodyPr>
-            <a:lstStyle/>
-            <a:p>
-              <a:pPr algn="ctr"/>
-              <a:r>
-                <a:rPr lang="en-US" sz="1058" dirty="0">
-                  <a:solidFill>
-                    <a:schemeClr val="tx1"/>
-                  </a:solidFill>
-                </a:rPr>
-                <a:t>Test</a:t>
-              </a:r>
-            </a:p>
-            <a:p>
-              <a:pPr algn="ctr"/>
-              <a:r>
-                <a:rPr lang="en-US" sz="1058" dirty="0">
-                  <a:solidFill>
-                    <a:schemeClr val="tx1"/>
-                  </a:solidFill>
-                </a:rPr>
-                <a:t>Results</a:t>
-              </a:r>
-            </a:p>
-          </p:txBody>
-        </p:sp>
-        <p:sp>
-          <p:nvSpPr>
-            <p:cNvPr id="15" name="Process 14">
-              <a:extLst>
-                <a:ext uri="{FF2B5EF4-FFF2-40B4-BE49-F238E27FC236}">
-                  <a16:creationId xmlns:a16="http://schemas.microsoft.com/office/drawing/2014/main" id="{02DA3BF0-0C93-C446-91E9-6C7129EC370E}"/>
-                </a:ext>
-              </a:extLst>
-            </p:cNvPr>
-            <p:cNvSpPr/>
-            <p:nvPr/>
-          </p:nvSpPr>
-          <p:spPr>
-            <a:xfrm>
-              <a:off x="7159956" y="4792714"/>
-              <a:ext cx="1165597" cy="707736"/>
-            </a:xfrm>
-            <a:prstGeom prst="flowChartProcess">
+            </a:prstTxWarp>
+            <a:noAutofit/>
+          </a:bodyPr>
+          <a:lstStyle/>
+          <a:p>
+            <a:pPr algn="ctr"/>
+            <a:r>
+              <a:rPr lang="en-US" sz="1058" dirty="0">
+                <a:solidFill>
+                  <a:schemeClr val="tx1"/>
+                </a:solidFill>
+              </a:rPr>
+              <a:t>Test</a:t>
+            </a:r>
+          </a:p>
+          <a:p>
+            <a:pPr algn="ctr"/>
+            <a:r>
+              <a:rPr lang="en-US" sz="1058" dirty="0">
+                <a:solidFill>
+                  <a:schemeClr val="tx1"/>
+                </a:solidFill>
+              </a:rPr>
+              <a:t>Results</a:t>
+            </a:r>
+          </a:p>
+        </p:txBody>
+      </p:sp>
+      <p:sp>
+        <p:nvSpPr>
+          <p:cNvPr id="15" name="Process 14">
+            <a:extLst>
+              <a:ext uri="{FF2B5EF4-FFF2-40B4-BE49-F238E27FC236}">
+                <a16:creationId xmlns:a16="http://schemas.microsoft.com/office/drawing/2014/main" id="{02DA3BF0-0C93-C446-91E9-6C7129EC370E}"/>
+              </a:ext>
+            </a:extLst>
+          </p:cNvPr>
+          <p:cNvSpPr/>
+          <p:nvPr/>
+        </p:nvSpPr>
+        <p:spPr>
+          <a:xfrm>
+            <a:off x="5736701" y="3538559"/>
+            <a:ext cx="819560" cy="497627"/>
+          </a:xfrm>
+          <a:prstGeom prst="flowChartProcess">
+            <a:avLst/>
+          </a:prstGeom>
+          <a:noFill/>
+          <a:ln w="38100">
+            <a:solidFill>
+              <a:schemeClr val="tx1"/>
+            </a:solidFill>
+          </a:ln>
+        </p:spPr>
+        <p:style>
+          <a:lnRef idx="2">
+            <a:schemeClr val="accent1">
+              <a:shade val="50000"/>
+            </a:schemeClr>
+          </a:lnRef>
+          <a:fillRef idx="1">
+            <a:schemeClr val="accent1"/>
+          </a:fillRef>
+          <a:effectRef idx="0">
+            <a:schemeClr val="accent1"/>
+          </a:effectRef>
+          <a:fontRef idx="minor">
+            <a:schemeClr val="lt1"/>
+          </a:fontRef>
+        </p:style>
+        <p:txBody>
+          <a:bodyPr rot="0" spcFirstLastPara="0" vertOverflow="overflow" horzOverflow="overflow" vert="horz" wrap="square" lIns="96771" tIns="48386" rIns="96771" bIns="48386" numCol="1" spcCol="0" rtlCol="0" fromWordArt="0" anchor="ctr" anchorCtr="0" forceAA="0" compatLnSpc="1">
+            <a:prstTxWarp prst="textNoShape">
               <a:avLst/>
-            </a:prstGeom>
-            <a:noFill/>
-            <a:ln w="38100">
-              <a:solidFill>
-                <a:schemeClr val="tx1"/>
-              </a:solidFill>
-            </a:ln>
-          </p:spPr>
-          <p:style>
-            <a:lnRef idx="2">
-              <a:schemeClr val="accent1">
-                <a:shade val="50000"/>
-              </a:schemeClr>
-            </a:lnRef>
-            <a:fillRef idx="1">
-              <a:schemeClr val="accent1"/>
-            </a:fillRef>
-            <a:effectRef idx="0">
-              <a:schemeClr val="accent1"/>
-            </a:effectRef>
-            <a:fontRef idx="minor">
-              <a:schemeClr val="lt1"/>
-            </a:fontRef>
-          </p:style>
-          <p:txBody>
-            <a:bodyPr rot="0" spcFirstLastPara="0" vertOverflow="overflow" horzOverflow="overflow" vert="horz" wrap="square" lIns="96771" tIns="48386" rIns="96771" bIns="48386" numCol="1" spcCol="0" rtlCol="0" fromWordArt="0" anchor="ctr" anchorCtr="0" forceAA="0" compatLnSpc="1">
-              <a:prstTxWarp prst="textNoShape">
-                <a:avLst/>
-              </a:prstTxWarp>
-              <a:noAutofit/>
-            </a:bodyPr>
-            <a:lstStyle/>
-            <a:p>
-              <a:pPr algn="ctr"/>
-              <a:r>
-                <a:rPr lang="en-US" sz="1058" dirty="0">
-                  <a:solidFill>
-                    <a:schemeClr val="tx1"/>
-                  </a:solidFill>
-                </a:rPr>
-                <a:t>Analyze</a:t>
-              </a:r>
-            </a:p>
-            <a:p>
-              <a:pPr algn="ctr"/>
-              <a:r>
-                <a:rPr lang="en-US" sz="1058" dirty="0">
-                  <a:solidFill>
-                    <a:schemeClr val="tx1"/>
-                  </a:solidFill>
-                </a:rPr>
-                <a:t>Results</a:t>
-              </a:r>
-            </a:p>
-          </p:txBody>
-        </p:sp>
-        <p:sp>
-          <p:nvSpPr>
-            <p:cNvPr id="16" name="Data 15">
-              <a:extLst>
-                <a:ext uri="{FF2B5EF4-FFF2-40B4-BE49-F238E27FC236}">
-                  <a16:creationId xmlns:a16="http://schemas.microsoft.com/office/drawing/2014/main" id="{24ABC81F-32AC-EC4F-88CD-9E507D826273}"/>
-                </a:ext>
-              </a:extLst>
-            </p:cNvPr>
-            <p:cNvSpPr/>
-            <p:nvPr/>
-          </p:nvSpPr>
-          <p:spPr>
-            <a:xfrm>
-              <a:off x="7612557" y="6056415"/>
-              <a:ext cx="1574318" cy="608002"/>
-            </a:xfrm>
-            <a:prstGeom prst="flowChartInputOutput">
+            </a:prstTxWarp>
+            <a:noAutofit/>
+          </a:bodyPr>
+          <a:lstStyle/>
+          <a:p>
+            <a:pPr algn="ctr"/>
+            <a:r>
+              <a:rPr lang="en-US" sz="1058" dirty="0">
+                <a:solidFill>
+                  <a:schemeClr val="tx1"/>
+                </a:solidFill>
+              </a:rPr>
+              <a:t>Analyze</a:t>
+            </a:r>
+          </a:p>
+          <a:p>
+            <a:pPr algn="ctr"/>
+            <a:r>
+              <a:rPr lang="en-US" sz="1058" dirty="0">
+                <a:solidFill>
+                  <a:schemeClr val="tx1"/>
+                </a:solidFill>
+              </a:rPr>
+              <a:t>Results</a:t>
+            </a:r>
+          </a:p>
+        </p:txBody>
+      </p:sp>
+      <p:sp>
+        <p:nvSpPr>
+          <p:cNvPr id="16" name="Data 15">
+            <a:extLst>
+              <a:ext uri="{FF2B5EF4-FFF2-40B4-BE49-F238E27FC236}">
+                <a16:creationId xmlns:a16="http://schemas.microsoft.com/office/drawing/2014/main" id="{24ABC81F-32AC-EC4F-88CD-9E507D826273}"/>
+              </a:ext>
+            </a:extLst>
+          </p:cNvPr>
+          <p:cNvSpPr/>
+          <p:nvPr/>
+        </p:nvSpPr>
+        <p:spPr>
+          <a:xfrm>
+            <a:off x="5909163" y="5102501"/>
+            <a:ext cx="1106942" cy="427501"/>
+          </a:xfrm>
+          <a:prstGeom prst="flowChartInputOutput">
+            <a:avLst/>
+          </a:prstGeom>
+          <a:noFill/>
+          <a:ln w="38100">
+            <a:solidFill>
+              <a:schemeClr val="tx1"/>
+            </a:solidFill>
+          </a:ln>
+        </p:spPr>
+        <p:style>
+          <a:lnRef idx="2">
+            <a:schemeClr val="accent1">
+              <a:shade val="50000"/>
+            </a:schemeClr>
+          </a:lnRef>
+          <a:fillRef idx="1">
+            <a:schemeClr val="accent1"/>
+          </a:fillRef>
+          <a:effectRef idx="0">
+            <a:schemeClr val="accent1"/>
+          </a:effectRef>
+          <a:fontRef idx="minor">
+            <a:schemeClr val="lt1"/>
+          </a:fontRef>
+        </p:style>
+        <p:txBody>
+          <a:bodyPr rot="0" spcFirstLastPara="0" vertOverflow="overflow" horzOverflow="overflow" vert="horz" wrap="square" lIns="96771" tIns="48386" rIns="96771" bIns="48386" numCol="1" spcCol="0" rtlCol="0" fromWordArt="0" anchor="ctr" anchorCtr="0" forceAA="0" compatLnSpc="1">
+            <a:prstTxWarp prst="textNoShape">
               <a:avLst/>
-            </a:prstGeom>
-            <a:noFill/>
-            <a:ln w="38100">
-              <a:solidFill>
-                <a:schemeClr val="tx1"/>
-              </a:solidFill>
-            </a:ln>
-          </p:spPr>
-          <p:style>
-            <a:lnRef idx="2">
-              <a:schemeClr val="accent1">
-                <a:shade val="50000"/>
-              </a:schemeClr>
-            </a:lnRef>
-            <a:fillRef idx="1">
-              <a:schemeClr val="accent1"/>
-            </a:fillRef>
-            <a:effectRef idx="0">
-              <a:schemeClr val="accent1"/>
-            </a:effectRef>
-            <a:fontRef idx="minor">
-              <a:schemeClr val="lt1"/>
-            </a:fontRef>
-          </p:style>
-          <p:txBody>
-            <a:bodyPr rot="0" spcFirstLastPara="0" vertOverflow="overflow" horzOverflow="overflow" vert="horz" wrap="square" lIns="96771" tIns="48386" rIns="96771" bIns="48386" numCol="1" spcCol="0" rtlCol="0" fromWordArt="0" anchor="ctr" anchorCtr="0" forceAA="0" compatLnSpc="1">
-              <a:prstTxWarp prst="textNoShape">
-                <a:avLst/>
-              </a:prstTxWarp>
-              <a:noAutofit/>
-            </a:bodyPr>
-            <a:lstStyle/>
-            <a:p>
-              <a:pPr algn="ctr"/>
-              <a:r>
-                <a:rPr lang="en-US" sz="1058" dirty="0">
-                  <a:solidFill>
-                    <a:schemeClr val="tx1"/>
-                  </a:solidFill>
-                </a:rPr>
-                <a:t>Live</a:t>
-              </a:r>
-            </a:p>
-            <a:p>
-              <a:pPr algn="ctr"/>
-              <a:r>
-                <a:rPr lang="en-US" sz="1058" dirty="0">
-                  <a:solidFill>
-                    <a:schemeClr val="tx1"/>
-                  </a:solidFill>
-                </a:rPr>
-                <a:t>Mutants</a:t>
-              </a:r>
-            </a:p>
-          </p:txBody>
-        </p:sp>
-        <p:sp>
-          <p:nvSpPr>
-            <p:cNvPr id="17" name="Data 16">
-              <a:extLst>
-                <a:ext uri="{FF2B5EF4-FFF2-40B4-BE49-F238E27FC236}">
-                  <a16:creationId xmlns:a16="http://schemas.microsoft.com/office/drawing/2014/main" id="{DCE94EE9-5579-2546-81DF-F1A4D4D73ADB}"/>
-                </a:ext>
-              </a:extLst>
-            </p:cNvPr>
-            <p:cNvSpPr/>
-            <p:nvPr/>
-          </p:nvSpPr>
-          <p:spPr>
-            <a:xfrm>
-              <a:off x="6033888" y="6035562"/>
-              <a:ext cx="1705783" cy="608002"/>
-            </a:xfrm>
-            <a:prstGeom prst="flowChartInputOutput">
+            </a:prstTxWarp>
+            <a:noAutofit/>
+          </a:bodyPr>
+          <a:lstStyle/>
+          <a:p>
+            <a:pPr algn="ctr"/>
+            <a:r>
+              <a:rPr lang="en-US" sz="1058" dirty="0">
+                <a:solidFill>
+                  <a:schemeClr val="tx1"/>
+                </a:solidFill>
+              </a:rPr>
+              <a:t>Live</a:t>
+            </a:r>
+          </a:p>
+          <a:p>
+            <a:pPr algn="ctr"/>
+            <a:r>
+              <a:rPr lang="en-US" sz="1058" dirty="0">
+                <a:solidFill>
+                  <a:schemeClr val="tx1"/>
+                </a:solidFill>
+              </a:rPr>
+              <a:t>Mutants</a:t>
+            </a:r>
+          </a:p>
+        </p:txBody>
+      </p:sp>
+      <p:sp>
+        <p:nvSpPr>
+          <p:cNvPr id="17" name="Data 16">
+            <a:extLst>
+              <a:ext uri="{FF2B5EF4-FFF2-40B4-BE49-F238E27FC236}">
+                <a16:creationId xmlns:a16="http://schemas.microsoft.com/office/drawing/2014/main" id="{DCE94EE9-5579-2546-81DF-F1A4D4D73ADB}"/>
+              </a:ext>
+            </a:extLst>
+          </p:cNvPr>
+          <p:cNvSpPr/>
+          <p:nvPr/>
+        </p:nvSpPr>
+        <p:spPr>
+          <a:xfrm>
+            <a:off x="4249138" y="4385932"/>
+            <a:ext cx="1199378" cy="427501"/>
+          </a:xfrm>
+          <a:prstGeom prst="flowChartInputOutput">
+            <a:avLst/>
+          </a:prstGeom>
+          <a:noFill/>
+          <a:ln w="38100">
+            <a:solidFill>
+              <a:schemeClr val="tx1"/>
+            </a:solidFill>
+          </a:ln>
+        </p:spPr>
+        <p:style>
+          <a:lnRef idx="2">
+            <a:schemeClr val="accent1">
+              <a:shade val="50000"/>
+            </a:schemeClr>
+          </a:lnRef>
+          <a:fillRef idx="1">
+            <a:schemeClr val="accent1"/>
+          </a:fillRef>
+          <a:effectRef idx="0">
+            <a:schemeClr val="accent1"/>
+          </a:effectRef>
+          <a:fontRef idx="minor">
+            <a:schemeClr val="lt1"/>
+          </a:fontRef>
+        </p:style>
+        <p:txBody>
+          <a:bodyPr rot="0" spcFirstLastPara="0" vertOverflow="overflow" horzOverflow="overflow" vert="horz" wrap="square" lIns="96771" tIns="48386" rIns="96771" bIns="48386" numCol="1" spcCol="0" rtlCol="0" fromWordArt="0" anchor="ctr" anchorCtr="0" forceAA="0" compatLnSpc="1">
+            <a:prstTxWarp prst="textNoShape">
               <a:avLst/>
-            </a:prstGeom>
-            <a:noFill/>
-            <a:ln w="38100">
-              <a:solidFill>
-                <a:schemeClr val="tx1"/>
-              </a:solidFill>
-            </a:ln>
-          </p:spPr>
-          <p:style>
-            <a:lnRef idx="2">
-              <a:schemeClr val="accent1">
-                <a:shade val="50000"/>
-              </a:schemeClr>
-            </a:lnRef>
-            <a:fillRef idx="1">
-              <a:schemeClr val="accent1"/>
-            </a:fillRef>
-            <a:effectRef idx="0">
-              <a:schemeClr val="accent1"/>
-            </a:effectRef>
-            <a:fontRef idx="minor">
-              <a:schemeClr val="lt1"/>
-            </a:fontRef>
-          </p:style>
-          <p:txBody>
-            <a:bodyPr rot="0" spcFirstLastPara="0" vertOverflow="overflow" horzOverflow="overflow" vert="horz" wrap="square" lIns="96771" tIns="48386" rIns="96771" bIns="48386" numCol="1" spcCol="0" rtlCol="0" fromWordArt="0" anchor="ctr" anchorCtr="0" forceAA="0" compatLnSpc="1">
-              <a:prstTxWarp prst="textNoShape">
-                <a:avLst/>
-              </a:prstTxWarp>
-              <a:noAutofit/>
-            </a:bodyPr>
-            <a:lstStyle/>
-            <a:p>
-              <a:pPr algn="ctr"/>
-              <a:r>
-                <a:rPr lang="en-US" sz="1058" dirty="0">
-                  <a:solidFill>
-                    <a:schemeClr val="tx1"/>
-                  </a:solidFill>
-                </a:rPr>
-                <a:t>Mutation</a:t>
-              </a:r>
-            </a:p>
-            <a:p>
-              <a:pPr algn="ctr"/>
-              <a:r>
-                <a:rPr lang="en-US" sz="1058" dirty="0">
-                  <a:solidFill>
-                    <a:schemeClr val="tx1"/>
-                  </a:solidFill>
-                </a:rPr>
-                <a:t>Score</a:t>
-              </a:r>
-            </a:p>
-          </p:txBody>
-        </p:sp>
-        <p:cxnSp>
-          <p:nvCxnSpPr>
-            <p:cNvPr id="21" name="Straight Arrow Connector 20">
-              <a:extLst>
-                <a:ext uri="{FF2B5EF4-FFF2-40B4-BE49-F238E27FC236}">
-                  <a16:creationId xmlns:a16="http://schemas.microsoft.com/office/drawing/2014/main" id="{7E16D265-D96C-9744-982D-2E3B07770F13}"/>
-                </a:ext>
-              </a:extLst>
-            </p:cNvPr>
-            <p:cNvCxnSpPr>
-              <a:cxnSpLocks/>
-              <a:stCxn id="7" idx="3"/>
-              <a:endCxn id="13" idx="1"/>
-            </p:cNvCxnSpPr>
-            <p:nvPr/>
-          </p:nvCxnSpPr>
-          <p:spPr>
-            <a:xfrm>
-              <a:off x="4795023" y="2928004"/>
-              <a:ext cx="2678656" cy="0"/>
-            </a:xfrm>
-            <a:prstGeom prst="straightConnector1">
-              <a:avLst/>
-            </a:prstGeom>
-            <a:ln w="38100">
-              <a:solidFill>
-                <a:schemeClr val="tx1"/>
-              </a:solidFill>
-              <a:tailEnd type="triangle"/>
-            </a:ln>
-          </p:spPr>
-          <p:style>
-            <a:lnRef idx="1">
-              <a:schemeClr val="accent1"/>
-            </a:lnRef>
-            <a:fillRef idx="0">
-              <a:schemeClr val="accent1"/>
-            </a:fillRef>
-            <a:effectRef idx="0">
-              <a:schemeClr val="accent1"/>
-            </a:effectRef>
-            <a:fontRef idx="minor">
-              <a:schemeClr val="tx1"/>
-            </a:fontRef>
-          </p:style>
-        </p:cxnSp>
-        <p:cxnSp>
-          <p:nvCxnSpPr>
-            <p:cNvPr id="49" name="Straight Arrow Connector 48">
-              <a:extLst>
-                <a:ext uri="{FF2B5EF4-FFF2-40B4-BE49-F238E27FC236}">
-                  <a16:creationId xmlns:a16="http://schemas.microsoft.com/office/drawing/2014/main" id="{7BFDA515-8E2C-3849-AE51-8CE6312A33BB}"/>
-                </a:ext>
-              </a:extLst>
-            </p:cNvPr>
-            <p:cNvCxnSpPr>
-              <a:cxnSpLocks/>
-              <a:stCxn id="13" idx="2"/>
-              <a:endCxn id="14" idx="0"/>
-            </p:cNvCxnSpPr>
-            <p:nvPr/>
-          </p:nvCxnSpPr>
-          <p:spPr>
-            <a:xfrm flipH="1">
-              <a:off x="8020772" y="3248507"/>
-              <a:ext cx="1434" cy="486624"/>
-            </a:xfrm>
-            <a:prstGeom prst="straightConnector1">
-              <a:avLst/>
-            </a:prstGeom>
-            <a:ln w="38100">
-              <a:solidFill>
-                <a:schemeClr val="tx1"/>
-              </a:solidFill>
-              <a:tailEnd type="triangle"/>
-            </a:ln>
-          </p:spPr>
-          <p:style>
-            <a:lnRef idx="1">
-              <a:schemeClr val="accent1"/>
-            </a:lnRef>
-            <a:fillRef idx="0">
-              <a:schemeClr val="accent1"/>
-            </a:fillRef>
-            <a:effectRef idx="0">
-              <a:schemeClr val="accent1"/>
-            </a:effectRef>
-            <a:fontRef idx="minor">
-              <a:schemeClr val="tx1"/>
-            </a:fontRef>
-          </p:style>
-        </p:cxnSp>
-        <p:cxnSp>
-          <p:nvCxnSpPr>
-            <p:cNvPr id="55" name="Straight Arrow Connector 54">
-              <a:extLst>
-                <a:ext uri="{FF2B5EF4-FFF2-40B4-BE49-F238E27FC236}">
-                  <a16:creationId xmlns:a16="http://schemas.microsoft.com/office/drawing/2014/main" id="{2E394B40-BBF4-C54F-9DB5-EC6FC7DB775C}"/>
-                </a:ext>
-              </a:extLst>
-            </p:cNvPr>
-            <p:cNvCxnSpPr>
-              <a:cxnSpLocks/>
-              <a:stCxn id="15" idx="2"/>
-              <a:endCxn id="17" idx="0"/>
-            </p:cNvCxnSpPr>
-            <p:nvPr/>
-          </p:nvCxnSpPr>
-          <p:spPr>
-            <a:xfrm flipH="1">
-              <a:off x="7057357" y="5500449"/>
-              <a:ext cx="685398" cy="535112"/>
-            </a:xfrm>
-            <a:prstGeom prst="straightConnector1">
-              <a:avLst/>
-            </a:prstGeom>
-            <a:ln w="38100">
-              <a:solidFill>
-                <a:schemeClr val="tx1"/>
-              </a:solidFill>
-              <a:tailEnd type="triangle"/>
-            </a:ln>
-          </p:spPr>
-          <p:style>
-            <a:lnRef idx="1">
-              <a:schemeClr val="accent1"/>
-            </a:lnRef>
-            <a:fillRef idx="0">
-              <a:schemeClr val="accent1"/>
-            </a:fillRef>
-            <a:effectRef idx="0">
-              <a:schemeClr val="accent1"/>
-            </a:effectRef>
-            <a:fontRef idx="minor">
-              <a:schemeClr val="tx1"/>
-            </a:fontRef>
-          </p:style>
-        </p:cxnSp>
-        <p:cxnSp>
-          <p:nvCxnSpPr>
-            <p:cNvPr id="58" name="Straight Arrow Connector 57">
-              <a:extLst>
-                <a:ext uri="{FF2B5EF4-FFF2-40B4-BE49-F238E27FC236}">
-                  <a16:creationId xmlns:a16="http://schemas.microsoft.com/office/drawing/2014/main" id="{DE49EFEB-5F74-674A-A45C-0C3AE8A24823}"/>
-                </a:ext>
-              </a:extLst>
-            </p:cNvPr>
-            <p:cNvCxnSpPr>
-              <a:cxnSpLocks/>
-              <a:stCxn id="15" idx="2"/>
-              <a:endCxn id="16" idx="0"/>
-            </p:cNvCxnSpPr>
-            <p:nvPr/>
-          </p:nvCxnSpPr>
-          <p:spPr>
-            <a:xfrm>
-              <a:off x="7742756" y="5500450"/>
-              <a:ext cx="814393" cy="555966"/>
-            </a:xfrm>
-            <a:prstGeom prst="straightConnector1">
-              <a:avLst/>
-            </a:prstGeom>
-            <a:ln w="38100">
-              <a:solidFill>
-                <a:schemeClr val="tx1"/>
-              </a:solidFill>
-              <a:tailEnd type="triangle"/>
-            </a:ln>
-          </p:spPr>
-          <p:style>
-            <a:lnRef idx="1">
-              <a:schemeClr val="accent1"/>
-            </a:lnRef>
-            <a:fillRef idx="0">
-              <a:schemeClr val="accent1"/>
-            </a:fillRef>
-            <a:effectRef idx="0">
-              <a:schemeClr val="accent1"/>
-            </a:effectRef>
-            <a:fontRef idx="minor">
-              <a:schemeClr val="tx1"/>
-            </a:fontRef>
-          </p:style>
-        </p:cxnSp>
-        <p:cxnSp>
-          <p:nvCxnSpPr>
-            <p:cNvPr id="62" name="Straight Arrow Connector 61">
-              <a:extLst>
-                <a:ext uri="{FF2B5EF4-FFF2-40B4-BE49-F238E27FC236}">
-                  <a16:creationId xmlns:a16="http://schemas.microsoft.com/office/drawing/2014/main" id="{7099BCCC-1014-024F-8599-7458797448A3}"/>
-                </a:ext>
-              </a:extLst>
-            </p:cNvPr>
-            <p:cNvCxnSpPr>
-              <a:cxnSpLocks/>
-              <a:stCxn id="14" idx="3"/>
-              <a:endCxn id="15" idx="0"/>
-            </p:cNvCxnSpPr>
-            <p:nvPr/>
-          </p:nvCxnSpPr>
-          <p:spPr>
-            <a:xfrm>
-              <a:off x="7733834" y="4289826"/>
-              <a:ext cx="8921" cy="502888"/>
-            </a:xfrm>
-            <a:prstGeom prst="straightConnector1">
-              <a:avLst/>
-            </a:prstGeom>
-            <a:ln w="38100">
-              <a:solidFill>
-                <a:schemeClr val="tx1"/>
-              </a:solidFill>
-              <a:tailEnd type="triangle"/>
-            </a:ln>
-          </p:spPr>
-          <p:style>
-            <a:lnRef idx="1">
-              <a:schemeClr val="accent1"/>
-            </a:lnRef>
-            <a:fillRef idx="0">
-              <a:schemeClr val="accent1"/>
-            </a:fillRef>
-            <a:effectRef idx="0">
-              <a:schemeClr val="accent1"/>
-            </a:effectRef>
-            <a:fontRef idx="minor">
-              <a:schemeClr val="tx1"/>
-            </a:fontRef>
-          </p:style>
-        </p:cxnSp>
-      </p:grpSp>
+            </a:prstTxWarp>
+            <a:noAutofit/>
+          </a:bodyPr>
+          <a:lstStyle/>
+          <a:p>
+            <a:pPr algn="ctr"/>
+            <a:r>
+              <a:rPr lang="en-US" sz="1058" dirty="0">
+                <a:solidFill>
+                  <a:schemeClr val="tx1"/>
+                </a:solidFill>
+              </a:rPr>
+              <a:t>Mutation</a:t>
+            </a:r>
+          </a:p>
+          <a:p>
+            <a:pPr algn="ctr"/>
+            <a:r>
+              <a:rPr lang="en-US" sz="1058" dirty="0">
+                <a:solidFill>
+                  <a:schemeClr val="tx1"/>
+                </a:solidFill>
+              </a:rPr>
+              <a:t>Score</a:t>
+            </a:r>
+          </a:p>
+        </p:txBody>
+      </p:sp>
       <p:cxnSp>
         <p:nvCxnSpPr>
-          <p:cNvPr id="96" name="Straight Arrow Connector 95">
+          <p:cNvPr id="21" name="Straight Arrow Connector 20">
             <a:extLst>
               <a:ext uri="{FF2B5EF4-FFF2-40B4-BE49-F238E27FC236}">
-                <a16:creationId xmlns:a16="http://schemas.microsoft.com/office/drawing/2014/main" id="{F942EAA0-AE64-6848-AF09-385D9DF9B5A7}"/>
+                <a16:creationId xmlns:a16="http://schemas.microsoft.com/office/drawing/2014/main" id="{7E16D265-D96C-9744-982D-2E3B07770F13}"/>
               </a:ext>
             </a:extLst>
           </p:cNvPr>
           <p:cNvCxnSpPr>
             <a:cxnSpLocks/>
-            <a:stCxn id="61" idx="2"/>
-            <a:endCxn id="13" idx="0"/>
+            <a:stCxn id="146" idx="5"/>
+            <a:endCxn id="129" idx="1"/>
           </p:cNvCxnSpPr>
           <p:nvPr/>
         </p:nvCxnSpPr>
         <p:spPr>
-          <a:xfrm flipH="1">
-            <a:off x="5640614" y="1519107"/>
-            <a:ext cx="448" cy="314291"/>
+          <a:xfrm>
+            <a:off x="5058356" y="1513168"/>
+            <a:ext cx="467802" cy="6038"/>
           </a:xfrm>
           <a:prstGeom prst="straightConnector1">
             <a:avLst/>
@@ -5075,985 +4785,1075 @@
           </a:fontRef>
         </p:style>
       </p:cxnSp>
-      <p:grpSp>
-        <p:nvGrpSpPr>
-          <p:cNvPr id="9" name="Group 8">
+      <p:cxnSp>
+        <p:nvCxnSpPr>
+          <p:cNvPr id="49" name="Straight Arrow Connector 48">
             <a:extLst>
               <a:ext uri="{FF2B5EF4-FFF2-40B4-BE49-F238E27FC236}">
-                <a16:creationId xmlns:a16="http://schemas.microsoft.com/office/drawing/2014/main" id="{9FEB2045-517C-9548-A990-2CA6DEFA2A0E}"/>
+                <a16:creationId xmlns:a16="http://schemas.microsoft.com/office/drawing/2014/main" id="{7BFDA515-8E2C-3849-AE51-8CE6312A33BB}"/>
               </a:ext>
             </a:extLst>
           </p:cNvPr>
-          <p:cNvGrpSpPr/>
+          <p:cNvCxnSpPr>
+            <a:cxnSpLocks/>
+            <a:stCxn id="13" idx="2"/>
+            <a:endCxn id="14" idx="0"/>
+          </p:cNvCxnSpPr>
           <p:nvPr/>
-        </p:nvGrpSpPr>
-        <p:grpSpPr>
-          <a:xfrm>
-            <a:off x="6594550" y="198658"/>
-            <a:ext cx="1680253" cy="6277153"/>
-            <a:chOff x="9378915" y="282536"/>
-            <a:chExt cx="2389693" cy="8927507"/>
-          </a:xfrm>
-        </p:grpSpPr>
-        <p:sp>
-          <p:nvSpPr>
-            <p:cNvPr id="10" name="Data 9">
-              <a:extLst>
-                <a:ext uri="{FF2B5EF4-FFF2-40B4-BE49-F238E27FC236}">
-                  <a16:creationId xmlns:a16="http://schemas.microsoft.com/office/drawing/2014/main" id="{94C0E8C8-09DF-944D-B2DC-8345A8CCC750}"/>
-                </a:ext>
-              </a:extLst>
-            </p:cNvPr>
-            <p:cNvSpPr/>
-            <p:nvPr/>
-          </p:nvSpPr>
-          <p:spPr>
-            <a:xfrm>
-              <a:off x="9378915" y="282536"/>
-              <a:ext cx="1805880" cy="532930"/>
-            </a:xfrm>
-            <a:prstGeom prst="flowChartInputOutput">
-              <a:avLst/>
-            </a:prstGeom>
-            <a:noFill/>
-            <a:ln w="38100">
-              <a:solidFill>
-                <a:schemeClr val="tx1"/>
-              </a:solidFill>
-            </a:ln>
-          </p:spPr>
-          <p:style>
-            <a:lnRef idx="2">
-              <a:schemeClr val="accent1">
-                <a:shade val="50000"/>
-              </a:schemeClr>
-            </a:lnRef>
-            <a:fillRef idx="1">
-              <a:schemeClr val="accent1"/>
-            </a:fillRef>
-            <a:effectRef idx="0">
-              <a:schemeClr val="accent1"/>
-            </a:effectRef>
-            <a:fontRef idx="minor">
-              <a:schemeClr val="lt1"/>
-            </a:fontRef>
-          </p:style>
-          <p:txBody>
-            <a:bodyPr rot="0" spcFirstLastPara="0" vertOverflow="overflow" horzOverflow="overflow" vert="horz" wrap="square" lIns="96771" tIns="48386" rIns="96771" bIns="48386" numCol="1" spcCol="0" rtlCol="0" fromWordArt="0" anchor="ctr" anchorCtr="0" forceAA="0" compatLnSpc="1">
-              <a:prstTxWarp prst="textNoShape">
-                <a:avLst/>
-              </a:prstTxWarp>
-              <a:noAutofit/>
-            </a:bodyPr>
-            <a:lstStyle/>
-            <a:p>
-              <a:pPr algn="ctr"/>
-              <a:r>
-                <a:rPr lang="en-US" sz="1058" dirty="0">
-                  <a:solidFill>
-                    <a:schemeClr val="tx1"/>
-                  </a:solidFill>
-                </a:rPr>
-                <a:t>SUT</a:t>
-              </a:r>
-            </a:p>
-            <a:p>
-              <a:pPr algn="ctr"/>
-              <a:r>
-                <a:rPr lang="en-US" sz="1058" dirty="0">
-                  <a:solidFill>
-                    <a:schemeClr val="tx1"/>
-                  </a:solidFill>
-                </a:rPr>
-                <a:t>Test Suite</a:t>
-              </a:r>
-            </a:p>
-          </p:txBody>
-        </p:sp>
-        <p:sp>
-          <p:nvSpPr>
-            <p:cNvPr id="18" name="Process 17">
-              <a:extLst>
-                <a:ext uri="{FF2B5EF4-FFF2-40B4-BE49-F238E27FC236}">
-                  <a16:creationId xmlns:a16="http://schemas.microsoft.com/office/drawing/2014/main" id="{9424C678-9BBB-D040-9EF7-E7895FEFFC16}"/>
-                </a:ext>
-              </a:extLst>
-            </p:cNvPr>
-            <p:cNvSpPr/>
-            <p:nvPr/>
-          </p:nvSpPr>
-          <p:spPr>
-            <a:xfrm>
-              <a:off x="9745551" y="6024743"/>
-              <a:ext cx="1165597" cy="707736"/>
-            </a:xfrm>
-            <a:prstGeom prst="flowChartProcess">
-              <a:avLst/>
-            </a:prstGeom>
-            <a:noFill/>
-            <a:ln w="38100">
-              <a:solidFill>
-                <a:schemeClr val="tx1"/>
-              </a:solidFill>
-            </a:ln>
-          </p:spPr>
-          <p:style>
-            <a:lnRef idx="2">
-              <a:schemeClr val="accent1">
-                <a:shade val="50000"/>
-              </a:schemeClr>
-            </a:lnRef>
-            <a:fillRef idx="1">
-              <a:schemeClr val="accent1"/>
-            </a:fillRef>
-            <a:effectRef idx="0">
-              <a:schemeClr val="accent1"/>
-            </a:effectRef>
-            <a:fontRef idx="minor">
-              <a:schemeClr val="lt1"/>
-            </a:fontRef>
-          </p:style>
-          <p:txBody>
-            <a:bodyPr rot="0" spcFirstLastPara="0" vertOverflow="overflow" horzOverflow="overflow" vert="horz" wrap="square" lIns="96771" tIns="48386" rIns="96771" bIns="48386" numCol="1" spcCol="0" rtlCol="0" fromWordArt="0" anchor="ctr" anchorCtr="0" forceAA="0" compatLnSpc="1">
-              <a:prstTxWarp prst="textNoShape">
-                <a:avLst/>
-              </a:prstTxWarp>
-              <a:noAutofit/>
-            </a:bodyPr>
-            <a:lstStyle/>
-            <a:p>
-              <a:pPr algn="ctr"/>
-              <a:r>
-                <a:rPr lang="en-US" sz="1058" dirty="0">
-                  <a:solidFill>
-                    <a:schemeClr val="tx1"/>
-                  </a:solidFill>
-                </a:rPr>
-                <a:t>Generate</a:t>
-              </a:r>
-            </a:p>
-            <a:p>
-              <a:pPr algn="ctr"/>
-              <a:r>
-                <a:rPr lang="en-US" sz="1058" dirty="0">
-                  <a:solidFill>
-                    <a:schemeClr val="tx1"/>
-                  </a:solidFill>
-                </a:rPr>
-                <a:t>Test Inputs</a:t>
-              </a:r>
-            </a:p>
-          </p:txBody>
-        </p:sp>
-        <p:sp>
-          <p:nvSpPr>
-            <p:cNvPr id="19" name="Process 18">
-              <a:extLst>
-                <a:ext uri="{FF2B5EF4-FFF2-40B4-BE49-F238E27FC236}">
-                  <a16:creationId xmlns:a16="http://schemas.microsoft.com/office/drawing/2014/main" id="{574EA16F-B526-1845-A3C1-66D2C01ACD13}"/>
-                </a:ext>
-              </a:extLst>
-            </p:cNvPr>
-            <p:cNvSpPr/>
-            <p:nvPr/>
-          </p:nvSpPr>
-          <p:spPr>
-            <a:xfrm>
-              <a:off x="9738204" y="2671055"/>
-              <a:ext cx="1165597" cy="707736"/>
-            </a:xfrm>
-            <a:prstGeom prst="flowChartProcess">
-              <a:avLst/>
-            </a:prstGeom>
-            <a:noFill/>
-            <a:ln w="38100">
-              <a:solidFill>
-                <a:schemeClr val="tx1"/>
-              </a:solidFill>
-            </a:ln>
-          </p:spPr>
-          <p:style>
-            <a:lnRef idx="2">
-              <a:schemeClr val="accent1">
-                <a:shade val="50000"/>
-              </a:schemeClr>
-            </a:lnRef>
-            <a:fillRef idx="1">
-              <a:schemeClr val="accent1"/>
-            </a:fillRef>
-            <a:effectRef idx="0">
-              <a:schemeClr val="accent1"/>
-            </a:effectRef>
-            <a:fontRef idx="minor">
-              <a:schemeClr val="lt1"/>
-            </a:fontRef>
-          </p:style>
-          <p:txBody>
-            <a:bodyPr rot="0" spcFirstLastPara="0" vertOverflow="overflow" horzOverflow="overflow" vert="horz" wrap="square" lIns="96771" tIns="48386" rIns="96771" bIns="48386" numCol="1" spcCol="0" rtlCol="0" fromWordArt="0" anchor="ctr" anchorCtr="0" forceAA="0" compatLnSpc="1">
-              <a:prstTxWarp prst="textNoShape">
-                <a:avLst/>
-              </a:prstTxWarp>
-              <a:noAutofit/>
-            </a:bodyPr>
-            <a:lstStyle/>
-            <a:p>
-              <a:pPr algn="ctr"/>
-              <a:r>
-                <a:rPr lang="en-US" sz="1058" dirty="0">
-                  <a:solidFill>
-                    <a:schemeClr val="tx1"/>
-                  </a:solidFill>
-                </a:rPr>
-                <a:t>Generate</a:t>
-              </a:r>
-            </a:p>
-            <a:p>
-              <a:pPr algn="ctr"/>
-              <a:r>
-                <a:rPr lang="en-US" sz="1058" dirty="0">
-                  <a:solidFill>
-                    <a:schemeClr val="tx1"/>
-                  </a:solidFill>
-                </a:rPr>
-                <a:t>Test Oracles</a:t>
-              </a:r>
-            </a:p>
-          </p:txBody>
-        </p:sp>
-        <p:cxnSp>
-          <p:nvCxnSpPr>
-            <p:cNvPr id="103" name="Straight Arrow Connector 102">
-              <a:extLst>
-                <a:ext uri="{FF2B5EF4-FFF2-40B4-BE49-F238E27FC236}">
-                  <a16:creationId xmlns:a16="http://schemas.microsoft.com/office/drawing/2014/main" id="{99583958-51CB-1340-9FD6-D3CEDB0FD2D7}"/>
-                </a:ext>
-              </a:extLst>
-            </p:cNvPr>
-            <p:cNvCxnSpPr>
-              <a:cxnSpLocks/>
-              <a:stCxn id="18" idx="0"/>
-              <a:endCxn id="19" idx="2"/>
-            </p:cNvCxnSpPr>
-            <p:nvPr/>
-          </p:nvCxnSpPr>
-          <p:spPr>
-            <a:xfrm flipH="1" flipV="1">
-              <a:off x="10321003" y="3378791"/>
-              <a:ext cx="7347" cy="2645952"/>
-            </a:xfrm>
-            <a:prstGeom prst="straightConnector1">
-              <a:avLst/>
-            </a:prstGeom>
-            <a:ln w="38100">
-              <a:solidFill>
-                <a:schemeClr val="tx1"/>
-              </a:solidFill>
-              <a:tailEnd type="triangle"/>
-            </a:ln>
-          </p:spPr>
-          <p:style>
-            <a:lnRef idx="1">
-              <a:schemeClr val="accent1"/>
-            </a:lnRef>
-            <a:fillRef idx="0">
-              <a:schemeClr val="accent1"/>
-            </a:fillRef>
-            <a:effectRef idx="0">
-              <a:schemeClr val="accent1"/>
-            </a:effectRef>
-            <a:fontRef idx="minor">
+        </p:nvCxnSpPr>
+        <p:spPr>
+          <a:xfrm flipH="1">
+            <a:off x="6341961" y="2782957"/>
+            <a:ext cx="2882" cy="210771"/>
+          </a:xfrm>
+          <a:prstGeom prst="straightConnector1">
+            <a:avLst/>
+          </a:prstGeom>
+          <a:ln w="38100">
+            <a:solidFill>
               <a:schemeClr val="tx1"/>
-            </a:fontRef>
-          </p:style>
-        </p:cxnSp>
-        <p:sp>
-          <p:nvSpPr>
-            <p:cNvPr id="125" name="Rectangle 124">
-              <a:extLst>
-                <a:ext uri="{FF2B5EF4-FFF2-40B4-BE49-F238E27FC236}">
-                  <a16:creationId xmlns:a16="http://schemas.microsoft.com/office/drawing/2014/main" id="{F77AD195-C0A5-3448-AB0F-ECA142922207}"/>
-                </a:ext>
-              </a:extLst>
-            </p:cNvPr>
-            <p:cNvSpPr/>
-            <p:nvPr/>
-          </p:nvSpPr>
-          <p:spPr>
-            <a:xfrm>
-              <a:off x="9537731" y="2385499"/>
-              <a:ext cx="1635717" cy="5617975"/>
-            </a:xfrm>
-            <a:prstGeom prst="rect">
-              <a:avLst/>
-            </a:prstGeom>
-            <a:noFill/>
-            <a:ln w="38100">
-              <a:solidFill>
-                <a:schemeClr val="tx1"/>
-              </a:solidFill>
-              <a:prstDash val="sysDot"/>
-            </a:ln>
-          </p:spPr>
-          <p:style>
-            <a:lnRef idx="2">
-              <a:schemeClr val="accent1">
-                <a:shade val="50000"/>
-              </a:schemeClr>
-            </a:lnRef>
-            <a:fillRef idx="1">
-              <a:schemeClr val="accent1"/>
-            </a:fillRef>
-            <a:effectRef idx="0">
-              <a:schemeClr val="accent1"/>
-            </a:effectRef>
-            <a:fontRef idx="minor">
-              <a:schemeClr val="lt1"/>
-            </a:fontRef>
-          </p:style>
-          <p:txBody>
-            <a:bodyPr rtlCol="0" anchor="ctr"/>
-            <a:lstStyle/>
-            <a:p>
-              <a:pPr algn="ctr"/>
-              <a:endParaRPr lang="en-US" sz="4444"/>
-            </a:p>
-          </p:txBody>
-        </p:sp>
-        <p:sp>
-          <p:nvSpPr>
-            <p:cNvPr id="130" name="Rectangle 129">
-              <a:extLst>
-                <a:ext uri="{FF2B5EF4-FFF2-40B4-BE49-F238E27FC236}">
-                  <a16:creationId xmlns:a16="http://schemas.microsoft.com/office/drawing/2014/main" id="{5ED79A08-3926-0D4D-ABFB-A26E13524806}"/>
-                </a:ext>
-              </a:extLst>
-            </p:cNvPr>
-            <p:cNvSpPr/>
-            <p:nvPr/>
-          </p:nvSpPr>
-          <p:spPr>
-            <a:xfrm>
-              <a:off x="9537732" y="8106424"/>
-              <a:ext cx="2230876" cy="1103619"/>
-            </a:xfrm>
-            <a:prstGeom prst="rect">
-              <a:avLst/>
-            </a:prstGeom>
-          </p:spPr>
-          <p:txBody>
-            <a:bodyPr wrap="square">
-              <a:spAutoFit/>
-            </a:bodyPr>
-            <a:lstStyle/>
-            <a:p>
-              <a:pPr algn="ctr"/>
-              <a:r>
-                <a:rPr lang="en-US" sz="1481" dirty="0"/>
-                <a:t>Test Suite</a:t>
-              </a:r>
-            </a:p>
-            <a:p>
-              <a:pPr algn="ctr"/>
-              <a:r>
-                <a:rPr lang="en-US" sz="1481" dirty="0"/>
-                <a:t>Augmentation</a:t>
-              </a:r>
-            </a:p>
-            <a:p>
-              <a:pPr algn="ctr"/>
-              <a:r>
-                <a:rPr lang="en-US" sz="1481" dirty="0"/>
-                <a:t>Process</a:t>
-              </a:r>
-            </a:p>
-          </p:txBody>
-        </p:sp>
-        <p:cxnSp>
-          <p:nvCxnSpPr>
-            <p:cNvPr id="102" name="Straight Arrow Connector 101">
-              <a:extLst>
-                <a:ext uri="{FF2B5EF4-FFF2-40B4-BE49-F238E27FC236}">
-                  <a16:creationId xmlns:a16="http://schemas.microsoft.com/office/drawing/2014/main" id="{FD537822-189E-1442-A9E5-9448DD8BD8E5}"/>
-                </a:ext>
-              </a:extLst>
-            </p:cNvPr>
-            <p:cNvCxnSpPr>
-              <a:cxnSpLocks/>
-              <a:stCxn id="19" idx="0"/>
-              <a:endCxn id="10" idx="4"/>
-            </p:cNvCxnSpPr>
-            <p:nvPr/>
-          </p:nvCxnSpPr>
-          <p:spPr>
-            <a:xfrm flipH="1" flipV="1">
-              <a:off x="10281856" y="815466"/>
-              <a:ext cx="39147" cy="1855589"/>
-            </a:xfrm>
-            <a:prstGeom prst="straightConnector1">
-              <a:avLst/>
-            </a:prstGeom>
-            <a:ln w="38100">
-              <a:solidFill>
-                <a:schemeClr val="tx1"/>
-              </a:solidFill>
-              <a:tailEnd type="triangle"/>
-            </a:ln>
-          </p:spPr>
-          <p:style>
-            <a:lnRef idx="1">
-              <a:schemeClr val="accent1"/>
-            </a:lnRef>
-            <a:fillRef idx="0">
-              <a:schemeClr val="accent1"/>
-            </a:fillRef>
-            <a:effectRef idx="0">
-              <a:schemeClr val="accent1"/>
-            </a:effectRef>
-            <a:fontRef idx="minor">
-              <a:schemeClr val="tx1"/>
-            </a:fontRef>
-          </p:style>
-        </p:cxnSp>
-      </p:grpSp>
-      <p:grpSp>
-        <p:nvGrpSpPr>
-          <p:cNvPr id="12" name="Group 11">
+            </a:solidFill>
+            <a:tailEnd type="triangle"/>
+          </a:ln>
+        </p:spPr>
+        <p:style>
+          <a:lnRef idx="1">
+            <a:schemeClr val="accent1"/>
+          </a:lnRef>
+          <a:fillRef idx="0">
+            <a:schemeClr val="accent1"/>
+          </a:fillRef>
+          <a:effectRef idx="0">
+            <a:schemeClr val="accent1"/>
+          </a:effectRef>
+          <a:fontRef idx="minor">
+            <a:schemeClr val="tx1"/>
+          </a:fontRef>
+        </p:style>
+      </p:cxnSp>
+      <p:cxnSp>
+        <p:nvCxnSpPr>
+          <p:cNvPr id="55" name="Straight Arrow Connector 54">
             <a:extLst>
               <a:ext uri="{FF2B5EF4-FFF2-40B4-BE49-F238E27FC236}">
-                <a16:creationId xmlns:a16="http://schemas.microsoft.com/office/drawing/2014/main" id="{45F35A16-6E31-B646-B61C-27A6E97CB6DA}"/>
+                <a16:creationId xmlns:a16="http://schemas.microsoft.com/office/drawing/2014/main" id="{2E394B40-BBF4-C54F-9DB5-EC6FC7DB775C}"/>
               </a:ext>
             </a:extLst>
           </p:cNvPr>
-          <p:cNvGrpSpPr/>
+          <p:cNvCxnSpPr>
+            <a:cxnSpLocks/>
+            <a:stCxn id="15" idx="2"/>
+            <a:endCxn id="17" idx="0"/>
+          </p:cNvCxnSpPr>
           <p:nvPr/>
-        </p:nvGrpSpPr>
-        <p:grpSpPr>
+        </p:nvCxnSpPr>
+        <p:spPr>
+          <a:xfrm flipH="1">
+            <a:off x="4968765" y="4036186"/>
+            <a:ext cx="1177716" cy="349746"/>
+          </a:xfrm>
+          <a:prstGeom prst="straightConnector1">
+            <a:avLst/>
+          </a:prstGeom>
+          <a:ln w="38100">
+            <a:solidFill>
+              <a:schemeClr val="tx1"/>
+            </a:solidFill>
+            <a:tailEnd type="triangle"/>
+          </a:ln>
+        </p:spPr>
+        <p:style>
+          <a:lnRef idx="1">
+            <a:schemeClr val="accent1"/>
+          </a:lnRef>
+          <a:fillRef idx="0">
+            <a:schemeClr val="accent1"/>
+          </a:fillRef>
+          <a:effectRef idx="0">
+            <a:schemeClr val="accent1"/>
+          </a:effectRef>
+          <a:fontRef idx="minor">
+            <a:schemeClr val="tx1"/>
+          </a:fontRef>
+        </p:style>
+      </p:cxnSp>
+      <p:cxnSp>
+        <p:nvCxnSpPr>
+          <p:cNvPr id="58" name="Straight Arrow Connector 57">
+            <a:extLst>
+              <a:ext uri="{FF2B5EF4-FFF2-40B4-BE49-F238E27FC236}">
+                <a16:creationId xmlns:a16="http://schemas.microsoft.com/office/drawing/2014/main" id="{DE49EFEB-5F74-674A-A45C-0C3AE8A24823}"/>
+              </a:ext>
+            </a:extLst>
+          </p:cNvPr>
+          <p:cNvCxnSpPr>
+            <a:cxnSpLocks/>
+            <a:stCxn id="15" idx="2"/>
+            <a:endCxn id="16" idx="0"/>
+          </p:cNvCxnSpPr>
+          <p:nvPr/>
+        </p:nvCxnSpPr>
+        <p:spPr>
           <a:xfrm>
-            <a:off x="2243746" y="110173"/>
-            <a:ext cx="4477780" cy="1654061"/>
-            <a:chOff x="3191106" y="156691"/>
-            <a:chExt cx="6368398" cy="2352442"/>
-          </a:xfrm>
-        </p:grpSpPr>
-        <p:sp>
-          <p:nvSpPr>
-            <p:cNvPr id="4" name="TextBox 3">
-              <a:extLst>
-                <a:ext uri="{FF2B5EF4-FFF2-40B4-BE49-F238E27FC236}">
-                  <a16:creationId xmlns:a16="http://schemas.microsoft.com/office/drawing/2014/main" id="{D819E057-CE3E-AD4C-9CA6-515B036D1E1F}"/>
-                </a:ext>
-              </a:extLst>
-            </p:cNvPr>
-            <p:cNvSpPr txBox="1"/>
-            <p:nvPr/>
-          </p:nvSpPr>
-          <p:spPr>
-            <a:xfrm>
-              <a:off x="7096244" y="1388190"/>
-              <a:ext cx="394866" cy="439003"/>
-            </a:xfrm>
-            <a:prstGeom prst="rect">
+            <a:off x="6146481" y="4036186"/>
+            <a:ext cx="426847" cy="1066315"/>
+          </a:xfrm>
+          <a:prstGeom prst="straightConnector1">
+            <a:avLst/>
+          </a:prstGeom>
+          <a:ln w="38100">
+            <a:solidFill>
+              <a:schemeClr val="tx1"/>
+            </a:solidFill>
+            <a:tailEnd type="triangle"/>
+          </a:ln>
+        </p:spPr>
+        <p:style>
+          <a:lnRef idx="1">
+            <a:schemeClr val="accent1"/>
+          </a:lnRef>
+          <a:fillRef idx="0">
+            <a:schemeClr val="accent1"/>
+          </a:fillRef>
+          <a:effectRef idx="0">
+            <a:schemeClr val="accent1"/>
+          </a:effectRef>
+          <a:fontRef idx="minor">
+            <a:schemeClr val="tx1"/>
+          </a:fontRef>
+        </p:style>
+      </p:cxnSp>
+      <p:cxnSp>
+        <p:nvCxnSpPr>
+          <p:cNvPr id="62" name="Straight Arrow Connector 61">
+            <a:extLst>
+              <a:ext uri="{FF2B5EF4-FFF2-40B4-BE49-F238E27FC236}">
+                <a16:creationId xmlns:a16="http://schemas.microsoft.com/office/drawing/2014/main" id="{7099BCCC-1014-024F-8599-7458797448A3}"/>
+              </a:ext>
+            </a:extLst>
+          </p:cNvPr>
+          <p:cNvCxnSpPr>
+            <a:cxnSpLocks/>
+            <a:stCxn id="14" idx="4"/>
+          </p:cNvCxnSpPr>
+          <p:nvPr/>
+        </p:nvCxnSpPr>
+        <p:spPr>
+          <a:xfrm flipH="1">
+            <a:off x="6210879" y="3383748"/>
+            <a:ext cx="30206" cy="163289"/>
+          </a:xfrm>
+          <a:prstGeom prst="straightConnector1">
+            <a:avLst/>
+          </a:prstGeom>
+          <a:ln w="38100">
+            <a:solidFill>
+              <a:schemeClr val="tx1"/>
+            </a:solidFill>
+            <a:tailEnd type="triangle"/>
+          </a:ln>
+        </p:spPr>
+        <p:style>
+          <a:lnRef idx="1">
+            <a:schemeClr val="accent1"/>
+          </a:lnRef>
+          <a:fillRef idx="0">
+            <a:schemeClr val="accent1"/>
+          </a:fillRef>
+          <a:effectRef idx="0">
+            <a:schemeClr val="accent1"/>
+          </a:effectRef>
+          <a:fontRef idx="minor">
+            <a:schemeClr val="tx1"/>
+          </a:fontRef>
+        </p:style>
+      </p:cxnSp>
+      <p:sp>
+        <p:nvSpPr>
+          <p:cNvPr id="10" name="Data 9">
+            <a:extLst>
+              <a:ext uri="{FF2B5EF4-FFF2-40B4-BE49-F238E27FC236}">
+                <a16:creationId xmlns:a16="http://schemas.microsoft.com/office/drawing/2014/main" id="{94C0E8C8-09DF-944D-B2DC-8345A8CCC750}"/>
+              </a:ext>
+            </a:extLst>
+          </p:cNvPr>
+          <p:cNvSpPr/>
+          <p:nvPr/>
+        </p:nvSpPr>
+        <p:spPr>
+          <a:xfrm>
+            <a:off x="7667972" y="3101006"/>
+            <a:ext cx="1269759" cy="622789"/>
+          </a:xfrm>
+          <a:prstGeom prst="flowChartInputOutput">
+            <a:avLst/>
+          </a:prstGeom>
+          <a:noFill/>
+          <a:ln w="38100">
+            <a:solidFill>
+              <a:schemeClr val="tx1"/>
+            </a:solidFill>
+          </a:ln>
+        </p:spPr>
+        <p:style>
+          <a:lnRef idx="2">
+            <a:schemeClr val="accent1">
+              <a:shade val="50000"/>
+            </a:schemeClr>
+          </a:lnRef>
+          <a:fillRef idx="1">
+            <a:schemeClr val="accent1"/>
+          </a:fillRef>
+          <a:effectRef idx="0">
+            <a:schemeClr val="accent1"/>
+          </a:effectRef>
+          <a:fontRef idx="minor">
+            <a:schemeClr val="lt1"/>
+          </a:fontRef>
+        </p:style>
+        <p:txBody>
+          <a:bodyPr rot="0" spcFirstLastPara="0" vertOverflow="overflow" horzOverflow="overflow" vert="horz" wrap="square" lIns="96771" tIns="48386" rIns="96771" bIns="48386" numCol="1" spcCol="0" rtlCol="0" fromWordArt="0" anchor="ctr" anchorCtr="0" forceAA="0" compatLnSpc="1">
+            <a:prstTxWarp prst="textNoShape">
               <a:avLst/>
-            </a:prstGeom>
-            <a:noFill/>
-          </p:spPr>
-          <p:txBody>
-            <a:bodyPr wrap="none" rtlCol="0">
-              <a:spAutoFit/>
-            </a:bodyPr>
-            <a:lstStyle/>
-            <a:p>
-              <a:r>
-                <a:rPr lang="en-US" sz="1406" b="1" dirty="0"/>
-                <a:t>Y</a:t>
-              </a:r>
-            </a:p>
-          </p:txBody>
-        </p:sp>
-        <p:grpSp>
-          <p:nvGrpSpPr>
-            <p:cNvPr id="11" name="Group 10">
-              <a:extLst>
-                <a:ext uri="{FF2B5EF4-FFF2-40B4-BE49-F238E27FC236}">
-                  <a16:creationId xmlns:a16="http://schemas.microsoft.com/office/drawing/2014/main" id="{B88579AB-06ED-654D-BC7A-597265362247}"/>
-                </a:ext>
-              </a:extLst>
-            </p:cNvPr>
-            <p:cNvGrpSpPr/>
-            <p:nvPr/>
-          </p:nvGrpSpPr>
-          <p:grpSpPr>
-            <a:xfrm>
-              <a:off x="7541136" y="1422309"/>
-              <a:ext cx="976166" cy="738200"/>
-              <a:chOff x="3780081" y="1275953"/>
-              <a:chExt cx="648553" cy="490451"/>
-            </a:xfrm>
-          </p:grpSpPr>
-          <p:sp>
-            <p:nvSpPr>
-              <p:cNvPr id="61" name="Decision 60">
-                <a:extLst>
-                  <a:ext uri="{FF2B5EF4-FFF2-40B4-BE49-F238E27FC236}">
-                    <a16:creationId xmlns:a16="http://schemas.microsoft.com/office/drawing/2014/main" id="{AA86CAB6-E313-0647-A373-8B3DC095104A}"/>
-                  </a:ext>
-                </a:extLst>
-              </p:cNvPr>
-              <p:cNvSpPr/>
-              <p:nvPr/>
-            </p:nvSpPr>
-            <p:spPr>
-              <a:xfrm>
-                <a:off x="3780081" y="1275953"/>
-                <a:ext cx="640080" cy="490451"/>
-              </a:xfrm>
-              <a:prstGeom prst="flowChartDecision">
-                <a:avLst/>
-              </a:prstGeom>
-              <a:noFill/>
-              <a:ln w="38100">
+            </a:prstTxWarp>
+            <a:noAutofit/>
+          </a:bodyPr>
+          <a:lstStyle/>
+          <a:p>
+            <a:pPr algn="ctr"/>
+            <a:r>
+              <a:rPr lang="en-US" sz="1058" dirty="0">
                 <a:solidFill>
                   <a:schemeClr val="tx1"/>
                 </a:solidFill>
-              </a:ln>
-            </p:spPr>
-            <p:style>
-              <a:lnRef idx="2">
-                <a:schemeClr val="accent1">
-                  <a:shade val="50000"/>
-                </a:schemeClr>
-              </a:lnRef>
-              <a:fillRef idx="1">
-                <a:schemeClr val="accent1"/>
-              </a:fillRef>
-              <a:effectRef idx="0">
-                <a:schemeClr val="accent1"/>
-              </a:effectRef>
-              <a:fontRef idx="minor">
-                <a:schemeClr val="lt1"/>
-              </a:fontRef>
-            </p:style>
-            <p:txBody>
-              <a:bodyPr rtlCol="0" anchor="ctr"/>
-              <a:lstStyle/>
-              <a:p>
-                <a:pPr algn="ctr"/>
-                <a:endParaRPr lang="en-US" sz="1058" dirty="0"/>
-              </a:p>
-            </p:txBody>
-          </p:sp>
-          <p:sp>
-            <p:nvSpPr>
-              <p:cNvPr id="64" name="Rectangle 63">
-                <a:extLst>
-                  <a:ext uri="{FF2B5EF4-FFF2-40B4-BE49-F238E27FC236}">
-                    <a16:creationId xmlns:a16="http://schemas.microsoft.com/office/drawing/2014/main" id="{4F831BD3-F70C-734A-84F5-59EF5F1D2109}"/>
-                  </a:ext>
-                </a:extLst>
-              </p:cNvPr>
-              <p:cNvSpPr/>
-              <p:nvPr/>
-            </p:nvSpPr>
-            <p:spPr>
-              <a:xfrm>
-                <a:off x="3790646" y="1396566"/>
-                <a:ext cx="637988" cy="241078"/>
-              </a:xfrm>
-              <a:prstGeom prst="rect">
-                <a:avLst/>
-              </a:prstGeom>
-            </p:spPr>
-            <p:txBody>
-              <a:bodyPr wrap="none">
-                <a:spAutoFit/>
-              </a:bodyPr>
-              <a:lstStyle/>
-              <a:p>
-                <a:pPr algn="ctr"/>
-                <a:r>
-                  <a:rPr lang="en-US" sz="1058" dirty="0"/>
-                  <a:t>Failures?</a:t>
-                </a:r>
-              </a:p>
-            </p:txBody>
-          </p:sp>
-        </p:grpSp>
-        <p:sp>
-          <p:nvSpPr>
-            <p:cNvPr id="70" name="Process 69">
-              <a:extLst>
-                <a:ext uri="{FF2B5EF4-FFF2-40B4-BE49-F238E27FC236}">
-                  <a16:creationId xmlns:a16="http://schemas.microsoft.com/office/drawing/2014/main" id="{20B3ACAE-F0FE-DB4B-956C-E524DABF54DA}"/>
-                </a:ext>
-              </a:extLst>
-            </p:cNvPr>
-            <p:cNvSpPr/>
-            <p:nvPr/>
-          </p:nvSpPr>
-          <p:spPr>
-            <a:xfrm>
-              <a:off x="4591008" y="313046"/>
-              <a:ext cx="1097055" cy="641006"/>
-            </a:xfrm>
-            <a:prstGeom prst="flowChartProcess">
+              </a:rPr>
+              <a:t>Improved</a:t>
+            </a:r>
+            <a:br>
+              <a:rPr lang="en-US" sz="1058" dirty="0">
+                <a:solidFill>
+                  <a:schemeClr val="tx1"/>
+                </a:solidFill>
+              </a:rPr>
+            </a:br>
+            <a:r>
+              <a:rPr lang="en-US" sz="1058" dirty="0">
+                <a:solidFill>
+                  <a:schemeClr val="tx1"/>
+                </a:solidFill>
+              </a:rPr>
+              <a:t>SUT</a:t>
+            </a:r>
+          </a:p>
+          <a:p>
+            <a:pPr algn="ctr"/>
+            <a:r>
+              <a:rPr lang="en-US" sz="1058" dirty="0">
+                <a:solidFill>
+                  <a:schemeClr val="tx1"/>
+                </a:solidFill>
+              </a:rPr>
+              <a:t>Test Suite</a:t>
+            </a:r>
+          </a:p>
+        </p:txBody>
+      </p:sp>
+      <p:sp>
+        <p:nvSpPr>
+          <p:cNvPr id="18" name="Process 17">
+            <a:extLst>
+              <a:ext uri="{FF2B5EF4-FFF2-40B4-BE49-F238E27FC236}">
+                <a16:creationId xmlns:a16="http://schemas.microsoft.com/office/drawing/2014/main" id="{9424C678-9BBB-D040-9EF7-E7895FEFFC16}"/>
+              </a:ext>
+            </a:extLst>
+          </p:cNvPr>
+          <p:cNvSpPr/>
+          <p:nvPr/>
+        </p:nvSpPr>
+        <p:spPr>
+          <a:xfrm>
+            <a:off x="7925763" y="5067438"/>
+            <a:ext cx="819560" cy="497627"/>
+          </a:xfrm>
+          <a:prstGeom prst="flowChartProcess">
+            <a:avLst/>
+          </a:prstGeom>
+          <a:noFill/>
+          <a:ln w="38100">
+            <a:solidFill>
+              <a:schemeClr val="tx1"/>
+            </a:solidFill>
+          </a:ln>
+        </p:spPr>
+        <p:style>
+          <a:lnRef idx="2">
+            <a:schemeClr val="accent1">
+              <a:shade val="50000"/>
+            </a:schemeClr>
+          </a:lnRef>
+          <a:fillRef idx="1">
+            <a:schemeClr val="accent1"/>
+          </a:fillRef>
+          <a:effectRef idx="0">
+            <a:schemeClr val="accent1"/>
+          </a:effectRef>
+          <a:fontRef idx="minor">
+            <a:schemeClr val="lt1"/>
+          </a:fontRef>
+        </p:style>
+        <p:txBody>
+          <a:bodyPr rot="0" spcFirstLastPara="0" vertOverflow="overflow" horzOverflow="overflow" vert="horz" wrap="square" lIns="96771" tIns="48386" rIns="96771" bIns="48386" numCol="1" spcCol="0" rtlCol="0" fromWordArt="0" anchor="ctr" anchorCtr="0" forceAA="0" compatLnSpc="1">
+            <a:prstTxWarp prst="textNoShape">
               <a:avLst/>
-            </a:prstGeom>
+            </a:prstTxWarp>
+            <a:noAutofit/>
+          </a:bodyPr>
+          <a:lstStyle/>
+          <a:p>
+            <a:pPr algn="ctr"/>
+            <a:r>
+              <a:rPr lang="en-US" sz="1058" dirty="0">
+                <a:solidFill>
+                  <a:schemeClr val="tx1"/>
+                </a:solidFill>
+              </a:rPr>
+              <a:t>Generate</a:t>
+            </a:r>
+          </a:p>
+          <a:p>
+            <a:pPr algn="ctr"/>
+            <a:r>
+              <a:rPr lang="en-US" sz="1058" dirty="0">
+                <a:solidFill>
+                  <a:schemeClr val="tx1"/>
+                </a:solidFill>
+              </a:rPr>
+              <a:t>Test Inputs</a:t>
+            </a:r>
+          </a:p>
+        </p:txBody>
+      </p:sp>
+      <p:sp>
+        <p:nvSpPr>
+          <p:cNvPr id="19" name="Process 18">
+            <a:extLst>
+              <a:ext uri="{FF2B5EF4-FFF2-40B4-BE49-F238E27FC236}">
+                <a16:creationId xmlns:a16="http://schemas.microsoft.com/office/drawing/2014/main" id="{574EA16F-B526-1845-A3C1-66D2C01ACD13}"/>
+              </a:ext>
+            </a:extLst>
+          </p:cNvPr>
+          <p:cNvSpPr/>
+          <p:nvPr/>
+        </p:nvSpPr>
+        <p:spPr>
+          <a:xfrm>
+            <a:off x="7920597" y="4193620"/>
+            <a:ext cx="819561" cy="497627"/>
+          </a:xfrm>
+          <a:prstGeom prst="flowChartProcess">
+            <a:avLst/>
+          </a:prstGeom>
+          <a:noFill/>
+          <a:ln w="38100">
             <a:solidFill>
-              <a:schemeClr val="bg1">
-                <a:lumMod val="65000"/>
-              </a:schemeClr>
+              <a:schemeClr val="tx1"/>
             </a:solidFill>
-            <a:ln w="38100">
-              <a:solidFill>
-                <a:schemeClr val="tx1"/>
-              </a:solidFill>
-            </a:ln>
-          </p:spPr>
-          <p:style>
-            <a:lnRef idx="2">
-              <a:schemeClr val="accent1">
-                <a:shade val="50000"/>
-              </a:schemeClr>
-            </a:lnRef>
-            <a:fillRef idx="1">
-              <a:schemeClr val="accent1"/>
-            </a:fillRef>
-            <a:effectRef idx="0">
-              <a:schemeClr val="accent1"/>
-            </a:effectRef>
-            <a:fontRef idx="minor">
-              <a:schemeClr val="lt1"/>
-            </a:fontRef>
-          </p:style>
-          <p:txBody>
-            <a:bodyPr rot="0" spcFirstLastPara="0" vertOverflow="overflow" horzOverflow="overflow" vert="horz" wrap="square" lIns="96771" tIns="48386" rIns="96771" bIns="48386" numCol="1" spcCol="0" rtlCol="0" fromWordArt="0" anchor="ctr" anchorCtr="0" forceAA="0" compatLnSpc="1">
-              <a:prstTxWarp prst="textNoShape">
-                <a:avLst/>
-              </a:prstTxWarp>
-              <a:noAutofit/>
-            </a:bodyPr>
-            <a:lstStyle/>
-            <a:p>
-              <a:pPr algn="ctr"/>
-              <a:r>
-                <a:rPr lang="en-US" sz="1058" dirty="0">
-                  <a:solidFill>
-                    <a:schemeClr val="tx1"/>
-                  </a:solidFill>
-                </a:rPr>
-                <a:t>Fix the</a:t>
-              </a:r>
-            </a:p>
-            <a:p>
-              <a:pPr algn="ctr"/>
-              <a:r>
-                <a:rPr lang="en-US" sz="1058" dirty="0">
-                  <a:solidFill>
-                    <a:schemeClr val="tx1"/>
-                  </a:solidFill>
-                </a:rPr>
-                <a:t>SUT</a:t>
-              </a:r>
-            </a:p>
-          </p:txBody>
-        </p:sp>
-        <p:sp>
-          <p:nvSpPr>
-            <p:cNvPr id="83" name="TextBox 82">
-              <a:extLst>
-                <a:ext uri="{FF2B5EF4-FFF2-40B4-BE49-F238E27FC236}">
-                  <a16:creationId xmlns:a16="http://schemas.microsoft.com/office/drawing/2014/main" id="{A4B249D9-E1C9-4844-848F-DB7A635E6D59}"/>
-                </a:ext>
-              </a:extLst>
-            </p:cNvPr>
-            <p:cNvSpPr txBox="1"/>
-            <p:nvPr/>
-          </p:nvSpPr>
-          <p:spPr>
-            <a:xfrm>
-              <a:off x="8045745" y="2070130"/>
-              <a:ext cx="431343" cy="439003"/>
-            </a:xfrm>
-            <a:prstGeom prst="rect">
+          </a:ln>
+        </p:spPr>
+        <p:style>
+          <a:lnRef idx="2">
+            <a:schemeClr val="accent1">
+              <a:shade val="50000"/>
+            </a:schemeClr>
+          </a:lnRef>
+          <a:fillRef idx="1">
+            <a:schemeClr val="accent1"/>
+          </a:fillRef>
+          <a:effectRef idx="0">
+            <a:schemeClr val="accent1"/>
+          </a:effectRef>
+          <a:fontRef idx="minor">
+            <a:schemeClr val="lt1"/>
+          </a:fontRef>
+        </p:style>
+        <p:txBody>
+          <a:bodyPr rot="0" spcFirstLastPara="0" vertOverflow="overflow" horzOverflow="overflow" vert="horz" wrap="square" lIns="96771" tIns="48386" rIns="96771" bIns="48386" numCol="1" spcCol="0" rtlCol="0" fromWordArt="0" anchor="ctr" anchorCtr="0" forceAA="0" compatLnSpc="1">
+            <a:prstTxWarp prst="textNoShape">
               <a:avLst/>
-            </a:prstGeom>
-            <a:noFill/>
-          </p:spPr>
-          <p:txBody>
-            <a:bodyPr wrap="none" rtlCol="0">
-              <a:spAutoFit/>
-            </a:bodyPr>
-            <a:lstStyle/>
-            <a:p>
-              <a:r>
-                <a:rPr lang="en-US" sz="1406" b="1" dirty="0"/>
-                <a:t>N</a:t>
-              </a:r>
-            </a:p>
-          </p:txBody>
-        </p:sp>
-        <p:sp>
-          <p:nvSpPr>
-            <p:cNvPr id="75" name="Process 74">
-              <a:extLst>
-                <a:ext uri="{FF2B5EF4-FFF2-40B4-BE49-F238E27FC236}">
-                  <a16:creationId xmlns:a16="http://schemas.microsoft.com/office/drawing/2014/main" id="{95D02A53-9653-AA4E-9894-8601E90521A9}"/>
-                </a:ext>
-              </a:extLst>
-            </p:cNvPr>
-            <p:cNvSpPr/>
-            <p:nvPr/>
-          </p:nvSpPr>
-          <p:spPr>
-            <a:xfrm>
-              <a:off x="7471246" y="156691"/>
-              <a:ext cx="1085903" cy="784620"/>
-            </a:xfrm>
-            <a:prstGeom prst="flowChartProcess">
+            </a:prstTxWarp>
+            <a:noAutofit/>
+          </a:bodyPr>
+          <a:lstStyle/>
+          <a:p>
+            <a:pPr algn="ctr"/>
+            <a:r>
+              <a:rPr lang="en-US" sz="1058" dirty="0">
+                <a:solidFill>
+                  <a:schemeClr val="tx1"/>
+                </a:solidFill>
+              </a:rPr>
+              <a:t>Generate</a:t>
+            </a:r>
+          </a:p>
+          <a:p>
+            <a:pPr algn="ctr"/>
+            <a:r>
+              <a:rPr lang="en-US" sz="1058" dirty="0">
+                <a:solidFill>
+                  <a:schemeClr val="tx1"/>
+                </a:solidFill>
+              </a:rPr>
+              <a:t>Test Oracles</a:t>
+            </a:r>
+          </a:p>
+        </p:txBody>
+      </p:sp>
+      <p:cxnSp>
+        <p:nvCxnSpPr>
+          <p:cNvPr id="103" name="Straight Arrow Connector 102">
+            <a:extLst>
+              <a:ext uri="{FF2B5EF4-FFF2-40B4-BE49-F238E27FC236}">
+                <a16:creationId xmlns:a16="http://schemas.microsoft.com/office/drawing/2014/main" id="{99583958-51CB-1340-9FD6-D3CEDB0FD2D7}"/>
+              </a:ext>
+            </a:extLst>
+          </p:cNvPr>
+          <p:cNvCxnSpPr>
+            <a:cxnSpLocks/>
+            <a:stCxn id="18" idx="0"/>
+            <a:endCxn id="19" idx="2"/>
+          </p:cNvCxnSpPr>
+          <p:nvPr/>
+        </p:nvCxnSpPr>
+        <p:spPr>
+          <a:xfrm flipH="1" flipV="1">
+            <a:off x="8330377" y="4691247"/>
+            <a:ext cx="5166" cy="376191"/>
+          </a:xfrm>
+          <a:prstGeom prst="straightConnector1">
+            <a:avLst/>
+          </a:prstGeom>
+          <a:ln w="38100">
+            <a:solidFill>
+              <a:schemeClr val="tx1"/>
+            </a:solidFill>
+            <a:tailEnd type="triangle"/>
+          </a:ln>
+        </p:spPr>
+        <p:style>
+          <a:lnRef idx="1">
+            <a:schemeClr val="accent1"/>
+          </a:lnRef>
+          <a:fillRef idx="0">
+            <a:schemeClr val="accent1"/>
+          </a:fillRef>
+          <a:effectRef idx="0">
+            <a:schemeClr val="accent1"/>
+          </a:effectRef>
+          <a:fontRef idx="minor">
+            <a:schemeClr val="tx1"/>
+          </a:fontRef>
+        </p:style>
+      </p:cxnSp>
+      <p:sp>
+        <p:nvSpPr>
+          <p:cNvPr id="125" name="Rectangle 124">
+            <a:extLst>
+              <a:ext uri="{FF2B5EF4-FFF2-40B4-BE49-F238E27FC236}">
+                <a16:creationId xmlns:a16="http://schemas.microsoft.com/office/drawing/2014/main" id="{F77AD195-C0A5-3448-AB0F-ECA142922207}"/>
+              </a:ext>
+            </a:extLst>
+          </p:cNvPr>
+          <p:cNvSpPr/>
+          <p:nvPr/>
+        </p:nvSpPr>
+        <p:spPr>
+          <a:xfrm>
+            <a:off x="7368822" y="92765"/>
+            <a:ext cx="1735414" cy="6692347"/>
+          </a:xfrm>
+          <a:prstGeom prst="rect">
+            <a:avLst/>
+          </a:prstGeom>
+          <a:noFill/>
+          <a:ln w="38100">
+            <a:solidFill>
+              <a:schemeClr val="tx1"/>
+            </a:solidFill>
+            <a:prstDash val="sysDot"/>
+          </a:ln>
+        </p:spPr>
+        <p:style>
+          <a:lnRef idx="2">
+            <a:schemeClr val="accent1">
+              <a:shade val="50000"/>
+            </a:schemeClr>
+          </a:lnRef>
+          <a:fillRef idx="1">
+            <a:schemeClr val="accent1"/>
+          </a:fillRef>
+          <a:effectRef idx="0">
+            <a:schemeClr val="accent1"/>
+          </a:effectRef>
+          <a:fontRef idx="minor">
+            <a:schemeClr val="lt1"/>
+          </a:fontRef>
+        </p:style>
+        <p:txBody>
+          <a:bodyPr rtlCol="0" anchor="ctr"/>
+          <a:lstStyle/>
+          <a:p>
+            <a:pPr algn="ctr"/>
+            <a:endParaRPr lang="en-US" sz="4444"/>
+          </a:p>
+        </p:txBody>
+      </p:sp>
+      <p:sp>
+        <p:nvSpPr>
+          <p:cNvPr id="130" name="Rectangle 129">
+            <a:extLst>
+              <a:ext uri="{FF2B5EF4-FFF2-40B4-BE49-F238E27FC236}">
+                <a16:creationId xmlns:a16="http://schemas.microsoft.com/office/drawing/2014/main" id="{5ED79A08-3926-0D4D-ABFB-A26E13524806}"/>
+              </a:ext>
+            </a:extLst>
+          </p:cNvPr>
+          <p:cNvSpPr/>
+          <p:nvPr/>
+        </p:nvSpPr>
+        <p:spPr>
+          <a:xfrm>
+            <a:off x="7673623" y="6067297"/>
+            <a:ext cx="1568584" cy="775982"/>
+          </a:xfrm>
+          <a:prstGeom prst="rect">
+            <a:avLst/>
+          </a:prstGeom>
+        </p:spPr>
+        <p:txBody>
+          <a:bodyPr wrap="square">
+            <a:spAutoFit/>
+          </a:bodyPr>
+          <a:lstStyle/>
+          <a:p>
+            <a:pPr algn="ctr"/>
+            <a:r>
+              <a:rPr lang="en-US" sz="1481" dirty="0"/>
+              <a:t>Test Suite</a:t>
+            </a:r>
+          </a:p>
+          <a:p>
+            <a:pPr algn="ctr"/>
+            <a:r>
+              <a:rPr lang="en-US" sz="1481" dirty="0"/>
+              <a:t>Augmentation</a:t>
+            </a:r>
+          </a:p>
+          <a:p>
+            <a:pPr algn="ctr"/>
+            <a:r>
+              <a:rPr lang="en-US" sz="1481" dirty="0"/>
+              <a:t>Process</a:t>
+            </a:r>
+          </a:p>
+        </p:txBody>
+      </p:sp>
+      <p:cxnSp>
+        <p:nvCxnSpPr>
+          <p:cNvPr id="102" name="Straight Arrow Connector 101">
+            <a:extLst>
+              <a:ext uri="{FF2B5EF4-FFF2-40B4-BE49-F238E27FC236}">
+                <a16:creationId xmlns:a16="http://schemas.microsoft.com/office/drawing/2014/main" id="{FD537822-189E-1442-A9E5-9448DD8BD8E5}"/>
+              </a:ext>
+            </a:extLst>
+          </p:cNvPr>
+          <p:cNvCxnSpPr>
+            <a:cxnSpLocks/>
+            <a:stCxn id="19" idx="0"/>
+            <a:endCxn id="10" idx="4"/>
+          </p:cNvCxnSpPr>
+          <p:nvPr/>
+        </p:nvCxnSpPr>
+        <p:spPr>
+          <a:xfrm flipH="1" flipV="1">
+            <a:off x="8302851" y="3723795"/>
+            <a:ext cx="27526" cy="469825"/>
+          </a:xfrm>
+          <a:prstGeom prst="straightConnector1">
+            <a:avLst/>
+          </a:prstGeom>
+          <a:ln w="38100">
+            <a:solidFill>
+              <a:schemeClr val="tx1"/>
+            </a:solidFill>
+            <a:tailEnd type="triangle"/>
+          </a:ln>
+        </p:spPr>
+        <p:style>
+          <a:lnRef idx="1">
+            <a:schemeClr val="accent1"/>
+          </a:lnRef>
+          <a:fillRef idx="0">
+            <a:schemeClr val="accent1"/>
+          </a:fillRef>
+          <a:effectRef idx="0">
+            <a:schemeClr val="accent1"/>
+          </a:effectRef>
+          <a:fontRef idx="minor">
+            <a:schemeClr val="tx1"/>
+          </a:fontRef>
+        </p:style>
+      </p:cxnSp>
+      <p:sp>
+        <p:nvSpPr>
+          <p:cNvPr id="4" name="TextBox 3">
+            <a:extLst>
+              <a:ext uri="{FF2B5EF4-FFF2-40B4-BE49-F238E27FC236}">
+                <a16:creationId xmlns:a16="http://schemas.microsoft.com/office/drawing/2014/main" id="{D819E057-CE3E-AD4C-9CA6-515B036D1E1F}"/>
+              </a:ext>
+            </a:extLst>
+          </p:cNvPr>
+          <p:cNvSpPr txBox="1"/>
+          <p:nvPr/>
+        </p:nvSpPr>
+        <p:spPr>
+          <a:xfrm>
+            <a:off x="8421862" y="932721"/>
+            <a:ext cx="277640" cy="308674"/>
+          </a:xfrm>
+          <a:prstGeom prst="rect">
+            <a:avLst/>
+          </a:prstGeom>
+          <a:noFill/>
+        </p:spPr>
+        <p:txBody>
+          <a:bodyPr wrap="none" rtlCol="0">
+            <a:spAutoFit/>
+          </a:bodyPr>
+          <a:lstStyle/>
+          <a:p>
+            <a:r>
+              <a:rPr lang="en-US" sz="1406" b="1" dirty="0"/>
+              <a:t>Y</a:t>
+            </a:r>
+          </a:p>
+        </p:txBody>
+      </p:sp>
+      <p:sp>
+        <p:nvSpPr>
+          <p:cNvPr id="61" name="Decision 60">
+            <a:extLst>
+              <a:ext uri="{FF2B5EF4-FFF2-40B4-BE49-F238E27FC236}">
+                <a16:creationId xmlns:a16="http://schemas.microsoft.com/office/drawing/2014/main" id="{AA86CAB6-E313-0647-A373-8B3DC095104A}"/>
+              </a:ext>
+            </a:extLst>
+          </p:cNvPr>
+          <p:cNvSpPr/>
+          <p:nvPr/>
+        </p:nvSpPr>
+        <p:spPr>
+          <a:xfrm>
+            <a:off x="7939802" y="1170741"/>
+            <a:ext cx="677400" cy="519048"/>
+          </a:xfrm>
+          <a:prstGeom prst="flowChartDecision">
+            <a:avLst/>
+          </a:prstGeom>
+          <a:noFill/>
+          <a:ln w="38100">
+            <a:solidFill>
+              <a:schemeClr val="tx1"/>
+            </a:solidFill>
+          </a:ln>
+        </p:spPr>
+        <p:style>
+          <a:lnRef idx="2">
+            <a:schemeClr val="accent1">
+              <a:shade val="50000"/>
+            </a:schemeClr>
+          </a:lnRef>
+          <a:fillRef idx="1">
+            <a:schemeClr val="accent1"/>
+          </a:fillRef>
+          <a:effectRef idx="0">
+            <a:schemeClr val="accent1"/>
+          </a:effectRef>
+          <a:fontRef idx="minor">
+            <a:schemeClr val="lt1"/>
+          </a:fontRef>
+        </p:style>
+        <p:txBody>
+          <a:bodyPr rtlCol="0" anchor="ctr"/>
+          <a:lstStyle/>
+          <a:p>
+            <a:pPr algn="ctr"/>
+            <a:endParaRPr lang="en-US" sz="1058" dirty="0"/>
+          </a:p>
+        </p:txBody>
+      </p:sp>
+      <p:sp>
+        <p:nvSpPr>
+          <p:cNvPr id="64" name="Rectangle 63">
+            <a:extLst>
+              <a:ext uri="{FF2B5EF4-FFF2-40B4-BE49-F238E27FC236}">
+                <a16:creationId xmlns:a16="http://schemas.microsoft.com/office/drawing/2014/main" id="{4F831BD3-F70C-734A-84F5-59EF5F1D2109}"/>
+              </a:ext>
+            </a:extLst>
+          </p:cNvPr>
+          <p:cNvSpPr/>
+          <p:nvPr/>
+        </p:nvSpPr>
+        <p:spPr>
+          <a:xfrm>
+            <a:off x="7937475" y="1322899"/>
+            <a:ext cx="675186" cy="255135"/>
+          </a:xfrm>
+          <a:prstGeom prst="rect">
+            <a:avLst/>
+          </a:prstGeom>
+        </p:spPr>
+        <p:txBody>
+          <a:bodyPr wrap="none">
+            <a:spAutoFit/>
+          </a:bodyPr>
+          <a:lstStyle/>
+          <a:p>
+            <a:pPr algn="ctr"/>
+            <a:r>
+              <a:rPr lang="en-US" sz="1058" dirty="0"/>
+              <a:t>Failures?</a:t>
+            </a:r>
+          </a:p>
+        </p:txBody>
+      </p:sp>
+      <p:sp>
+        <p:nvSpPr>
+          <p:cNvPr id="70" name="Process 69">
+            <a:extLst>
+              <a:ext uri="{FF2B5EF4-FFF2-40B4-BE49-F238E27FC236}">
+                <a16:creationId xmlns:a16="http://schemas.microsoft.com/office/drawing/2014/main" id="{20B3ACAE-F0FE-DB4B-956C-E524DABF54DA}"/>
+              </a:ext>
+            </a:extLst>
+          </p:cNvPr>
+          <p:cNvSpPr/>
+          <p:nvPr/>
+        </p:nvSpPr>
+        <p:spPr>
+          <a:xfrm>
+            <a:off x="7892818" y="450270"/>
+            <a:ext cx="771368" cy="450708"/>
+          </a:xfrm>
+          <a:prstGeom prst="flowChartProcess">
+            <a:avLst/>
+          </a:prstGeom>
+          <a:solidFill>
+            <a:schemeClr val="bg1">
+              <a:lumMod val="65000"/>
+            </a:schemeClr>
+          </a:solidFill>
+          <a:ln w="38100">
+            <a:solidFill>
+              <a:schemeClr val="tx1"/>
+            </a:solidFill>
+          </a:ln>
+        </p:spPr>
+        <p:style>
+          <a:lnRef idx="2">
+            <a:schemeClr val="accent1">
+              <a:shade val="50000"/>
+            </a:schemeClr>
+          </a:lnRef>
+          <a:fillRef idx="1">
+            <a:schemeClr val="accent1"/>
+          </a:fillRef>
+          <a:effectRef idx="0">
+            <a:schemeClr val="accent1"/>
+          </a:effectRef>
+          <a:fontRef idx="minor">
+            <a:schemeClr val="lt1"/>
+          </a:fontRef>
+        </p:style>
+        <p:txBody>
+          <a:bodyPr rot="0" spcFirstLastPara="0" vertOverflow="overflow" horzOverflow="overflow" vert="horz" wrap="square" lIns="96771" tIns="48386" rIns="96771" bIns="48386" numCol="1" spcCol="0" rtlCol="0" fromWordArt="0" anchor="ctr" anchorCtr="0" forceAA="0" compatLnSpc="1">
+            <a:prstTxWarp prst="textNoShape">
               <a:avLst/>
-            </a:prstGeom>
-            <a:noFill/>
-            <a:ln w="38100">
-              <a:solidFill>
-                <a:schemeClr val="tx1"/>
-              </a:solidFill>
-            </a:ln>
-          </p:spPr>
-          <p:style>
-            <a:lnRef idx="2">
-              <a:schemeClr val="accent1">
-                <a:shade val="50000"/>
-              </a:schemeClr>
-            </a:lnRef>
-            <a:fillRef idx="1">
-              <a:schemeClr val="accent1"/>
-            </a:fillRef>
-            <a:effectRef idx="0">
-              <a:schemeClr val="accent1"/>
-            </a:effectRef>
-            <a:fontRef idx="minor">
-              <a:schemeClr val="lt1"/>
-            </a:fontRef>
-          </p:style>
-          <p:txBody>
-            <a:bodyPr rot="0" spcFirstLastPara="0" vertOverflow="overflow" horzOverflow="overflow" vert="horz" wrap="square" lIns="96771" tIns="48386" rIns="96771" bIns="48386" numCol="1" spcCol="0" rtlCol="0" fromWordArt="0" anchor="ctr" anchorCtr="0" forceAA="0" compatLnSpc="1">
-              <a:prstTxWarp prst="textNoShape">
-                <a:avLst/>
-              </a:prstTxWarp>
-              <a:noAutofit/>
-            </a:bodyPr>
-            <a:lstStyle/>
-            <a:p>
-              <a:pPr algn="ctr"/>
-              <a:r>
-                <a:rPr lang="en-US" sz="1058" dirty="0">
-                  <a:solidFill>
-                    <a:schemeClr val="tx1"/>
-                  </a:solidFill>
-                </a:rPr>
-                <a:t>Execute</a:t>
-              </a:r>
-            </a:p>
-            <a:p>
-              <a:pPr algn="ctr"/>
-              <a:r>
-                <a:rPr lang="en-US" sz="1058" dirty="0">
-                  <a:solidFill>
-                    <a:schemeClr val="tx1"/>
-                  </a:solidFill>
-                </a:rPr>
-                <a:t>SUT</a:t>
-              </a:r>
-            </a:p>
-          </p:txBody>
-        </p:sp>
-        <p:cxnSp>
-          <p:nvCxnSpPr>
-            <p:cNvPr id="82" name="Straight Arrow Connector 81">
-              <a:extLst>
-                <a:ext uri="{FF2B5EF4-FFF2-40B4-BE49-F238E27FC236}">
-                  <a16:creationId xmlns:a16="http://schemas.microsoft.com/office/drawing/2014/main" id="{7D5D6545-3474-FE4A-A021-9481DD397071}"/>
-                </a:ext>
-              </a:extLst>
-            </p:cNvPr>
-            <p:cNvCxnSpPr>
-              <a:cxnSpLocks/>
-              <a:stCxn id="10" idx="2"/>
-              <a:endCxn id="75" idx="3"/>
-            </p:cNvCxnSpPr>
-            <p:nvPr/>
-          </p:nvCxnSpPr>
-          <p:spPr>
-            <a:xfrm flipH="1">
-              <a:off x="8557148" y="549001"/>
-              <a:ext cx="1002356" cy="0"/>
-            </a:xfrm>
-            <a:prstGeom prst="straightConnector1">
+            </a:prstTxWarp>
+            <a:noAutofit/>
+          </a:bodyPr>
+          <a:lstStyle/>
+          <a:p>
+            <a:pPr algn="ctr"/>
+            <a:r>
+              <a:rPr lang="en-US" sz="1058" dirty="0">
+                <a:solidFill>
+                  <a:schemeClr val="tx1"/>
+                </a:solidFill>
+              </a:rPr>
+              <a:t>Fix the</a:t>
+            </a:r>
+          </a:p>
+          <a:p>
+            <a:pPr algn="ctr"/>
+            <a:r>
+              <a:rPr lang="en-US" sz="1058" dirty="0">
+                <a:solidFill>
+                  <a:schemeClr val="tx1"/>
+                </a:solidFill>
+              </a:rPr>
+              <a:t>SUT</a:t>
+            </a:r>
+          </a:p>
+        </p:txBody>
+      </p:sp>
+      <p:sp>
+        <p:nvSpPr>
+          <p:cNvPr id="83" name="TextBox 82">
+            <a:extLst>
+              <a:ext uri="{FF2B5EF4-FFF2-40B4-BE49-F238E27FC236}">
+                <a16:creationId xmlns:a16="http://schemas.microsoft.com/office/drawing/2014/main" id="{A4B249D9-E1C9-4844-848F-DB7A635E6D59}"/>
+              </a:ext>
+            </a:extLst>
+          </p:cNvPr>
+          <p:cNvSpPr txBox="1"/>
+          <p:nvPr/>
+        </p:nvSpPr>
+        <p:spPr>
+          <a:xfrm>
+            <a:off x="7631741" y="1133915"/>
+            <a:ext cx="303288" cy="308674"/>
+          </a:xfrm>
+          <a:prstGeom prst="rect">
+            <a:avLst/>
+          </a:prstGeom>
+          <a:noFill/>
+        </p:spPr>
+        <p:txBody>
+          <a:bodyPr wrap="none" rtlCol="0">
+            <a:spAutoFit/>
+          </a:bodyPr>
+          <a:lstStyle/>
+          <a:p>
+            <a:r>
+              <a:rPr lang="en-US" sz="1406" b="1" dirty="0"/>
+              <a:t>N</a:t>
+            </a:r>
+          </a:p>
+        </p:txBody>
+      </p:sp>
+      <p:sp>
+        <p:nvSpPr>
+          <p:cNvPr id="75" name="Process 74">
+            <a:extLst>
+              <a:ext uri="{FF2B5EF4-FFF2-40B4-BE49-F238E27FC236}">
+                <a16:creationId xmlns:a16="http://schemas.microsoft.com/office/drawing/2014/main" id="{95D02A53-9653-AA4E-9894-8601E90521A9}"/>
+              </a:ext>
+            </a:extLst>
+          </p:cNvPr>
+          <p:cNvSpPr/>
+          <p:nvPr/>
+        </p:nvSpPr>
+        <p:spPr>
+          <a:xfrm>
+            <a:off x="7916909" y="2319691"/>
+            <a:ext cx="763526" cy="551687"/>
+          </a:xfrm>
+          <a:prstGeom prst="flowChartProcess">
+            <a:avLst/>
+          </a:prstGeom>
+          <a:noFill/>
+          <a:ln w="38100">
+            <a:solidFill>
+              <a:schemeClr val="tx1"/>
+            </a:solidFill>
+          </a:ln>
+        </p:spPr>
+        <p:style>
+          <a:lnRef idx="2">
+            <a:schemeClr val="accent1">
+              <a:shade val="50000"/>
+            </a:schemeClr>
+          </a:lnRef>
+          <a:fillRef idx="1">
+            <a:schemeClr val="accent1"/>
+          </a:fillRef>
+          <a:effectRef idx="0">
+            <a:schemeClr val="accent1"/>
+          </a:effectRef>
+          <a:fontRef idx="minor">
+            <a:schemeClr val="lt1"/>
+          </a:fontRef>
+        </p:style>
+        <p:txBody>
+          <a:bodyPr rot="0" spcFirstLastPara="0" vertOverflow="overflow" horzOverflow="overflow" vert="horz" wrap="square" lIns="96771" tIns="48386" rIns="96771" bIns="48386" numCol="1" spcCol="0" rtlCol="0" fromWordArt="0" anchor="ctr" anchorCtr="0" forceAA="0" compatLnSpc="1">
+            <a:prstTxWarp prst="textNoShape">
               <a:avLst/>
-            </a:prstGeom>
-            <a:ln w="38100">
-              <a:solidFill>
-                <a:schemeClr val="tx1"/>
-              </a:solidFill>
-              <a:tailEnd type="triangle"/>
-            </a:ln>
-          </p:spPr>
-          <p:style>
-            <a:lnRef idx="1">
-              <a:schemeClr val="accent1"/>
-            </a:lnRef>
-            <a:fillRef idx="0">
-              <a:schemeClr val="accent1"/>
-            </a:fillRef>
-            <a:effectRef idx="0">
-              <a:schemeClr val="accent1"/>
-            </a:effectRef>
-            <a:fontRef idx="minor">
+            </a:prstTxWarp>
+            <a:noAutofit/>
+          </a:bodyPr>
+          <a:lstStyle/>
+          <a:p>
+            <a:pPr algn="ctr"/>
+            <a:r>
+              <a:rPr lang="en-US" sz="1058" dirty="0">
+                <a:solidFill>
+                  <a:schemeClr val="tx1"/>
+                </a:solidFill>
+              </a:rPr>
+              <a:t>Execute</a:t>
+            </a:r>
+          </a:p>
+          <a:p>
+            <a:pPr algn="ctr"/>
+            <a:r>
+              <a:rPr lang="en-US" sz="1058" dirty="0">
+                <a:solidFill>
+                  <a:schemeClr val="tx1"/>
+                </a:solidFill>
+              </a:rPr>
+              <a:t>the SUT</a:t>
+            </a:r>
+          </a:p>
+        </p:txBody>
+      </p:sp>
+      <p:cxnSp>
+        <p:nvCxnSpPr>
+          <p:cNvPr id="82" name="Straight Arrow Connector 81">
+            <a:extLst>
+              <a:ext uri="{FF2B5EF4-FFF2-40B4-BE49-F238E27FC236}">
+                <a16:creationId xmlns:a16="http://schemas.microsoft.com/office/drawing/2014/main" id="{7D5D6545-3474-FE4A-A021-9481DD397071}"/>
+              </a:ext>
+            </a:extLst>
+          </p:cNvPr>
+          <p:cNvCxnSpPr>
+            <a:cxnSpLocks/>
+            <a:stCxn id="10" idx="1"/>
+            <a:endCxn id="75" idx="2"/>
+          </p:cNvCxnSpPr>
+          <p:nvPr/>
+        </p:nvCxnSpPr>
+        <p:spPr>
+          <a:xfrm flipH="1" flipV="1">
+            <a:off x="8298672" y="2871378"/>
+            <a:ext cx="4180" cy="229628"/>
+          </a:xfrm>
+          <a:prstGeom prst="straightConnector1">
+            <a:avLst/>
+          </a:prstGeom>
+          <a:ln w="38100">
+            <a:solidFill>
               <a:schemeClr val="tx1"/>
-            </a:fontRef>
-          </p:style>
-        </p:cxnSp>
-        <p:cxnSp>
-          <p:nvCxnSpPr>
-            <p:cNvPr id="91" name="Straight Arrow Connector 90">
-              <a:extLst>
-                <a:ext uri="{FF2B5EF4-FFF2-40B4-BE49-F238E27FC236}">
-                  <a16:creationId xmlns:a16="http://schemas.microsoft.com/office/drawing/2014/main" id="{5636EFDB-6416-3C4F-AAE1-68CB8C1380FD}"/>
-                </a:ext>
-              </a:extLst>
-            </p:cNvPr>
-            <p:cNvCxnSpPr>
-              <a:cxnSpLocks/>
-              <a:stCxn id="75" idx="2"/>
-              <a:endCxn id="61" idx="0"/>
-            </p:cNvCxnSpPr>
-            <p:nvPr/>
-          </p:nvCxnSpPr>
-          <p:spPr>
-            <a:xfrm>
-              <a:off x="8014197" y="941311"/>
-              <a:ext cx="8646" cy="480998"/>
-            </a:xfrm>
-            <a:prstGeom prst="straightConnector1">
-              <a:avLst/>
-            </a:prstGeom>
-            <a:ln w="38100">
-              <a:solidFill>
-                <a:schemeClr val="tx1"/>
-              </a:solidFill>
-              <a:tailEnd type="triangle"/>
-            </a:ln>
-          </p:spPr>
-          <p:style>
-            <a:lnRef idx="1">
-              <a:schemeClr val="accent1"/>
-            </a:lnRef>
-            <a:fillRef idx="0">
-              <a:schemeClr val="accent1"/>
-            </a:fillRef>
-            <a:effectRef idx="0">
-              <a:schemeClr val="accent1"/>
-            </a:effectRef>
-            <a:fontRef idx="minor">
+            </a:solidFill>
+            <a:tailEnd type="triangle"/>
+          </a:ln>
+        </p:spPr>
+        <p:style>
+          <a:lnRef idx="1">
+            <a:schemeClr val="accent1"/>
+          </a:lnRef>
+          <a:fillRef idx="0">
+            <a:schemeClr val="accent1"/>
+          </a:fillRef>
+          <a:effectRef idx="0">
+            <a:schemeClr val="accent1"/>
+          </a:effectRef>
+          <a:fontRef idx="minor">
+            <a:schemeClr val="tx1"/>
+          </a:fontRef>
+        </p:style>
+      </p:cxnSp>
+      <p:cxnSp>
+        <p:nvCxnSpPr>
+          <p:cNvPr id="91" name="Straight Arrow Connector 90">
+            <a:extLst>
+              <a:ext uri="{FF2B5EF4-FFF2-40B4-BE49-F238E27FC236}">
+                <a16:creationId xmlns:a16="http://schemas.microsoft.com/office/drawing/2014/main" id="{5636EFDB-6416-3C4F-AAE1-68CB8C1380FD}"/>
+              </a:ext>
+            </a:extLst>
+          </p:cNvPr>
+          <p:cNvCxnSpPr>
+            <a:cxnSpLocks/>
+            <a:stCxn id="75" idx="0"/>
+            <a:endCxn id="61" idx="2"/>
+          </p:cNvCxnSpPr>
+          <p:nvPr/>
+        </p:nvCxnSpPr>
+        <p:spPr>
+          <a:xfrm flipH="1" flipV="1">
+            <a:off x="8278502" y="1689789"/>
+            <a:ext cx="20170" cy="629902"/>
+          </a:xfrm>
+          <a:prstGeom prst="straightConnector1">
+            <a:avLst/>
+          </a:prstGeom>
+          <a:ln w="38100">
+            <a:solidFill>
               <a:schemeClr val="tx1"/>
-            </a:fontRef>
-          </p:style>
-        </p:cxnSp>
-        <p:cxnSp>
-          <p:nvCxnSpPr>
-            <p:cNvPr id="111" name="Straight Arrow Connector 110">
-              <a:extLst>
-                <a:ext uri="{FF2B5EF4-FFF2-40B4-BE49-F238E27FC236}">
-                  <a16:creationId xmlns:a16="http://schemas.microsoft.com/office/drawing/2014/main" id="{40E9E8E8-D542-3449-B49A-14AB4A47CBA7}"/>
-                </a:ext>
-              </a:extLst>
-            </p:cNvPr>
-            <p:cNvCxnSpPr>
-              <a:cxnSpLocks/>
-              <a:stCxn id="61" idx="1"/>
-              <a:endCxn id="70" idx="3"/>
-            </p:cNvCxnSpPr>
-            <p:nvPr/>
-          </p:nvCxnSpPr>
-          <p:spPr>
-            <a:xfrm rot="10800000">
-              <a:off x="5688062" y="633549"/>
-              <a:ext cx="1853074" cy="1157860"/>
-            </a:xfrm>
-            <a:prstGeom prst="bentConnector3">
-              <a:avLst>
-                <a:gd name="adj1" fmla="val 50000"/>
-              </a:avLst>
-            </a:prstGeom>
-            <a:ln w="38100">
-              <a:solidFill>
-                <a:schemeClr val="tx1"/>
-              </a:solidFill>
-              <a:tailEnd type="triangle"/>
-            </a:ln>
-          </p:spPr>
-          <p:style>
-            <a:lnRef idx="1">
-              <a:schemeClr val="accent1"/>
-            </a:lnRef>
-            <a:fillRef idx="0">
-              <a:schemeClr val="accent1"/>
-            </a:fillRef>
-            <a:effectRef idx="0">
-              <a:schemeClr val="accent1"/>
-            </a:effectRef>
-            <a:fontRef idx="minor">
+            </a:solidFill>
+            <a:tailEnd type="triangle"/>
+          </a:ln>
+        </p:spPr>
+        <p:style>
+          <a:lnRef idx="1">
+            <a:schemeClr val="accent1"/>
+          </a:lnRef>
+          <a:fillRef idx="0">
+            <a:schemeClr val="accent1"/>
+          </a:fillRef>
+          <a:effectRef idx="0">
+            <a:schemeClr val="accent1"/>
+          </a:effectRef>
+          <a:fontRef idx="minor">
+            <a:schemeClr val="tx1"/>
+          </a:fontRef>
+        </p:style>
+      </p:cxnSp>
+      <p:cxnSp>
+        <p:nvCxnSpPr>
+          <p:cNvPr id="114" name="Straight Arrow Connector 110">
+            <a:extLst>
+              <a:ext uri="{FF2B5EF4-FFF2-40B4-BE49-F238E27FC236}">
+                <a16:creationId xmlns:a16="http://schemas.microsoft.com/office/drawing/2014/main" id="{0A261515-ED31-C041-9227-227503D6C0FE}"/>
+              </a:ext>
+            </a:extLst>
+          </p:cNvPr>
+          <p:cNvCxnSpPr>
+            <a:cxnSpLocks/>
+            <a:stCxn id="70" idx="1"/>
+            <a:endCxn id="71" idx="0"/>
+          </p:cNvCxnSpPr>
+          <p:nvPr/>
+        </p:nvCxnSpPr>
+        <p:spPr>
+          <a:xfrm rot="10800000">
+            <a:off x="1713660" y="357638"/>
+            <a:ext cx="6179159" cy="317986"/>
+          </a:xfrm>
+          <a:prstGeom prst="bentConnector4">
+            <a:avLst>
+              <a:gd name="adj1" fmla="val 45536"/>
+              <a:gd name="adj2" fmla="val 171890"/>
+            </a:avLst>
+          </a:prstGeom>
+          <a:ln w="38100">
+            <a:solidFill>
               <a:schemeClr val="tx1"/>
-            </a:fontRef>
-          </p:style>
-        </p:cxnSp>
-        <p:cxnSp>
-          <p:nvCxnSpPr>
-            <p:cNvPr id="114" name="Straight Arrow Connector 110">
-              <a:extLst>
-                <a:ext uri="{FF2B5EF4-FFF2-40B4-BE49-F238E27FC236}">
-                  <a16:creationId xmlns:a16="http://schemas.microsoft.com/office/drawing/2014/main" id="{0A261515-ED31-C041-9227-227503D6C0FE}"/>
-                </a:ext>
-              </a:extLst>
-            </p:cNvPr>
-            <p:cNvCxnSpPr>
-              <a:cxnSpLocks/>
-              <a:stCxn id="70" idx="1"/>
-              <a:endCxn id="71" idx="0"/>
-            </p:cNvCxnSpPr>
-            <p:nvPr/>
-          </p:nvCxnSpPr>
-          <p:spPr>
-            <a:xfrm rot="10800000" flipV="1">
-              <a:off x="3191106" y="633549"/>
-              <a:ext cx="1399902" cy="634103"/>
-            </a:xfrm>
-            <a:prstGeom prst="bentConnector2">
-              <a:avLst/>
-            </a:prstGeom>
-            <a:ln w="38100">
-              <a:solidFill>
-                <a:schemeClr val="tx1"/>
-              </a:solidFill>
-              <a:tailEnd type="triangle"/>
-            </a:ln>
-          </p:spPr>
-          <p:style>
-            <a:lnRef idx="1">
-              <a:schemeClr val="accent1"/>
-            </a:lnRef>
-            <a:fillRef idx="0">
-              <a:schemeClr val="accent1"/>
-            </a:fillRef>
-            <a:effectRef idx="0">
-              <a:schemeClr val="accent1"/>
-            </a:effectRef>
-            <a:fontRef idx="minor">
-              <a:schemeClr val="tx1"/>
-            </a:fontRef>
-          </p:style>
-        </p:cxnSp>
-      </p:grpSp>
+            </a:solidFill>
+            <a:tailEnd type="triangle"/>
+          </a:ln>
+        </p:spPr>
+        <p:style>
+          <a:lnRef idx="1">
+            <a:schemeClr val="accent1"/>
+          </a:lnRef>
+          <a:fillRef idx="0">
+            <a:schemeClr val="accent1"/>
+          </a:fillRef>
+          <a:effectRef idx="0">
+            <a:schemeClr val="accent1"/>
+          </a:effectRef>
+          <a:fontRef idx="minor">
+            <a:schemeClr val="tx1"/>
+          </a:fontRef>
+        </p:style>
+      </p:cxnSp>
       <p:grpSp>
         <p:nvGrpSpPr>
           <p:cNvPr id="6" name="Group 5">
@@ -6068,10 +5868,10 @@
         </p:nvGrpSpPr>
         <p:grpSpPr>
           <a:xfrm>
-            <a:off x="2329717" y="4671257"/>
-            <a:ext cx="4932404" cy="1072332"/>
-            <a:chOff x="3313375" y="6643564"/>
-            <a:chExt cx="7014974" cy="1525095"/>
+            <a:off x="2329717" y="4813434"/>
+            <a:ext cx="6005826" cy="1469914"/>
+            <a:chOff x="3313375" y="6078094"/>
+            <a:chExt cx="8541610" cy="2090565"/>
           </a:xfrm>
         </p:grpSpPr>
         <p:grpSp>
@@ -6314,8 +6114,8 @@
           </p:nvCxnSpPr>
           <p:spPr>
             <a:xfrm>
-              <a:off x="6886779" y="6643564"/>
-              <a:ext cx="9323" cy="647132"/>
+              <a:off x="6896105" y="6078094"/>
+              <a:ext cx="0" cy="1212597"/>
             </a:xfrm>
             <a:prstGeom prst="straightConnector1">
               <a:avLst/>
@@ -6360,8 +6160,8 @@
           </p:nvCxnSpPr>
           <p:spPr>
             <a:xfrm flipV="1">
-              <a:off x="7527844" y="6732478"/>
-              <a:ext cx="2800505" cy="997202"/>
+              <a:off x="7527847" y="7147066"/>
+              <a:ext cx="4327138" cy="582610"/>
             </a:xfrm>
             <a:prstGeom prst="bentConnector2">
               <a:avLst/>
@@ -6459,6 +6259,738 @@
           </p:txBody>
         </p:sp>
       </p:grpSp>
+      <p:sp>
+        <p:nvSpPr>
+          <p:cNvPr id="30" name="Rectangle 29">
+            <a:extLst>
+              <a:ext uri="{FF2B5EF4-FFF2-40B4-BE49-F238E27FC236}">
+                <a16:creationId xmlns:a16="http://schemas.microsoft.com/office/drawing/2014/main" id="{765D2C01-E051-8341-B249-8C1454E6B6CB}"/>
+              </a:ext>
+            </a:extLst>
+          </p:cNvPr>
+          <p:cNvSpPr/>
+          <p:nvPr/>
+        </p:nvSpPr>
+        <p:spPr>
+          <a:xfrm>
+            <a:off x="2066356" y="1385432"/>
+            <a:ext cx="1614313" cy="255455"/>
+          </a:xfrm>
+          <a:prstGeom prst="rect">
+            <a:avLst/>
+          </a:prstGeom>
+        </p:spPr>
+        <p:txBody>
+          <a:bodyPr wrap="square">
+            <a:spAutoFit/>
+          </a:bodyPr>
+          <a:lstStyle/>
+          <a:p>
+            <a:pPr algn="ctr"/>
+            <a:r>
+              <a:rPr lang="en-US" sz="1060" dirty="0"/>
+              <a:t>Create Mutants</a:t>
+            </a:r>
+          </a:p>
+        </p:txBody>
+      </p:sp>
+      <p:sp>
+        <p:nvSpPr>
+          <p:cNvPr id="76" name="Process 75">
+            <a:extLst>
+              <a:ext uri="{FF2B5EF4-FFF2-40B4-BE49-F238E27FC236}">
+                <a16:creationId xmlns:a16="http://schemas.microsoft.com/office/drawing/2014/main" id="{EDEDC24C-427B-7048-90D4-78A7DDEAA9F2}"/>
+              </a:ext>
+            </a:extLst>
+          </p:cNvPr>
+          <p:cNvSpPr/>
+          <p:nvPr/>
+        </p:nvSpPr>
+        <p:spPr>
+          <a:xfrm>
+            <a:off x="2167957" y="1644030"/>
+            <a:ext cx="1433688" cy="317134"/>
+          </a:xfrm>
+          <a:prstGeom prst="flowChartProcess">
+            <a:avLst/>
+          </a:prstGeom>
+          <a:noFill/>
+          <a:ln w="28575">
+            <a:solidFill>
+              <a:schemeClr val="tx1"/>
+            </a:solidFill>
+            <a:prstDash val="sysDash"/>
+          </a:ln>
+        </p:spPr>
+        <p:style>
+          <a:lnRef idx="2">
+            <a:schemeClr val="accent1">
+              <a:shade val="50000"/>
+            </a:schemeClr>
+          </a:lnRef>
+          <a:fillRef idx="1">
+            <a:schemeClr val="accent1"/>
+          </a:fillRef>
+          <a:effectRef idx="0">
+            <a:schemeClr val="accent1"/>
+          </a:effectRef>
+          <a:fontRef idx="minor">
+            <a:schemeClr val="lt1"/>
+          </a:fontRef>
+        </p:style>
+        <p:txBody>
+          <a:bodyPr rot="0" spcFirstLastPara="0" vertOverflow="overflow" horzOverflow="overflow" vert="horz" wrap="square" lIns="96771" tIns="48386" rIns="96771" bIns="48386" numCol="1" spcCol="0" rtlCol="0" fromWordArt="0" anchor="ctr" anchorCtr="0" forceAA="0" compatLnSpc="1">
+            <a:prstTxWarp prst="textNoShape">
+              <a:avLst/>
+            </a:prstTxWarp>
+            <a:noAutofit/>
+          </a:bodyPr>
+          <a:lstStyle/>
+          <a:p>
+            <a:pPr algn="ctr"/>
+            <a:r>
+              <a:rPr lang="en-US" sz="1058" dirty="0">
+                <a:solidFill>
+                  <a:schemeClr val="tx1"/>
+                </a:solidFill>
+              </a:rPr>
+              <a:t>Select Mutants</a:t>
+            </a:r>
+          </a:p>
+        </p:txBody>
+      </p:sp>
+      <p:sp>
+        <p:nvSpPr>
+          <p:cNvPr id="78" name="Process 77">
+            <a:extLst>
+              <a:ext uri="{FF2B5EF4-FFF2-40B4-BE49-F238E27FC236}">
+                <a16:creationId xmlns:a16="http://schemas.microsoft.com/office/drawing/2014/main" id="{2D7096C5-BF8A-7A43-9E1E-28E2C39E8699}"/>
+              </a:ext>
+            </a:extLst>
+          </p:cNvPr>
+          <p:cNvSpPr/>
+          <p:nvPr/>
+        </p:nvSpPr>
+        <p:spPr>
+          <a:xfrm>
+            <a:off x="2173603" y="2067363"/>
+            <a:ext cx="1428043" cy="367934"/>
+          </a:xfrm>
+          <a:prstGeom prst="flowChartProcess">
+            <a:avLst/>
+          </a:prstGeom>
+          <a:noFill/>
+          <a:ln w="28575">
+            <a:solidFill>
+              <a:schemeClr val="tx1"/>
+            </a:solidFill>
+            <a:prstDash val="sysDash"/>
+          </a:ln>
+        </p:spPr>
+        <p:style>
+          <a:lnRef idx="2">
+            <a:schemeClr val="accent1">
+              <a:shade val="50000"/>
+            </a:schemeClr>
+          </a:lnRef>
+          <a:fillRef idx="1">
+            <a:schemeClr val="accent1"/>
+          </a:fillRef>
+          <a:effectRef idx="0">
+            <a:schemeClr val="accent1"/>
+          </a:effectRef>
+          <a:fontRef idx="minor">
+            <a:schemeClr val="lt1"/>
+          </a:fontRef>
+        </p:style>
+        <p:txBody>
+          <a:bodyPr rot="0" spcFirstLastPara="0" vertOverflow="overflow" horzOverflow="overflow" vert="horz" wrap="square" lIns="96771" tIns="48386" rIns="96771" bIns="48386" numCol="1" spcCol="0" rtlCol="0" fromWordArt="0" anchor="ctr" anchorCtr="0" forceAA="0" compatLnSpc="1">
+            <a:prstTxWarp prst="textNoShape">
+              <a:avLst/>
+            </a:prstTxWarp>
+            <a:noAutofit/>
+          </a:bodyPr>
+          <a:lstStyle/>
+          <a:p>
+            <a:pPr algn="ctr"/>
+            <a:r>
+              <a:rPr lang="en-US" sz="1058" dirty="0">
+                <a:solidFill>
+                  <a:schemeClr val="tx1"/>
+                </a:solidFill>
+              </a:rPr>
+              <a:t>Address compile-time scalability issues</a:t>
+            </a:r>
+          </a:p>
+        </p:txBody>
+      </p:sp>
+      <p:sp>
+        <p:nvSpPr>
+          <p:cNvPr id="97" name="Process 96">
+            <a:extLst>
+              <a:ext uri="{FF2B5EF4-FFF2-40B4-BE49-F238E27FC236}">
+                <a16:creationId xmlns:a16="http://schemas.microsoft.com/office/drawing/2014/main" id="{B58E17D1-CA0E-9B47-9476-EA70A3548DE9}"/>
+              </a:ext>
+            </a:extLst>
+          </p:cNvPr>
+          <p:cNvSpPr/>
+          <p:nvPr/>
+        </p:nvSpPr>
+        <p:spPr>
+          <a:xfrm>
+            <a:off x="2190536" y="2524563"/>
+            <a:ext cx="1428043" cy="542912"/>
+          </a:xfrm>
+          <a:prstGeom prst="flowChartProcess">
+            <a:avLst/>
+          </a:prstGeom>
+          <a:noFill/>
+          <a:ln w="28575">
+            <a:solidFill>
+              <a:schemeClr val="tx1"/>
+            </a:solidFill>
+            <a:prstDash val="sysDash"/>
+          </a:ln>
+        </p:spPr>
+        <p:style>
+          <a:lnRef idx="2">
+            <a:schemeClr val="accent1">
+              <a:shade val="50000"/>
+            </a:schemeClr>
+          </a:lnRef>
+          <a:fillRef idx="1">
+            <a:schemeClr val="accent1"/>
+          </a:fillRef>
+          <a:effectRef idx="0">
+            <a:schemeClr val="accent1"/>
+          </a:effectRef>
+          <a:fontRef idx="minor">
+            <a:schemeClr val="lt1"/>
+          </a:fontRef>
+        </p:style>
+        <p:txBody>
+          <a:bodyPr rot="0" spcFirstLastPara="0" vertOverflow="overflow" horzOverflow="overflow" vert="horz" wrap="square" lIns="96771" tIns="48386" rIns="96771" bIns="48386" numCol="1" spcCol="0" rtlCol="0" fromWordArt="0" anchor="ctr" anchorCtr="0" forceAA="0" compatLnSpc="1">
+            <a:prstTxWarp prst="textNoShape">
+              <a:avLst/>
+            </a:prstTxWarp>
+            <a:noAutofit/>
+          </a:bodyPr>
+          <a:lstStyle/>
+          <a:p>
+            <a:pPr algn="ctr"/>
+            <a:r>
+              <a:rPr lang="en-US" sz="1058" dirty="0">
+                <a:solidFill>
+                  <a:schemeClr val="tx1"/>
+                </a:solidFill>
+              </a:rPr>
+              <a:t>Identify equivalent and redundant mutants</a:t>
+            </a:r>
+          </a:p>
+        </p:txBody>
+      </p:sp>
+      <p:cxnSp>
+        <p:nvCxnSpPr>
+          <p:cNvPr id="123" name="Straight Arrow Connector 122">
+            <a:extLst>
+              <a:ext uri="{FF2B5EF4-FFF2-40B4-BE49-F238E27FC236}">
+                <a16:creationId xmlns:a16="http://schemas.microsoft.com/office/drawing/2014/main" id="{22CC33EE-FBF4-7044-83B8-D688997F92F3}"/>
+              </a:ext>
+            </a:extLst>
+          </p:cNvPr>
+          <p:cNvCxnSpPr>
+            <a:cxnSpLocks/>
+            <a:stCxn id="61" idx="0"/>
+            <a:endCxn id="70" idx="2"/>
+          </p:cNvCxnSpPr>
+          <p:nvPr/>
+        </p:nvCxnSpPr>
+        <p:spPr>
+          <a:xfrm flipV="1">
+            <a:off x="8278502" y="900978"/>
+            <a:ext cx="0" cy="269763"/>
+          </a:xfrm>
+          <a:prstGeom prst="straightConnector1">
+            <a:avLst/>
+          </a:prstGeom>
+          <a:ln w="38100">
+            <a:solidFill>
+              <a:schemeClr val="tx1"/>
+            </a:solidFill>
+            <a:tailEnd type="triangle"/>
+          </a:ln>
+        </p:spPr>
+        <p:style>
+          <a:lnRef idx="1">
+            <a:schemeClr val="accent1"/>
+          </a:lnRef>
+          <a:fillRef idx="0">
+            <a:schemeClr val="accent1"/>
+          </a:fillRef>
+          <a:effectRef idx="0">
+            <a:schemeClr val="accent1"/>
+          </a:effectRef>
+          <a:fontRef idx="minor">
+            <a:schemeClr val="tx1"/>
+          </a:fontRef>
+        </p:style>
+      </p:cxnSp>
+      <p:cxnSp>
+        <p:nvCxnSpPr>
+          <p:cNvPr id="137" name="Straight Arrow Connector 110">
+            <a:extLst>
+              <a:ext uri="{FF2B5EF4-FFF2-40B4-BE49-F238E27FC236}">
+                <a16:creationId xmlns:a16="http://schemas.microsoft.com/office/drawing/2014/main" id="{DEB464D8-E213-C84E-AB92-A35E7C2D1530}"/>
+              </a:ext>
+            </a:extLst>
+          </p:cNvPr>
+          <p:cNvCxnSpPr>
+            <a:cxnSpLocks/>
+            <a:stCxn id="61" idx="1"/>
+            <a:endCxn id="13" idx="0"/>
+          </p:cNvCxnSpPr>
+          <p:nvPr/>
+        </p:nvCxnSpPr>
+        <p:spPr>
+          <a:xfrm rot="10800000">
+            <a:off x="6344844" y="1286467"/>
+            <a:ext cx="1594959" cy="143798"/>
+          </a:xfrm>
+          <a:prstGeom prst="bentConnector4">
+            <a:avLst>
+              <a:gd name="adj1" fmla="val 23812"/>
+              <a:gd name="adj2" fmla="val 258973"/>
+            </a:avLst>
+          </a:prstGeom>
+          <a:ln w="38100">
+            <a:solidFill>
+              <a:schemeClr val="tx1"/>
+            </a:solidFill>
+            <a:tailEnd type="triangle"/>
+          </a:ln>
+        </p:spPr>
+        <p:style>
+          <a:lnRef idx="1">
+            <a:schemeClr val="accent1"/>
+          </a:lnRef>
+          <a:fillRef idx="0">
+            <a:schemeClr val="accent1"/>
+          </a:fillRef>
+          <a:effectRef idx="0">
+            <a:schemeClr val="accent1"/>
+          </a:effectRef>
+          <a:fontRef idx="minor">
+            <a:schemeClr val="tx1"/>
+          </a:fontRef>
+        </p:style>
+      </p:cxnSp>
+      <p:sp>
+        <p:nvSpPr>
+          <p:cNvPr id="129" name="Rectangle 128">
+            <a:extLst>
+              <a:ext uri="{FF2B5EF4-FFF2-40B4-BE49-F238E27FC236}">
+                <a16:creationId xmlns:a16="http://schemas.microsoft.com/office/drawing/2014/main" id="{A22292C4-4847-E241-8517-566C13420473}"/>
+              </a:ext>
+            </a:extLst>
+          </p:cNvPr>
+          <p:cNvSpPr/>
+          <p:nvPr/>
+        </p:nvSpPr>
+        <p:spPr>
+          <a:xfrm>
+            <a:off x="5526158" y="1391478"/>
+            <a:ext cx="1656520" cy="255455"/>
+          </a:xfrm>
+          <a:prstGeom prst="rect">
+            <a:avLst/>
+          </a:prstGeom>
+        </p:spPr>
+        <p:txBody>
+          <a:bodyPr wrap="square">
+            <a:spAutoFit/>
+          </a:bodyPr>
+          <a:lstStyle/>
+          <a:p>
+            <a:pPr algn="ctr"/>
+            <a:r>
+              <a:rPr lang="en-US" sz="1060" dirty="0"/>
+              <a:t>Execute Mutants</a:t>
+            </a:r>
+          </a:p>
+        </p:txBody>
+      </p:sp>
+      <p:sp>
+        <p:nvSpPr>
+          <p:cNvPr id="138" name="Process 137">
+            <a:extLst>
+              <a:ext uri="{FF2B5EF4-FFF2-40B4-BE49-F238E27FC236}">
+                <a16:creationId xmlns:a16="http://schemas.microsoft.com/office/drawing/2014/main" id="{EDE67405-3A6E-084F-82D4-0C33607862EF}"/>
+              </a:ext>
+            </a:extLst>
+          </p:cNvPr>
+          <p:cNvSpPr/>
+          <p:nvPr/>
+        </p:nvSpPr>
+        <p:spPr>
+          <a:xfrm>
+            <a:off x="5652300" y="1663172"/>
+            <a:ext cx="1428043" cy="367934"/>
+          </a:xfrm>
+          <a:prstGeom prst="flowChartProcess">
+            <a:avLst/>
+          </a:prstGeom>
+          <a:noFill/>
+          <a:ln w="28575">
+            <a:solidFill>
+              <a:schemeClr val="tx1"/>
+            </a:solidFill>
+            <a:prstDash val="sysDash"/>
+          </a:ln>
+        </p:spPr>
+        <p:style>
+          <a:lnRef idx="2">
+            <a:schemeClr val="accent1">
+              <a:shade val="50000"/>
+            </a:schemeClr>
+          </a:lnRef>
+          <a:fillRef idx="1">
+            <a:schemeClr val="accent1"/>
+          </a:fillRef>
+          <a:effectRef idx="0">
+            <a:schemeClr val="accent1"/>
+          </a:effectRef>
+          <a:fontRef idx="minor">
+            <a:schemeClr val="lt1"/>
+          </a:fontRef>
+        </p:style>
+        <p:txBody>
+          <a:bodyPr rot="0" spcFirstLastPara="0" vertOverflow="overflow" horzOverflow="overflow" vert="horz" wrap="square" lIns="96771" tIns="48386" rIns="96771" bIns="48386" numCol="1" spcCol="0" rtlCol="0" fromWordArt="0" anchor="ctr" anchorCtr="0" forceAA="0" compatLnSpc="1">
+            <a:prstTxWarp prst="textNoShape">
+              <a:avLst/>
+            </a:prstTxWarp>
+            <a:noAutofit/>
+          </a:bodyPr>
+          <a:lstStyle/>
+          <a:p>
+            <a:pPr algn="ctr"/>
+            <a:r>
+              <a:rPr lang="en-US" sz="1058" dirty="0">
+                <a:solidFill>
+                  <a:schemeClr val="tx1"/>
+                </a:solidFill>
+              </a:rPr>
+              <a:t>Address compile-time scalability issues</a:t>
+            </a:r>
+          </a:p>
+        </p:txBody>
+      </p:sp>
+      <p:sp>
+        <p:nvSpPr>
+          <p:cNvPr id="139" name="Process 138">
+            <a:extLst>
+              <a:ext uri="{FF2B5EF4-FFF2-40B4-BE49-F238E27FC236}">
+                <a16:creationId xmlns:a16="http://schemas.microsoft.com/office/drawing/2014/main" id="{F4D3DE48-A2A7-3847-8A6B-A185AEBF3C8D}"/>
+              </a:ext>
+            </a:extLst>
+          </p:cNvPr>
+          <p:cNvSpPr/>
+          <p:nvPr/>
+        </p:nvSpPr>
+        <p:spPr>
+          <a:xfrm>
+            <a:off x="5669233" y="2120372"/>
+            <a:ext cx="1428043" cy="542912"/>
+          </a:xfrm>
+          <a:prstGeom prst="flowChartProcess">
+            <a:avLst/>
+          </a:prstGeom>
+          <a:noFill/>
+          <a:ln w="28575">
+            <a:solidFill>
+              <a:schemeClr val="tx1"/>
+            </a:solidFill>
+            <a:prstDash val="sysDash"/>
+          </a:ln>
+        </p:spPr>
+        <p:style>
+          <a:lnRef idx="2">
+            <a:schemeClr val="accent1">
+              <a:shade val="50000"/>
+            </a:schemeClr>
+          </a:lnRef>
+          <a:fillRef idx="1">
+            <a:schemeClr val="accent1"/>
+          </a:fillRef>
+          <a:effectRef idx="0">
+            <a:schemeClr val="accent1"/>
+          </a:effectRef>
+          <a:fontRef idx="minor">
+            <a:schemeClr val="lt1"/>
+          </a:fontRef>
+        </p:style>
+        <p:txBody>
+          <a:bodyPr rot="0" spcFirstLastPara="0" vertOverflow="overflow" horzOverflow="overflow" vert="horz" wrap="square" lIns="96771" tIns="48386" rIns="96771" bIns="48386" numCol="1" spcCol="0" rtlCol="0" fromWordArt="0" anchor="ctr" anchorCtr="0" forceAA="0" compatLnSpc="1">
+            <a:prstTxWarp prst="textNoShape">
+              <a:avLst/>
+            </a:prstTxWarp>
+            <a:noAutofit/>
+          </a:bodyPr>
+          <a:lstStyle/>
+          <a:p>
+            <a:pPr algn="ctr"/>
+            <a:r>
+              <a:rPr lang="en-US" sz="1058" dirty="0">
+                <a:solidFill>
+                  <a:schemeClr val="tx1"/>
+                </a:solidFill>
+              </a:rPr>
+              <a:t>Identify equivalent and redundant mutants</a:t>
+            </a:r>
+          </a:p>
+        </p:txBody>
+      </p:sp>
+      <p:sp>
+        <p:nvSpPr>
+          <p:cNvPr id="146" name="Data 145">
+            <a:extLst>
+              <a:ext uri="{FF2B5EF4-FFF2-40B4-BE49-F238E27FC236}">
+                <a16:creationId xmlns:a16="http://schemas.microsoft.com/office/drawing/2014/main" id="{01CD9F8F-E0DB-5942-8526-E0B2883D70C4}"/>
+              </a:ext>
+            </a:extLst>
+          </p:cNvPr>
+          <p:cNvSpPr/>
+          <p:nvPr/>
+        </p:nvSpPr>
+        <p:spPr>
+          <a:xfrm>
+            <a:off x="4068418" y="1318158"/>
+            <a:ext cx="1099931" cy="390020"/>
+          </a:xfrm>
+          <a:prstGeom prst="flowChartInputOutput">
+            <a:avLst/>
+          </a:prstGeom>
+          <a:noFill/>
+          <a:ln w="38100">
+            <a:solidFill>
+              <a:schemeClr val="tx1"/>
+            </a:solidFill>
+          </a:ln>
+        </p:spPr>
+        <p:style>
+          <a:lnRef idx="2">
+            <a:schemeClr val="accent1">
+              <a:shade val="50000"/>
+            </a:schemeClr>
+          </a:lnRef>
+          <a:fillRef idx="1">
+            <a:schemeClr val="accent1"/>
+          </a:fillRef>
+          <a:effectRef idx="0">
+            <a:schemeClr val="accent1"/>
+          </a:effectRef>
+          <a:fontRef idx="minor">
+            <a:schemeClr val="lt1"/>
+          </a:fontRef>
+        </p:style>
+        <p:txBody>
+          <a:bodyPr rot="0" spcFirstLastPara="0" vertOverflow="overflow" horzOverflow="overflow" vert="horz" wrap="square" lIns="96771" tIns="48386" rIns="96771" bIns="48386" numCol="1" spcCol="0" rtlCol="0" fromWordArt="0" anchor="ctr" anchorCtr="0" forceAA="0" compatLnSpc="1">
+            <a:prstTxWarp prst="textNoShape">
+              <a:avLst/>
+            </a:prstTxWarp>
+            <a:noAutofit/>
+          </a:bodyPr>
+          <a:lstStyle/>
+          <a:p>
+            <a:pPr algn="ctr"/>
+            <a:r>
+              <a:rPr lang="en-US" sz="1058" dirty="0">
+                <a:solidFill>
+                  <a:schemeClr val="tx1"/>
+                </a:solidFill>
+              </a:rPr>
+              <a:t>Mutants</a:t>
+            </a:r>
+          </a:p>
+        </p:txBody>
+      </p:sp>
+      <p:cxnSp>
+        <p:nvCxnSpPr>
+          <p:cNvPr id="151" name="Straight Arrow Connector 150">
+            <a:extLst>
+              <a:ext uri="{FF2B5EF4-FFF2-40B4-BE49-F238E27FC236}">
+                <a16:creationId xmlns:a16="http://schemas.microsoft.com/office/drawing/2014/main" id="{E66EC5B4-5A5D-4E41-ADFC-619D94F90636}"/>
+              </a:ext>
+            </a:extLst>
+          </p:cNvPr>
+          <p:cNvCxnSpPr>
+            <a:cxnSpLocks/>
+            <a:stCxn id="30" idx="3"/>
+            <a:endCxn id="146" idx="2"/>
+          </p:cNvCxnSpPr>
+          <p:nvPr/>
+        </p:nvCxnSpPr>
+        <p:spPr>
+          <a:xfrm>
+            <a:off x="3680669" y="1513160"/>
+            <a:ext cx="497742" cy="8"/>
+          </a:xfrm>
+          <a:prstGeom prst="straightConnector1">
+            <a:avLst/>
+          </a:prstGeom>
+          <a:ln w="38100">
+            <a:solidFill>
+              <a:schemeClr val="tx1"/>
+            </a:solidFill>
+            <a:tailEnd type="triangle"/>
+          </a:ln>
+        </p:spPr>
+        <p:style>
+          <a:lnRef idx="1">
+            <a:schemeClr val="accent1"/>
+          </a:lnRef>
+          <a:fillRef idx="0">
+            <a:schemeClr val="accent1"/>
+          </a:fillRef>
+          <a:effectRef idx="0">
+            <a:schemeClr val="accent1"/>
+          </a:effectRef>
+          <a:fontRef idx="minor">
+            <a:schemeClr val="tx1"/>
+          </a:fontRef>
+        </p:style>
+      </p:cxnSp>
+      <p:sp>
+        <p:nvSpPr>
+          <p:cNvPr id="162" name="Rectangle 161">
+            <a:extLst>
+              <a:ext uri="{FF2B5EF4-FFF2-40B4-BE49-F238E27FC236}">
+                <a16:creationId xmlns:a16="http://schemas.microsoft.com/office/drawing/2014/main" id="{54F93CCD-D9D3-174D-A3FC-BA44566551CD}"/>
+              </a:ext>
+            </a:extLst>
+          </p:cNvPr>
+          <p:cNvSpPr/>
+          <p:nvPr/>
+        </p:nvSpPr>
+        <p:spPr>
+          <a:xfrm>
+            <a:off x="4385237" y="7378588"/>
+            <a:ext cx="1642690" cy="320216"/>
+          </a:xfrm>
+          <a:prstGeom prst="rect">
+            <a:avLst/>
+          </a:prstGeom>
+        </p:spPr>
+        <p:txBody>
+          <a:bodyPr wrap="square">
+            <a:spAutoFit/>
+          </a:bodyPr>
+          <a:lstStyle/>
+          <a:p>
+            <a:pPr algn="ctr"/>
+            <a:r>
+              <a:rPr lang="en-US" sz="1481" dirty="0"/>
+              <a:t>Optimization</a:t>
+            </a:r>
+          </a:p>
+        </p:txBody>
+      </p:sp>
+      <p:sp>
+        <p:nvSpPr>
+          <p:cNvPr id="163" name="Process 162">
+            <a:extLst>
+              <a:ext uri="{FF2B5EF4-FFF2-40B4-BE49-F238E27FC236}">
+                <a16:creationId xmlns:a16="http://schemas.microsoft.com/office/drawing/2014/main" id="{31E4795B-93FB-1F43-9252-43893607FF7E}"/>
+              </a:ext>
+            </a:extLst>
+          </p:cNvPr>
+          <p:cNvSpPr/>
+          <p:nvPr/>
+        </p:nvSpPr>
+        <p:spPr>
+          <a:xfrm>
+            <a:off x="4090781" y="7367344"/>
+            <a:ext cx="505616" cy="285162"/>
+          </a:xfrm>
+          <a:prstGeom prst="flowChartProcess">
+            <a:avLst/>
+          </a:prstGeom>
+          <a:noFill/>
+          <a:ln w="38100">
+            <a:solidFill>
+              <a:schemeClr val="tx1"/>
+            </a:solidFill>
+            <a:prstDash val="sysDash"/>
+          </a:ln>
+        </p:spPr>
+        <p:style>
+          <a:lnRef idx="2">
+            <a:schemeClr val="accent1">
+              <a:shade val="50000"/>
+            </a:schemeClr>
+          </a:lnRef>
+          <a:fillRef idx="1">
+            <a:schemeClr val="accent1"/>
+          </a:fillRef>
+          <a:effectRef idx="0">
+            <a:schemeClr val="accent1"/>
+          </a:effectRef>
+          <a:fontRef idx="minor">
+            <a:schemeClr val="lt1"/>
+          </a:fontRef>
+        </p:style>
+        <p:txBody>
+          <a:bodyPr rot="0" spcFirstLastPara="0" vertOverflow="overflow" horzOverflow="overflow" vert="horz" wrap="square" lIns="96771" tIns="48386" rIns="96771" bIns="48386" numCol="1" spcCol="0" rtlCol="0" fromWordArt="0" anchor="ctr" anchorCtr="0" forceAA="0" compatLnSpc="1">
+            <a:prstTxWarp prst="textNoShape">
+              <a:avLst/>
+            </a:prstTxWarp>
+            <a:noAutofit/>
+          </a:bodyPr>
+          <a:lstStyle/>
+          <a:p>
+            <a:pPr algn="ctr"/>
+            <a:endParaRPr lang="en-US" sz="1058" dirty="0">
+              <a:solidFill>
+                <a:schemeClr val="tx1"/>
+              </a:solidFill>
+            </a:endParaRPr>
+          </a:p>
+        </p:txBody>
+      </p:sp>
+      <p:sp>
+        <p:nvSpPr>
+          <p:cNvPr id="164" name="Rectangle 163">
+            <a:extLst>
+              <a:ext uri="{FF2B5EF4-FFF2-40B4-BE49-F238E27FC236}">
+                <a16:creationId xmlns:a16="http://schemas.microsoft.com/office/drawing/2014/main" id="{1F811640-61AB-F347-8B5E-E55964AA5040}"/>
+              </a:ext>
+            </a:extLst>
+          </p:cNvPr>
+          <p:cNvSpPr/>
+          <p:nvPr/>
+        </p:nvSpPr>
+        <p:spPr>
+          <a:xfrm>
+            <a:off x="-397565" y="6854336"/>
+            <a:ext cx="1568585" cy="320216"/>
+          </a:xfrm>
+          <a:prstGeom prst="rect">
+            <a:avLst/>
+          </a:prstGeom>
+        </p:spPr>
+        <p:txBody>
+          <a:bodyPr wrap="square">
+            <a:spAutoFit/>
+          </a:bodyPr>
+          <a:lstStyle/>
+          <a:p>
+            <a:pPr algn="ctr"/>
+            <a:r>
+              <a:rPr lang="en-US" sz="1481" b="1" dirty="0"/>
+              <a:t>Legend:</a:t>
+            </a:r>
+          </a:p>
+        </p:txBody>
+      </p:sp>
     </p:spTree>
     <p:extLst>
       <p:ext uri="{BB962C8B-B14F-4D97-AF65-F5344CB8AC3E}">
@@ -6503,7 +7035,7 @@
                                           </p:stCondLst>
                                         </p:cTn>
                                         <p:tgtEl>
-                                          <p:spTgt spid="2"/>
+                                          <p:spTgt spid="6"/>
                                         </p:tgtEl>
                                         <p:attrNameLst>
                                           <p:attrName>style.visibility</p:attrName>
@@ -6548,214 +7080,7 @@
                                           </p:stCondLst>
                                         </p:cTn>
                                         <p:tgtEl>
-                                          <p:spTgt spid="8"/>
-                                        </p:tgtEl>
-                                        <p:attrNameLst>
-                                          <p:attrName>style.visibility</p:attrName>
-                                        </p:attrNameLst>
-                                      </p:cBhvr>
-                                      <p:to>
-                                        <p:strVal val="visible"/>
-                                      </p:to>
-                                    </p:set>
-                                  </p:childTnLst>
-                                </p:cTn>
-                              </p:par>
-                            </p:childTnLst>
-                          </p:cTn>
-                        </p:par>
-                      </p:childTnLst>
-                    </p:cTn>
-                  </p:par>
-                  <p:par>
-                    <p:cTn id="11" fill="hold">
-                      <p:stCondLst>
-                        <p:cond delay="indefinite"/>
-                      </p:stCondLst>
-                      <p:childTnLst>
-                        <p:par>
-                          <p:cTn id="12" fill="hold">
-                            <p:stCondLst>
-                              <p:cond delay="0"/>
-                            </p:stCondLst>
-                            <p:childTnLst>
-                              <p:par>
-                                <p:cTn id="13" presetID="1" presetClass="entr" presetSubtype="0" fill="hold" nodeType="clickEffect">
-                                  <p:stCondLst>
-                                    <p:cond delay="0"/>
-                                  </p:stCondLst>
-                                  <p:childTnLst>
-                                    <p:set>
-                                      <p:cBhvr>
-                                        <p:cTn id="14" dur="1" fill="hold">
-                                          <p:stCondLst>
-                                            <p:cond delay="0"/>
-                                          </p:stCondLst>
-                                        </p:cTn>
-                                        <p:tgtEl>
-                                          <p:spTgt spid="6"/>
-                                        </p:tgtEl>
-                                        <p:attrNameLst>
-                                          <p:attrName>style.visibility</p:attrName>
-                                        </p:attrNameLst>
-                                      </p:cBhvr>
-                                      <p:to>
-                                        <p:strVal val="visible"/>
-                                      </p:to>
-                                    </p:set>
-                                  </p:childTnLst>
-                                </p:cTn>
-                              </p:par>
-                            </p:childTnLst>
-                          </p:cTn>
-                        </p:par>
-                      </p:childTnLst>
-                    </p:cTn>
-                  </p:par>
-                  <p:par>
-                    <p:cTn id="15" fill="hold">
-                      <p:stCondLst>
-                        <p:cond delay="indefinite"/>
-                      </p:stCondLst>
-                      <p:childTnLst>
-                        <p:par>
-                          <p:cTn id="16" fill="hold">
-                            <p:stCondLst>
-                              <p:cond delay="0"/>
-                            </p:stCondLst>
-                            <p:childTnLst>
-                              <p:par>
-                                <p:cTn id="17" presetID="1" presetClass="entr" presetSubtype="0" fill="hold" nodeType="clickEffect">
-                                  <p:stCondLst>
-                                    <p:cond delay="0"/>
-                                  </p:stCondLst>
-                                  <p:childTnLst>
-                                    <p:set>
-                                      <p:cBhvr>
-                                        <p:cTn id="18" dur="1" fill="hold">
-                                          <p:stCondLst>
-                                            <p:cond delay="0"/>
-                                          </p:stCondLst>
-                                        </p:cTn>
-                                        <p:tgtEl>
                                           <p:spTgt spid="117"/>
-                                        </p:tgtEl>
-                                        <p:attrNameLst>
-                                          <p:attrName>style.visibility</p:attrName>
-                                        </p:attrNameLst>
-                                      </p:cBhvr>
-                                      <p:to>
-                                        <p:strVal val="visible"/>
-                                      </p:to>
-                                    </p:set>
-                                  </p:childTnLst>
-                                </p:cTn>
-                              </p:par>
-                              <p:par>
-                                <p:cTn id="19" presetID="1" presetClass="entr" presetSubtype="0" fill="hold" nodeType="withEffect">
-                                  <p:stCondLst>
-                                    <p:cond delay="0"/>
-                                  </p:stCondLst>
-                                  <p:childTnLst>
-                                    <p:set>
-                                      <p:cBhvr>
-                                        <p:cTn id="20" dur="1" fill="hold">
-                                          <p:stCondLst>
-                                            <p:cond delay="0"/>
-                                          </p:stCondLst>
-                                        </p:cTn>
-                                        <p:tgtEl>
-                                          <p:spTgt spid="9"/>
-                                        </p:tgtEl>
-                                        <p:attrNameLst>
-                                          <p:attrName>style.visibility</p:attrName>
-                                        </p:attrNameLst>
-                                      </p:cBhvr>
-                                      <p:to>
-                                        <p:strVal val="visible"/>
-                                      </p:to>
-                                    </p:set>
-                                  </p:childTnLst>
-                                </p:cTn>
-                              </p:par>
-                            </p:childTnLst>
-                          </p:cTn>
-                        </p:par>
-                      </p:childTnLst>
-                    </p:cTn>
-                  </p:par>
-                  <p:par>
-                    <p:cTn id="21" fill="hold">
-                      <p:stCondLst>
-                        <p:cond delay="indefinite"/>
-                      </p:stCondLst>
-                      <p:childTnLst>
-                        <p:par>
-                          <p:cTn id="22" fill="hold">
-                            <p:stCondLst>
-                              <p:cond delay="0"/>
-                            </p:stCondLst>
-                            <p:childTnLst>
-                              <p:par>
-                                <p:cTn id="23" presetID="1" presetClass="entr" presetSubtype="0" fill="hold" nodeType="clickEffect">
-                                  <p:stCondLst>
-                                    <p:cond delay="0"/>
-                                  </p:stCondLst>
-                                  <p:childTnLst>
-                                    <p:set>
-                                      <p:cBhvr>
-                                        <p:cTn id="24" dur="1" fill="hold">
-                                          <p:stCondLst>
-                                            <p:cond delay="0"/>
-                                          </p:stCondLst>
-                                        </p:cTn>
-                                        <p:tgtEl>
-                                          <p:spTgt spid="12"/>
-                                        </p:tgtEl>
-                                        <p:attrNameLst>
-                                          <p:attrName>style.visibility</p:attrName>
-                                        </p:attrNameLst>
-                                      </p:cBhvr>
-                                      <p:to>
-                                        <p:strVal val="visible"/>
-                                      </p:to>
-                                    </p:set>
-                                  </p:childTnLst>
-                                </p:cTn>
-                              </p:par>
-                            </p:childTnLst>
-                          </p:cTn>
-                        </p:par>
-                      </p:childTnLst>
-                    </p:cTn>
-                  </p:par>
-                  <p:par>
-                    <p:cTn id="25" fill="hold">
-                      <p:stCondLst>
-                        <p:cond delay="indefinite"/>
-                      </p:stCondLst>
-                      <p:childTnLst>
-                        <p:par>
-                          <p:cTn id="26" fill="hold">
-                            <p:stCondLst>
-                              <p:cond delay="0"/>
-                            </p:stCondLst>
-                            <p:childTnLst>
-                              <p:par>
-                                <p:cTn id="27" presetID="1" presetClass="entr" presetSubtype="0" fill="hold" nodeType="clickEffect">
-                                  <p:stCondLst>
-                                    <p:cond delay="0"/>
-                                  </p:stCondLst>
-                                  <p:childTnLst>
-                                    <p:set>
-                                      <p:cBhvr>
-                                        <p:cTn id="28" dur="1" fill="hold">
-                                          <p:stCondLst>
-                                            <p:cond delay="0"/>
-                                          </p:stCondLst>
-                                        </p:cTn>
-                                        <p:tgtEl>
-                                          <p:spTgt spid="96"/>
                                         </p:tgtEl>
                                         <p:attrNameLst>
                                           <p:attrName>style.visibility</p:attrName>

</xml_diff>

<commit_message>
adding a preliminary description of the data mutation process
</commit_message>
<xml_diff>
--- a/reports/MutationTestingSurvey/images/process.pptx
+++ b/reports/MutationTestingSurvey/images/process.pptx
@@ -5816,20 +5816,19 @@
           </p:cNvPr>
           <p:cNvCxnSpPr>
             <a:cxnSpLocks/>
-            <a:stCxn id="70" idx="1"/>
+            <a:stCxn id="70" idx="0"/>
             <a:endCxn id="71" idx="0"/>
           </p:cNvCxnSpPr>
           <p:nvPr/>
         </p:nvCxnSpPr>
         <p:spPr>
-          <a:xfrm rot="10800000">
-            <a:off x="1713660" y="357638"/>
-            <a:ext cx="6179159" cy="317986"/>
-          </a:xfrm>
-          <a:prstGeom prst="bentConnector4">
+          <a:xfrm rot="16200000" flipV="1">
+            <a:off x="4949765" y="-2878468"/>
+            <a:ext cx="92632" cy="6564843"/>
+          </a:xfrm>
+          <a:prstGeom prst="bentConnector3">
             <a:avLst>
-              <a:gd name="adj1" fmla="val 45536"/>
-              <a:gd name="adj2" fmla="val 171890"/>
+              <a:gd name="adj1" fmla="val 260943"/>
             </a:avLst>
           </a:prstGeom>
           <a:ln w="38100">
@@ -7002,6 +7001,126 @@
           </a:p>
         </p:txBody>
       </p:sp>
+      <p:sp>
+        <p:nvSpPr>
+          <p:cNvPr id="165" name="Data 164">
+            <a:extLst>
+              <a:ext uri="{FF2B5EF4-FFF2-40B4-BE49-F238E27FC236}">
+                <a16:creationId xmlns:a16="http://schemas.microsoft.com/office/drawing/2014/main" id="{1643CEB9-83B0-164A-BDED-51398A413B80}"/>
+              </a:ext>
+            </a:extLst>
+          </p:cNvPr>
+          <p:cNvSpPr/>
+          <p:nvPr/>
+        </p:nvSpPr>
+        <p:spPr>
+          <a:xfrm>
+            <a:off x="4414563" y="397565"/>
+            <a:ext cx="1269759" cy="536647"/>
+          </a:xfrm>
+          <a:prstGeom prst="flowChartInputOutput">
+            <a:avLst/>
+          </a:prstGeom>
+          <a:noFill/>
+          <a:ln w="38100">
+            <a:solidFill>
+              <a:schemeClr val="tx1"/>
+            </a:solidFill>
+          </a:ln>
+        </p:spPr>
+        <p:style>
+          <a:lnRef idx="2">
+            <a:schemeClr val="accent1">
+              <a:shade val="50000"/>
+            </a:schemeClr>
+          </a:lnRef>
+          <a:fillRef idx="1">
+            <a:schemeClr val="accent1"/>
+          </a:fillRef>
+          <a:effectRef idx="0">
+            <a:schemeClr val="accent1"/>
+          </a:effectRef>
+          <a:fontRef idx="minor">
+            <a:schemeClr val="lt1"/>
+          </a:fontRef>
+        </p:style>
+        <p:txBody>
+          <a:bodyPr rot="0" spcFirstLastPara="0" vertOverflow="overflow" horzOverflow="overflow" vert="horz" wrap="square" lIns="96771" tIns="48386" rIns="96771" bIns="48386" numCol="1" spcCol="0" rtlCol="0" fromWordArt="0" anchor="ctr" anchorCtr="0" forceAA="0" compatLnSpc="1">
+            <a:prstTxWarp prst="textNoShape">
+              <a:avLst/>
+            </a:prstTxWarp>
+            <a:noAutofit/>
+          </a:bodyPr>
+          <a:lstStyle/>
+          <a:p>
+            <a:pPr algn="ctr"/>
+            <a:r>
+              <a:rPr lang="en-US" sz="1058" dirty="0">
+                <a:solidFill>
+                  <a:schemeClr val="tx1"/>
+                </a:solidFill>
+              </a:rPr>
+              <a:t>SUT</a:t>
+            </a:r>
+          </a:p>
+          <a:p>
+            <a:pPr algn="ctr"/>
+            <a:r>
+              <a:rPr lang="en-US" sz="1058" dirty="0">
+                <a:solidFill>
+                  <a:schemeClr val="tx1"/>
+                </a:solidFill>
+              </a:rPr>
+              <a:t>Test Suite</a:t>
+            </a:r>
+          </a:p>
+        </p:txBody>
+      </p:sp>
+      <p:cxnSp>
+        <p:nvCxnSpPr>
+          <p:cNvPr id="168" name="Straight Arrow Connector 110">
+            <a:extLst>
+              <a:ext uri="{FF2B5EF4-FFF2-40B4-BE49-F238E27FC236}">
+                <a16:creationId xmlns:a16="http://schemas.microsoft.com/office/drawing/2014/main" id="{B3DF4364-FAA5-C64F-A7F8-4E24F5CC889B}"/>
+              </a:ext>
+            </a:extLst>
+          </p:cNvPr>
+          <p:cNvCxnSpPr>
+            <a:cxnSpLocks/>
+            <a:stCxn id="165" idx="5"/>
+          </p:cNvCxnSpPr>
+          <p:nvPr/>
+        </p:nvCxnSpPr>
+        <p:spPr>
+          <a:xfrm>
+            <a:off x="5557346" y="665889"/>
+            <a:ext cx="459141" cy="632824"/>
+          </a:xfrm>
+          <a:prstGeom prst="bentConnector2">
+            <a:avLst/>
+          </a:prstGeom>
+          <a:ln w="38100">
+            <a:solidFill>
+              <a:schemeClr val="tx1"/>
+            </a:solidFill>
+            <a:tailEnd type="triangle"/>
+          </a:ln>
+        </p:spPr>
+        <p:style>
+          <a:lnRef idx="1">
+            <a:schemeClr val="accent1"/>
+          </a:lnRef>
+          <a:fillRef idx="0">
+            <a:schemeClr val="accent1"/>
+          </a:fillRef>
+          <a:effectRef idx="0">
+            <a:schemeClr val="accent1"/>
+          </a:effectRef>
+          <a:fontRef idx="minor">
+            <a:schemeClr val="tx1"/>
+          </a:fontRef>
+        </p:style>
+      </p:cxnSp>
     </p:spTree>
     <p:extLst>
       <p:ext uri="{BB962C8B-B14F-4D97-AF65-F5344CB8AC3E}">

</xml_diff>